<commit_message>
Deployed 67457e0 with MkDocs version: 1.1.2
</commit_message>
<xml_diff>
--- a/img/figures.pptx
+++ b/img/figures.pptx
@@ -6,6 +6,8 @@
   </p:sldMasterIdLst>
   <p:sldIdLst>
     <p:sldId id="256" r:id="rId2"/>
+    <p:sldId id="257" r:id="rId3"/>
+    <p:sldId id="258" r:id="rId4"/>
   </p:sldIdLst>
   <p:sldSz cx="12192000" cy="6858000"/>
   <p:notesSz cx="6858000" cy="9144000"/>
@@ -3342,7 +3344,14 @@
           <a:bodyPr/>
           <a:lstStyle/>
           <a:p>
-            <a:endParaRPr lang="en-US"/>
+            <a:r>
+              <a:rPr lang="en-US" dirty="0" err="1"/>
+              <a:t>MicroPython</a:t>
+            </a:r>
+            <a:r>
+              <a:rPr lang="en-US" dirty="0"/>
+              <a:t> Figures</a:t>
+            </a:r>
           </a:p>
         </p:txBody>
       </p:sp>
@@ -3375,6 +3384,1266 @@
     <p:extLst>
       <p:ext uri="{BB962C8B-B14F-4D97-AF65-F5344CB8AC3E}">
         <p14:creationId xmlns:p14="http://schemas.microsoft.com/office/powerpoint/2010/main" val="2663167492"/>
+      </p:ext>
+    </p:extLst>
+  </p:cSld>
+  <p:clrMapOvr>
+    <a:masterClrMapping/>
+  </p:clrMapOvr>
+</p:sld>
+</file>
+
+<file path=ppt/slides/slide2.xml><?xml version="1.0" encoding="utf-8"?>
+<p:sld xmlns:a="http://schemas.openxmlformats.org/drawingml/2006/main" xmlns:r="http://schemas.openxmlformats.org/officeDocument/2006/relationships" xmlns:p="http://schemas.openxmlformats.org/presentationml/2006/main">
+  <p:cSld>
+    <p:spTree>
+      <p:nvGrpSpPr>
+        <p:cNvPr id="1" name=""/>
+        <p:cNvGrpSpPr/>
+        <p:nvPr/>
+      </p:nvGrpSpPr>
+      <p:grpSpPr>
+        <a:xfrm>
+          <a:off x="0" y="0"/>
+          <a:ext cx="0" cy="0"/>
+          <a:chOff x="0" y="0"/>
+          <a:chExt cx="0" cy="0"/>
+        </a:xfrm>
+      </p:grpSpPr>
+      <p:sp>
+        <p:nvSpPr>
+          <p:cNvPr id="2" name="Title 1">
+            <a:extLst>
+              <a:ext uri="{FF2B5EF4-FFF2-40B4-BE49-F238E27FC236}">
+                <a16:creationId xmlns:a16="http://schemas.microsoft.com/office/drawing/2014/main" id="{C7119EB3-D2A0-064A-9682-F16094EDA15C}"/>
+              </a:ext>
+            </a:extLst>
+          </p:cNvPr>
+          <p:cNvSpPr>
+            <a:spLocks noGrp="1"/>
+          </p:cNvSpPr>
+          <p:nvPr>
+            <p:ph type="title"/>
+          </p:nvPr>
+        </p:nvSpPr>
+        <p:spPr/>
+        <p:txBody>
+          <a:bodyPr/>
+          <a:lstStyle/>
+          <a:p>
+            <a:endParaRPr lang="en-US"/>
+          </a:p>
+        </p:txBody>
+      </p:sp>
+      <p:sp>
+        <p:nvSpPr>
+          <p:cNvPr id="3" name="Content Placeholder 2">
+            <a:extLst>
+              <a:ext uri="{FF2B5EF4-FFF2-40B4-BE49-F238E27FC236}">
+                <a16:creationId xmlns:a16="http://schemas.microsoft.com/office/drawing/2014/main" id="{347A4B86-BE59-7F4F-884D-0531A10E757C}"/>
+              </a:ext>
+            </a:extLst>
+          </p:cNvPr>
+          <p:cNvSpPr>
+            <a:spLocks noGrp="1"/>
+          </p:cNvSpPr>
+          <p:nvPr>
+            <p:ph idx="1"/>
+          </p:nvPr>
+        </p:nvSpPr>
+        <p:spPr>
+          <a:xfrm>
+            <a:off x="838200" y="5170713"/>
+            <a:ext cx="10515600" cy="1006249"/>
+          </a:xfrm>
+        </p:spPr>
+        <p:txBody>
+          <a:bodyPr/>
+          <a:lstStyle/>
+          <a:p>
+            <a:endParaRPr lang="en-US" dirty="0"/>
+          </a:p>
+        </p:txBody>
+      </p:sp>
+      <p:sp>
+        <p:nvSpPr>
+          <p:cNvPr id="4" name="Right Arrow 3">
+            <a:extLst>
+              <a:ext uri="{FF2B5EF4-FFF2-40B4-BE49-F238E27FC236}">
+                <a16:creationId xmlns:a16="http://schemas.microsoft.com/office/drawing/2014/main" id="{A7766BFB-BE8C-6442-8A40-6A519FBB4254}"/>
+              </a:ext>
+            </a:extLst>
+          </p:cNvPr>
+          <p:cNvSpPr/>
+          <p:nvPr/>
+        </p:nvSpPr>
+        <p:spPr>
+          <a:xfrm>
+            <a:off x="2895600" y="2922813"/>
+            <a:ext cx="1872343" cy="1045029"/>
+          </a:xfrm>
+          <a:prstGeom prst="rightArrow">
+            <a:avLst/>
+          </a:prstGeom>
+          <a:solidFill>
+            <a:schemeClr val="accent4"/>
+          </a:solidFill>
+          <a:ln w="28575"/>
+        </p:spPr>
+        <p:style>
+          <a:lnRef idx="2">
+            <a:schemeClr val="accent1">
+              <a:shade val="50000"/>
+            </a:schemeClr>
+          </a:lnRef>
+          <a:fillRef idx="1">
+            <a:schemeClr val="accent1"/>
+          </a:fillRef>
+          <a:effectRef idx="0">
+            <a:schemeClr val="accent1"/>
+          </a:effectRef>
+          <a:fontRef idx="minor">
+            <a:schemeClr val="lt1"/>
+          </a:fontRef>
+        </p:style>
+        <p:txBody>
+          <a:bodyPr rtlCol="0" anchor="ctr"/>
+          <a:lstStyle/>
+          <a:p>
+            <a:pPr algn="ctr"/>
+            <a:r>
+              <a:rPr lang="en-US" sz="2400" b="1" dirty="0">
+                <a:solidFill>
+                  <a:schemeClr val="tx1"/>
+                </a:solidFill>
+              </a:rPr>
+              <a:t>Sensors</a:t>
+            </a:r>
+          </a:p>
+        </p:txBody>
+      </p:sp>
+      <p:sp>
+        <p:nvSpPr>
+          <p:cNvPr id="5" name="Rectangle 4">
+            <a:extLst>
+              <a:ext uri="{FF2B5EF4-FFF2-40B4-BE49-F238E27FC236}">
+                <a16:creationId xmlns:a16="http://schemas.microsoft.com/office/drawing/2014/main" id="{54740CAB-1CBF-F24B-A4BD-39863CD87FA6}"/>
+              </a:ext>
+            </a:extLst>
+          </p:cNvPr>
+          <p:cNvSpPr/>
+          <p:nvPr/>
+        </p:nvSpPr>
+        <p:spPr>
+          <a:xfrm>
+            <a:off x="4767943" y="2852057"/>
+            <a:ext cx="2296886" cy="1186543"/>
+          </a:xfrm>
+          <a:prstGeom prst="rect">
+            <a:avLst/>
+          </a:prstGeom>
+          <a:solidFill>
+            <a:srgbClr val="FFFF00"/>
+          </a:solidFill>
+          <a:ln w="28575"/>
+        </p:spPr>
+        <p:style>
+          <a:lnRef idx="2">
+            <a:schemeClr val="accent1">
+              <a:shade val="50000"/>
+            </a:schemeClr>
+          </a:lnRef>
+          <a:fillRef idx="1">
+            <a:schemeClr val="accent1"/>
+          </a:fillRef>
+          <a:effectRef idx="0">
+            <a:schemeClr val="accent1"/>
+          </a:effectRef>
+          <a:fontRef idx="minor">
+            <a:schemeClr val="lt1"/>
+          </a:fontRef>
+        </p:style>
+        <p:txBody>
+          <a:bodyPr rtlCol="0" anchor="ctr"/>
+          <a:lstStyle/>
+          <a:p>
+            <a:pPr algn="ctr"/>
+            <a:r>
+              <a:rPr lang="en-US" sz="2400" b="1" dirty="0">
+                <a:solidFill>
+                  <a:schemeClr val="tx1"/>
+                </a:solidFill>
+              </a:rPr>
+              <a:t>Microcontroller</a:t>
+            </a:r>
+          </a:p>
+        </p:txBody>
+      </p:sp>
+      <p:sp>
+        <p:nvSpPr>
+          <p:cNvPr id="6" name="Right Arrow 5">
+            <a:extLst>
+              <a:ext uri="{FF2B5EF4-FFF2-40B4-BE49-F238E27FC236}">
+                <a16:creationId xmlns:a16="http://schemas.microsoft.com/office/drawing/2014/main" id="{B7CF6584-92C4-2049-90E6-C632485B2C42}"/>
+              </a:ext>
+            </a:extLst>
+          </p:cNvPr>
+          <p:cNvSpPr/>
+          <p:nvPr/>
+        </p:nvSpPr>
+        <p:spPr>
+          <a:xfrm>
+            <a:off x="7064829" y="2922813"/>
+            <a:ext cx="2841171" cy="1045029"/>
+          </a:xfrm>
+          <a:prstGeom prst="rightArrow">
+            <a:avLst/>
+          </a:prstGeom>
+          <a:solidFill>
+            <a:srgbClr val="00B050"/>
+          </a:solidFill>
+          <a:ln w="28575"/>
+        </p:spPr>
+        <p:style>
+          <a:lnRef idx="2">
+            <a:schemeClr val="accent1">
+              <a:shade val="50000"/>
+            </a:schemeClr>
+          </a:lnRef>
+          <a:fillRef idx="1">
+            <a:schemeClr val="accent1"/>
+          </a:fillRef>
+          <a:effectRef idx="0">
+            <a:schemeClr val="accent1"/>
+          </a:effectRef>
+          <a:fontRef idx="minor">
+            <a:schemeClr val="lt1"/>
+          </a:fontRef>
+        </p:style>
+        <p:txBody>
+          <a:bodyPr rtlCol="0" anchor="ctr"/>
+          <a:lstStyle/>
+          <a:p>
+            <a:pPr algn="ctr"/>
+            <a:r>
+              <a:rPr lang="en-US" sz="2400" b="1" dirty="0">
+                <a:solidFill>
+                  <a:schemeClr val="tx1"/>
+                </a:solidFill>
+              </a:rPr>
+              <a:t>Output Controls</a:t>
+            </a:r>
+          </a:p>
+        </p:txBody>
+      </p:sp>
+    </p:spTree>
+    <p:extLst>
+      <p:ext uri="{BB962C8B-B14F-4D97-AF65-F5344CB8AC3E}">
+        <p14:creationId xmlns:p14="http://schemas.microsoft.com/office/powerpoint/2010/main" val="558389087"/>
+      </p:ext>
+    </p:extLst>
+  </p:cSld>
+  <p:clrMapOvr>
+    <a:masterClrMapping/>
+  </p:clrMapOvr>
+</p:sld>
+</file>
+
+<file path=ppt/slides/slide3.xml><?xml version="1.0" encoding="utf-8"?>
+<p:sld xmlns:a="http://schemas.openxmlformats.org/drawingml/2006/main" xmlns:r="http://schemas.openxmlformats.org/officeDocument/2006/relationships" xmlns:p="http://schemas.openxmlformats.org/presentationml/2006/main">
+  <p:cSld>
+    <p:spTree>
+      <p:nvGrpSpPr>
+        <p:cNvPr id="1" name=""/>
+        <p:cNvGrpSpPr/>
+        <p:nvPr/>
+      </p:nvGrpSpPr>
+      <p:grpSpPr>
+        <a:xfrm>
+          <a:off x="0" y="0"/>
+          <a:ext cx="0" cy="0"/>
+          <a:chOff x="0" y="0"/>
+          <a:chExt cx="0" cy="0"/>
+        </a:xfrm>
+      </p:grpSpPr>
+      <p:sp>
+        <p:nvSpPr>
+          <p:cNvPr id="2" name="Title 1">
+            <a:extLst>
+              <a:ext uri="{FF2B5EF4-FFF2-40B4-BE49-F238E27FC236}">
+                <a16:creationId xmlns:a16="http://schemas.microsoft.com/office/drawing/2014/main" id="{72E15970-820C-6641-8B83-F3860EDA1AE0}"/>
+              </a:ext>
+            </a:extLst>
+          </p:cNvPr>
+          <p:cNvSpPr>
+            <a:spLocks noGrp="1"/>
+          </p:cNvSpPr>
+          <p:nvPr>
+            <p:ph type="title"/>
+          </p:nvPr>
+        </p:nvSpPr>
+        <p:spPr/>
+        <p:txBody>
+          <a:bodyPr/>
+          <a:lstStyle/>
+          <a:p>
+            <a:endParaRPr lang="en-US"/>
+          </a:p>
+        </p:txBody>
+      </p:sp>
+      <p:sp>
+        <p:nvSpPr>
+          <p:cNvPr id="3" name="Content Placeholder 2">
+            <a:extLst>
+              <a:ext uri="{FF2B5EF4-FFF2-40B4-BE49-F238E27FC236}">
+                <a16:creationId xmlns:a16="http://schemas.microsoft.com/office/drawing/2014/main" id="{1A5A24DC-9779-0F48-B7B7-8E56F95B0F88}"/>
+              </a:ext>
+            </a:extLst>
+          </p:cNvPr>
+          <p:cNvSpPr>
+            <a:spLocks noGrp="1"/>
+          </p:cNvSpPr>
+          <p:nvPr>
+            <p:ph idx="1"/>
+          </p:nvPr>
+        </p:nvSpPr>
+        <p:spPr>
+          <a:xfrm>
+            <a:off x="838200" y="5595483"/>
+            <a:ext cx="10515600" cy="897392"/>
+          </a:xfrm>
+        </p:spPr>
+        <p:txBody>
+          <a:bodyPr/>
+          <a:lstStyle/>
+          <a:p>
+            <a:endParaRPr lang="en-US" dirty="0"/>
+          </a:p>
+        </p:txBody>
+      </p:sp>
+      <p:sp>
+        <p:nvSpPr>
+          <p:cNvPr id="4" name="Rectangle 3">
+            <a:extLst>
+              <a:ext uri="{FF2B5EF4-FFF2-40B4-BE49-F238E27FC236}">
+                <a16:creationId xmlns:a16="http://schemas.microsoft.com/office/drawing/2014/main" id="{2F801350-0380-A14C-B912-49A0104988CD}"/>
+              </a:ext>
+            </a:extLst>
+          </p:cNvPr>
+          <p:cNvSpPr/>
+          <p:nvPr/>
+        </p:nvSpPr>
+        <p:spPr>
+          <a:xfrm>
+            <a:off x="1763484" y="3140529"/>
+            <a:ext cx="1970315" cy="576942"/>
+          </a:xfrm>
+          <a:prstGeom prst="rect">
+            <a:avLst/>
+          </a:prstGeom>
+          <a:solidFill>
+            <a:schemeClr val="accent2"/>
+          </a:solidFill>
+          <a:ln w="28575">
+            <a:solidFill>
+              <a:schemeClr val="tx1"/>
+            </a:solidFill>
+          </a:ln>
+        </p:spPr>
+        <p:style>
+          <a:lnRef idx="2">
+            <a:schemeClr val="accent1">
+              <a:shade val="50000"/>
+            </a:schemeClr>
+          </a:lnRef>
+          <a:fillRef idx="1">
+            <a:schemeClr val="accent1"/>
+          </a:fillRef>
+          <a:effectRef idx="0">
+            <a:schemeClr val="accent1"/>
+          </a:effectRef>
+          <a:fontRef idx="minor">
+            <a:schemeClr val="lt1"/>
+          </a:fontRef>
+        </p:style>
+        <p:txBody>
+          <a:bodyPr rtlCol="0" anchor="ctr"/>
+          <a:lstStyle/>
+          <a:p>
+            <a:pPr algn="ctr"/>
+            <a:r>
+              <a:rPr lang="en-US" dirty="0">
+                <a:solidFill>
+                  <a:schemeClr val="tx1"/>
+                </a:solidFill>
+              </a:rPr>
+              <a:t>Light Sensor</a:t>
+            </a:r>
+          </a:p>
+        </p:txBody>
+      </p:sp>
+      <p:sp>
+        <p:nvSpPr>
+          <p:cNvPr id="5" name="Rectangle 4">
+            <a:extLst>
+              <a:ext uri="{FF2B5EF4-FFF2-40B4-BE49-F238E27FC236}">
+                <a16:creationId xmlns:a16="http://schemas.microsoft.com/office/drawing/2014/main" id="{1FAA985C-9FB9-574F-80A8-0E3550E6F974}"/>
+              </a:ext>
+            </a:extLst>
+          </p:cNvPr>
+          <p:cNvSpPr/>
+          <p:nvPr/>
+        </p:nvSpPr>
+        <p:spPr>
+          <a:xfrm>
+            <a:off x="1763485" y="2454730"/>
+            <a:ext cx="1970316" cy="576942"/>
+          </a:xfrm>
+          <a:prstGeom prst="rect">
+            <a:avLst/>
+          </a:prstGeom>
+          <a:solidFill>
+            <a:schemeClr val="accent2"/>
+          </a:solidFill>
+          <a:ln w="28575">
+            <a:solidFill>
+              <a:schemeClr val="tx1"/>
+            </a:solidFill>
+          </a:ln>
+        </p:spPr>
+        <p:style>
+          <a:lnRef idx="2">
+            <a:schemeClr val="accent1">
+              <a:shade val="50000"/>
+            </a:schemeClr>
+          </a:lnRef>
+          <a:fillRef idx="1">
+            <a:schemeClr val="accent1"/>
+          </a:fillRef>
+          <a:effectRef idx="0">
+            <a:schemeClr val="accent1"/>
+          </a:effectRef>
+          <a:fontRef idx="minor">
+            <a:schemeClr val="lt1"/>
+          </a:fontRef>
+        </p:style>
+        <p:txBody>
+          <a:bodyPr rtlCol="0" anchor="ctr"/>
+          <a:lstStyle/>
+          <a:p>
+            <a:pPr algn="ctr"/>
+            <a:r>
+              <a:rPr lang="en-US" dirty="0">
+                <a:solidFill>
+                  <a:schemeClr val="tx1"/>
+                </a:solidFill>
+              </a:rPr>
+              <a:t>Distance Sensor</a:t>
+            </a:r>
+          </a:p>
+        </p:txBody>
+      </p:sp>
+      <p:sp>
+        <p:nvSpPr>
+          <p:cNvPr id="6" name="Rectangle 5">
+            <a:extLst>
+              <a:ext uri="{FF2B5EF4-FFF2-40B4-BE49-F238E27FC236}">
+                <a16:creationId xmlns:a16="http://schemas.microsoft.com/office/drawing/2014/main" id="{EE905EA8-E624-4E4F-862E-84D086F2CA43}"/>
+              </a:ext>
+            </a:extLst>
+          </p:cNvPr>
+          <p:cNvSpPr/>
+          <p:nvPr/>
+        </p:nvSpPr>
+        <p:spPr>
+          <a:xfrm>
+            <a:off x="1763484" y="3826328"/>
+            <a:ext cx="1970315" cy="576942"/>
+          </a:xfrm>
+          <a:prstGeom prst="rect">
+            <a:avLst/>
+          </a:prstGeom>
+          <a:solidFill>
+            <a:schemeClr val="accent2"/>
+          </a:solidFill>
+          <a:ln w="28575">
+            <a:solidFill>
+              <a:schemeClr val="tx1"/>
+            </a:solidFill>
+          </a:ln>
+        </p:spPr>
+        <p:style>
+          <a:lnRef idx="2">
+            <a:schemeClr val="accent1">
+              <a:shade val="50000"/>
+            </a:schemeClr>
+          </a:lnRef>
+          <a:fillRef idx="1">
+            <a:schemeClr val="accent1"/>
+          </a:fillRef>
+          <a:effectRef idx="0">
+            <a:schemeClr val="accent1"/>
+          </a:effectRef>
+          <a:fontRef idx="minor">
+            <a:schemeClr val="lt1"/>
+          </a:fontRef>
+        </p:style>
+        <p:txBody>
+          <a:bodyPr rtlCol="0" anchor="ctr"/>
+          <a:lstStyle/>
+          <a:p>
+            <a:pPr algn="ctr"/>
+            <a:r>
+              <a:rPr lang="en-US" dirty="0">
+                <a:solidFill>
+                  <a:schemeClr val="tx1"/>
+                </a:solidFill>
+              </a:rPr>
+              <a:t>Motion Sensor</a:t>
+            </a:r>
+          </a:p>
+        </p:txBody>
+      </p:sp>
+      <p:sp>
+        <p:nvSpPr>
+          <p:cNvPr id="7" name="Rectangle 6">
+            <a:extLst>
+              <a:ext uri="{FF2B5EF4-FFF2-40B4-BE49-F238E27FC236}">
+                <a16:creationId xmlns:a16="http://schemas.microsoft.com/office/drawing/2014/main" id="{BF2B3342-F2AC-3648-A106-A26CF4E66CC0}"/>
+              </a:ext>
+            </a:extLst>
+          </p:cNvPr>
+          <p:cNvSpPr/>
+          <p:nvPr/>
+        </p:nvSpPr>
+        <p:spPr>
+          <a:xfrm>
+            <a:off x="1763484" y="4535942"/>
+            <a:ext cx="1970315" cy="576942"/>
+          </a:xfrm>
+          <a:prstGeom prst="rect">
+            <a:avLst/>
+          </a:prstGeom>
+          <a:solidFill>
+            <a:schemeClr val="accent2"/>
+          </a:solidFill>
+          <a:ln w="28575">
+            <a:solidFill>
+              <a:schemeClr val="tx1"/>
+            </a:solidFill>
+          </a:ln>
+        </p:spPr>
+        <p:style>
+          <a:lnRef idx="2">
+            <a:schemeClr val="accent1">
+              <a:shade val="50000"/>
+            </a:schemeClr>
+          </a:lnRef>
+          <a:fillRef idx="1">
+            <a:schemeClr val="accent1"/>
+          </a:fillRef>
+          <a:effectRef idx="0">
+            <a:schemeClr val="accent1"/>
+          </a:effectRef>
+          <a:fontRef idx="minor">
+            <a:schemeClr val="lt1"/>
+          </a:fontRef>
+        </p:style>
+        <p:txBody>
+          <a:bodyPr rtlCol="0" anchor="ctr"/>
+          <a:lstStyle/>
+          <a:p>
+            <a:pPr algn="ctr"/>
+            <a:r>
+              <a:rPr lang="en-US" dirty="0">
+                <a:solidFill>
+                  <a:schemeClr val="tx1"/>
+                </a:solidFill>
+              </a:rPr>
+              <a:t>Sound Sensor</a:t>
+            </a:r>
+          </a:p>
+        </p:txBody>
+      </p:sp>
+      <p:sp>
+        <p:nvSpPr>
+          <p:cNvPr id="8" name="Rectangle 7">
+            <a:extLst>
+              <a:ext uri="{FF2B5EF4-FFF2-40B4-BE49-F238E27FC236}">
+                <a16:creationId xmlns:a16="http://schemas.microsoft.com/office/drawing/2014/main" id="{93194C55-8D28-DF45-A3FE-FFE03F9649AD}"/>
+              </a:ext>
+            </a:extLst>
+          </p:cNvPr>
+          <p:cNvSpPr/>
+          <p:nvPr/>
+        </p:nvSpPr>
+        <p:spPr>
+          <a:xfrm>
+            <a:off x="4517568" y="3243035"/>
+            <a:ext cx="2296886" cy="1186543"/>
+          </a:xfrm>
+          <a:prstGeom prst="rect">
+            <a:avLst/>
+          </a:prstGeom>
+          <a:solidFill>
+            <a:srgbClr val="FFFF00"/>
+          </a:solidFill>
+          <a:ln w="28575">
+            <a:solidFill>
+              <a:schemeClr val="tx1"/>
+            </a:solidFill>
+          </a:ln>
+        </p:spPr>
+        <p:style>
+          <a:lnRef idx="2">
+            <a:schemeClr val="accent1">
+              <a:shade val="50000"/>
+            </a:schemeClr>
+          </a:lnRef>
+          <a:fillRef idx="1">
+            <a:schemeClr val="accent1"/>
+          </a:fillRef>
+          <a:effectRef idx="0">
+            <a:schemeClr val="accent1"/>
+          </a:effectRef>
+          <a:fontRef idx="minor">
+            <a:schemeClr val="lt1"/>
+          </a:fontRef>
+        </p:style>
+        <p:txBody>
+          <a:bodyPr rtlCol="0" anchor="ctr"/>
+          <a:lstStyle/>
+          <a:p>
+            <a:pPr algn="ctr"/>
+            <a:r>
+              <a:rPr lang="en-US" sz="2400" b="1" dirty="0">
+                <a:solidFill>
+                  <a:schemeClr val="tx1"/>
+                </a:solidFill>
+              </a:rPr>
+              <a:t>Raspberry Pi</a:t>
+            </a:r>
+          </a:p>
+          <a:p>
+            <a:pPr algn="ctr"/>
+            <a:r>
+              <a:rPr lang="en-US" sz="2400" b="1" dirty="0">
+                <a:solidFill>
+                  <a:schemeClr val="tx1"/>
+                </a:solidFill>
+              </a:rPr>
+              <a:t>Pico</a:t>
+            </a:r>
+          </a:p>
+        </p:txBody>
+      </p:sp>
+      <p:cxnSp>
+        <p:nvCxnSpPr>
+          <p:cNvPr id="10" name="Straight Arrow Connector 9">
+            <a:extLst>
+              <a:ext uri="{FF2B5EF4-FFF2-40B4-BE49-F238E27FC236}">
+                <a16:creationId xmlns:a16="http://schemas.microsoft.com/office/drawing/2014/main" id="{BCF1FA16-123C-C04D-91C5-87842992BC8C}"/>
+              </a:ext>
+            </a:extLst>
+          </p:cNvPr>
+          <p:cNvCxnSpPr>
+            <a:stCxn id="5" idx="3"/>
+          </p:cNvCxnSpPr>
+          <p:nvPr/>
+        </p:nvCxnSpPr>
+        <p:spPr>
+          <a:xfrm>
+            <a:off x="3733801" y="2743201"/>
+            <a:ext cx="783771" cy="685799"/>
+          </a:xfrm>
+          <a:prstGeom prst="straightConnector1">
+            <a:avLst/>
+          </a:prstGeom>
+          <a:ln w="57150">
+            <a:solidFill>
+              <a:schemeClr val="tx1"/>
+            </a:solidFill>
+            <a:tailEnd type="triangle"/>
+          </a:ln>
+        </p:spPr>
+        <p:style>
+          <a:lnRef idx="1">
+            <a:schemeClr val="accent1"/>
+          </a:lnRef>
+          <a:fillRef idx="0">
+            <a:schemeClr val="accent1"/>
+          </a:fillRef>
+          <a:effectRef idx="0">
+            <a:schemeClr val="accent1"/>
+          </a:effectRef>
+          <a:fontRef idx="minor">
+            <a:schemeClr val="tx1"/>
+          </a:fontRef>
+        </p:style>
+      </p:cxnSp>
+      <p:cxnSp>
+        <p:nvCxnSpPr>
+          <p:cNvPr id="11" name="Straight Arrow Connector 10">
+            <a:extLst>
+              <a:ext uri="{FF2B5EF4-FFF2-40B4-BE49-F238E27FC236}">
+                <a16:creationId xmlns:a16="http://schemas.microsoft.com/office/drawing/2014/main" id="{57757574-4FEA-7F44-BB17-553C236E2BBE}"/>
+              </a:ext>
+            </a:extLst>
+          </p:cNvPr>
+          <p:cNvCxnSpPr>
+            <a:cxnSpLocks/>
+            <a:stCxn id="4" idx="3"/>
+          </p:cNvCxnSpPr>
+          <p:nvPr/>
+        </p:nvCxnSpPr>
+        <p:spPr>
+          <a:xfrm>
+            <a:off x="3733799" y="3429000"/>
+            <a:ext cx="783771" cy="254792"/>
+          </a:xfrm>
+          <a:prstGeom prst="straightConnector1">
+            <a:avLst/>
+          </a:prstGeom>
+          <a:ln w="57150">
+            <a:solidFill>
+              <a:schemeClr val="tx1"/>
+            </a:solidFill>
+            <a:tailEnd type="triangle"/>
+          </a:ln>
+        </p:spPr>
+        <p:style>
+          <a:lnRef idx="1">
+            <a:schemeClr val="accent1"/>
+          </a:lnRef>
+          <a:fillRef idx="0">
+            <a:schemeClr val="accent1"/>
+          </a:fillRef>
+          <a:effectRef idx="0">
+            <a:schemeClr val="accent1"/>
+          </a:effectRef>
+          <a:fontRef idx="minor">
+            <a:schemeClr val="tx1"/>
+          </a:fontRef>
+        </p:style>
+      </p:cxnSp>
+      <p:cxnSp>
+        <p:nvCxnSpPr>
+          <p:cNvPr id="14" name="Straight Arrow Connector 13">
+            <a:extLst>
+              <a:ext uri="{FF2B5EF4-FFF2-40B4-BE49-F238E27FC236}">
+                <a16:creationId xmlns:a16="http://schemas.microsoft.com/office/drawing/2014/main" id="{C380C91A-7886-3047-8C66-45C37317222D}"/>
+              </a:ext>
+            </a:extLst>
+          </p:cNvPr>
+          <p:cNvCxnSpPr>
+            <a:cxnSpLocks/>
+            <a:stCxn id="6" idx="3"/>
+          </p:cNvCxnSpPr>
+          <p:nvPr/>
+        </p:nvCxnSpPr>
+        <p:spPr>
+          <a:xfrm flipV="1">
+            <a:off x="3733799" y="3970564"/>
+            <a:ext cx="783771" cy="144235"/>
+          </a:xfrm>
+          <a:prstGeom prst="straightConnector1">
+            <a:avLst/>
+          </a:prstGeom>
+          <a:ln w="57150">
+            <a:solidFill>
+              <a:schemeClr val="tx1"/>
+            </a:solidFill>
+            <a:tailEnd type="triangle"/>
+          </a:ln>
+        </p:spPr>
+        <p:style>
+          <a:lnRef idx="1">
+            <a:schemeClr val="accent1"/>
+          </a:lnRef>
+          <a:fillRef idx="0">
+            <a:schemeClr val="accent1"/>
+          </a:fillRef>
+          <a:effectRef idx="0">
+            <a:schemeClr val="accent1"/>
+          </a:effectRef>
+          <a:fontRef idx="minor">
+            <a:schemeClr val="tx1"/>
+          </a:fontRef>
+        </p:style>
+      </p:cxnSp>
+      <p:cxnSp>
+        <p:nvCxnSpPr>
+          <p:cNvPr id="17" name="Straight Arrow Connector 16">
+            <a:extLst>
+              <a:ext uri="{FF2B5EF4-FFF2-40B4-BE49-F238E27FC236}">
+                <a16:creationId xmlns:a16="http://schemas.microsoft.com/office/drawing/2014/main" id="{FB2EBF8F-7BEC-314C-B2B3-C2264A914BD8}"/>
+              </a:ext>
+            </a:extLst>
+          </p:cNvPr>
+          <p:cNvCxnSpPr>
+            <a:cxnSpLocks/>
+            <a:stCxn id="7" idx="3"/>
+          </p:cNvCxnSpPr>
+          <p:nvPr/>
+        </p:nvCxnSpPr>
+        <p:spPr>
+          <a:xfrm flipV="1">
+            <a:off x="3733799" y="4243613"/>
+            <a:ext cx="783769" cy="580800"/>
+          </a:xfrm>
+          <a:prstGeom prst="straightConnector1">
+            <a:avLst/>
+          </a:prstGeom>
+          <a:ln w="57150">
+            <a:solidFill>
+              <a:schemeClr val="tx1"/>
+            </a:solidFill>
+            <a:tailEnd type="triangle"/>
+          </a:ln>
+        </p:spPr>
+        <p:style>
+          <a:lnRef idx="1">
+            <a:schemeClr val="accent1"/>
+          </a:lnRef>
+          <a:fillRef idx="0">
+            <a:schemeClr val="accent1"/>
+          </a:fillRef>
+          <a:effectRef idx="0">
+            <a:schemeClr val="accent1"/>
+          </a:effectRef>
+          <a:fontRef idx="minor">
+            <a:schemeClr val="tx1"/>
+          </a:fontRef>
+        </p:style>
+      </p:cxnSp>
+      <p:sp>
+        <p:nvSpPr>
+          <p:cNvPr id="20" name="Rectangle 19">
+            <a:extLst>
+              <a:ext uri="{FF2B5EF4-FFF2-40B4-BE49-F238E27FC236}">
+                <a16:creationId xmlns:a16="http://schemas.microsoft.com/office/drawing/2014/main" id="{1BD6CE95-3C27-0743-A8DD-81BEACEA34F2}"/>
+              </a:ext>
+            </a:extLst>
+          </p:cNvPr>
+          <p:cNvSpPr/>
+          <p:nvPr/>
+        </p:nvSpPr>
+        <p:spPr>
+          <a:xfrm>
+            <a:off x="7598221" y="2522766"/>
+            <a:ext cx="1273636" cy="576942"/>
+          </a:xfrm>
+          <a:prstGeom prst="rect">
+            <a:avLst/>
+          </a:prstGeom>
+          <a:solidFill>
+            <a:srgbClr val="00B050"/>
+          </a:solidFill>
+          <a:ln w="28575">
+            <a:solidFill>
+              <a:schemeClr val="tx1"/>
+            </a:solidFill>
+          </a:ln>
+        </p:spPr>
+        <p:style>
+          <a:lnRef idx="2">
+            <a:schemeClr val="accent1">
+              <a:shade val="50000"/>
+            </a:schemeClr>
+          </a:lnRef>
+          <a:fillRef idx="1">
+            <a:schemeClr val="accent1"/>
+          </a:fillRef>
+          <a:effectRef idx="0">
+            <a:schemeClr val="accent1"/>
+          </a:effectRef>
+          <a:fontRef idx="minor">
+            <a:schemeClr val="lt1"/>
+          </a:fontRef>
+        </p:style>
+        <p:txBody>
+          <a:bodyPr rtlCol="0" anchor="ctr"/>
+          <a:lstStyle/>
+          <a:p>
+            <a:pPr algn="ctr"/>
+            <a:r>
+              <a:rPr lang="en-US" dirty="0">
+                <a:solidFill>
+                  <a:schemeClr val="tx1"/>
+                </a:solidFill>
+              </a:rPr>
+              <a:t>Motor</a:t>
+            </a:r>
+          </a:p>
+        </p:txBody>
+      </p:sp>
+      <p:sp>
+        <p:nvSpPr>
+          <p:cNvPr id="21" name="Rectangle 20">
+            <a:extLst>
+              <a:ext uri="{FF2B5EF4-FFF2-40B4-BE49-F238E27FC236}">
+                <a16:creationId xmlns:a16="http://schemas.microsoft.com/office/drawing/2014/main" id="{E489E27C-DA9F-5443-9F4A-EA38A3F08948}"/>
+              </a:ext>
+            </a:extLst>
+          </p:cNvPr>
+          <p:cNvSpPr/>
+          <p:nvPr/>
+        </p:nvSpPr>
+        <p:spPr>
+          <a:xfrm>
+            <a:off x="7598221" y="3158673"/>
+            <a:ext cx="1273636" cy="576942"/>
+          </a:xfrm>
+          <a:prstGeom prst="rect">
+            <a:avLst/>
+          </a:prstGeom>
+          <a:solidFill>
+            <a:srgbClr val="00B050"/>
+          </a:solidFill>
+          <a:ln w="28575">
+            <a:solidFill>
+              <a:schemeClr val="tx1"/>
+            </a:solidFill>
+          </a:ln>
+        </p:spPr>
+        <p:style>
+          <a:lnRef idx="2">
+            <a:schemeClr val="accent1">
+              <a:shade val="50000"/>
+            </a:schemeClr>
+          </a:lnRef>
+          <a:fillRef idx="1">
+            <a:schemeClr val="accent1"/>
+          </a:fillRef>
+          <a:effectRef idx="0">
+            <a:schemeClr val="accent1"/>
+          </a:effectRef>
+          <a:fontRef idx="minor">
+            <a:schemeClr val="lt1"/>
+          </a:fontRef>
+        </p:style>
+        <p:txBody>
+          <a:bodyPr rtlCol="0" anchor="ctr"/>
+          <a:lstStyle/>
+          <a:p>
+            <a:pPr algn="ctr"/>
+            <a:r>
+              <a:rPr lang="en-US" dirty="0">
+                <a:solidFill>
+                  <a:schemeClr val="tx1"/>
+                </a:solidFill>
+              </a:rPr>
+              <a:t>Servo</a:t>
+            </a:r>
+          </a:p>
+        </p:txBody>
+      </p:sp>
+      <p:sp>
+        <p:nvSpPr>
+          <p:cNvPr id="22" name="Rectangle 21">
+            <a:extLst>
+              <a:ext uri="{FF2B5EF4-FFF2-40B4-BE49-F238E27FC236}">
+                <a16:creationId xmlns:a16="http://schemas.microsoft.com/office/drawing/2014/main" id="{72D333B7-7F9F-3042-9954-97C939B693EC}"/>
+              </a:ext>
+            </a:extLst>
+          </p:cNvPr>
+          <p:cNvSpPr/>
+          <p:nvPr/>
+        </p:nvSpPr>
+        <p:spPr>
+          <a:xfrm>
+            <a:off x="7598221" y="3831771"/>
+            <a:ext cx="1273636" cy="576942"/>
+          </a:xfrm>
+          <a:prstGeom prst="rect">
+            <a:avLst/>
+          </a:prstGeom>
+          <a:solidFill>
+            <a:srgbClr val="00B050"/>
+          </a:solidFill>
+          <a:ln w="28575">
+            <a:solidFill>
+              <a:schemeClr val="tx1"/>
+            </a:solidFill>
+          </a:ln>
+        </p:spPr>
+        <p:style>
+          <a:lnRef idx="2">
+            <a:schemeClr val="accent1">
+              <a:shade val="50000"/>
+            </a:schemeClr>
+          </a:lnRef>
+          <a:fillRef idx="1">
+            <a:schemeClr val="accent1"/>
+          </a:fillRef>
+          <a:effectRef idx="0">
+            <a:schemeClr val="accent1"/>
+          </a:effectRef>
+          <a:fontRef idx="minor">
+            <a:schemeClr val="lt1"/>
+          </a:fontRef>
+        </p:style>
+        <p:txBody>
+          <a:bodyPr rtlCol="0" anchor="ctr"/>
+          <a:lstStyle/>
+          <a:p>
+            <a:pPr algn="ctr"/>
+            <a:r>
+              <a:rPr lang="en-US" dirty="0">
+                <a:solidFill>
+                  <a:schemeClr val="tx1"/>
+                </a:solidFill>
+              </a:rPr>
+              <a:t>LED</a:t>
+            </a:r>
+          </a:p>
+        </p:txBody>
+      </p:sp>
+      <p:sp>
+        <p:nvSpPr>
+          <p:cNvPr id="23" name="Rectangle 22">
+            <a:extLst>
+              <a:ext uri="{FF2B5EF4-FFF2-40B4-BE49-F238E27FC236}">
+                <a16:creationId xmlns:a16="http://schemas.microsoft.com/office/drawing/2014/main" id="{192A7DCB-BEB2-D944-8B0E-8BE7F348D80B}"/>
+              </a:ext>
+            </a:extLst>
+          </p:cNvPr>
+          <p:cNvSpPr/>
+          <p:nvPr/>
+        </p:nvSpPr>
+        <p:spPr>
+          <a:xfrm>
+            <a:off x="7598221" y="4488771"/>
+            <a:ext cx="1273636" cy="576942"/>
+          </a:xfrm>
+          <a:prstGeom prst="rect">
+            <a:avLst/>
+          </a:prstGeom>
+          <a:solidFill>
+            <a:srgbClr val="00B050"/>
+          </a:solidFill>
+          <a:ln w="28575">
+            <a:solidFill>
+              <a:schemeClr val="tx1"/>
+            </a:solidFill>
+          </a:ln>
+        </p:spPr>
+        <p:style>
+          <a:lnRef idx="2">
+            <a:schemeClr val="accent1">
+              <a:shade val="50000"/>
+            </a:schemeClr>
+          </a:lnRef>
+          <a:fillRef idx="1">
+            <a:schemeClr val="accent1"/>
+          </a:fillRef>
+          <a:effectRef idx="0">
+            <a:schemeClr val="accent1"/>
+          </a:effectRef>
+          <a:fontRef idx="minor">
+            <a:schemeClr val="lt1"/>
+          </a:fontRef>
+        </p:style>
+        <p:txBody>
+          <a:bodyPr rtlCol="0" anchor="ctr"/>
+          <a:lstStyle/>
+          <a:p>
+            <a:pPr algn="ctr"/>
+            <a:r>
+              <a:rPr lang="en-US" dirty="0">
+                <a:solidFill>
+                  <a:schemeClr val="tx1"/>
+                </a:solidFill>
+              </a:rPr>
+              <a:t>Display</a:t>
+            </a:r>
+          </a:p>
+        </p:txBody>
+      </p:sp>
+      <p:cxnSp>
+        <p:nvCxnSpPr>
+          <p:cNvPr id="24" name="Straight Arrow Connector 23">
+            <a:extLst>
+              <a:ext uri="{FF2B5EF4-FFF2-40B4-BE49-F238E27FC236}">
+                <a16:creationId xmlns:a16="http://schemas.microsoft.com/office/drawing/2014/main" id="{8B88448C-63D6-CC43-B591-B6301AAEFA6B}"/>
+              </a:ext>
+            </a:extLst>
+          </p:cNvPr>
+          <p:cNvCxnSpPr>
+            <a:cxnSpLocks/>
+            <a:endCxn id="20" idx="1"/>
+          </p:cNvCxnSpPr>
+          <p:nvPr/>
+        </p:nvCxnSpPr>
+        <p:spPr>
+          <a:xfrm flipV="1">
+            <a:off x="6814454" y="2811237"/>
+            <a:ext cx="783767" cy="660968"/>
+          </a:xfrm>
+          <a:prstGeom prst="straightConnector1">
+            <a:avLst/>
+          </a:prstGeom>
+          <a:ln w="57150">
+            <a:solidFill>
+              <a:schemeClr val="tx1"/>
+            </a:solidFill>
+            <a:tailEnd type="triangle"/>
+          </a:ln>
+        </p:spPr>
+        <p:style>
+          <a:lnRef idx="1">
+            <a:schemeClr val="accent1"/>
+          </a:lnRef>
+          <a:fillRef idx="0">
+            <a:schemeClr val="accent1"/>
+          </a:fillRef>
+          <a:effectRef idx="0">
+            <a:schemeClr val="accent1"/>
+          </a:effectRef>
+          <a:fontRef idx="minor">
+            <a:schemeClr val="tx1"/>
+          </a:fontRef>
+        </p:style>
+      </p:cxnSp>
+      <p:cxnSp>
+        <p:nvCxnSpPr>
+          <p:cNvPr id="28" name="Straight Arrow Connector 27">
+            <a:extLst>
+              <a:ext uri="{FF2B5EF4-FFF2-40B4-BE49-F238E27FC236}">
+                <a16:creationId xmlns:a16="http://schemas.microsoft.com/office/drawing/2014/main" id="{9462C1F5-8D8E-FA49-BF66-F246B2828481}"/>
+              </a:ext>
+            </a:extLst>
+          </p:cNvPr>
+          <p:cNvCxnSpPr>
+            <a:cxnSpLocks/>
+            <a:endCxn id="21" idx="1"/>
+          </p:cNvCxnSpPr>
+          <p:nvPr/>
+        </p:nvCxnSpPr>
+        <p:spPr>
+          <a:xfrm flipV="1">
+            <a:off x="6814452" y="3447144"/>
+            <a:ext cx="783769" cy="255867"/>
+          </a:xfrm>
+          <a:prstGeom prst="straightConnector1">
+            <a:avLst/>
+          </a:prstGeom>
+          <a:ln w="57150">
+            <a:solidFill>
+              <a:schemeClr val="tx1"/>
+            </a:solidFill>
+            <a:tailEnd type="triangle"/>
+          </a:ln>
+        </p:spPr>
+        <p:style>
+          <a:lnRef idx="1">
+            <a:schemeClr val="accent1"/>
+          </a:lnRef>
+          <a:fillRef idx="0">
+            <a:schemeClr val="accent1"/>
+          </a:fillRef>
+          <a:effectRef idx="0">
+            <a:schemeClr val="accent1"/>
+          </a:effectRef>
+          <a:fontRef idx="minor">
+            <a:schemeClr val="tx1"/>
+          </a:fontRef>
+        </p:style>
+      </p:cxnSp>
+      <p:cxnSp>
+        <p:nvCxnSpPr>
+          <p:cNvPr id="31" name="Straight Arrow Connector 30">
+            <a:extLst>
+              <a:ext uri="{FF2B5EF4-FFF2-40B4-BE49-F238E27FC236}">
+                <a16:creationId xmlns:a16="http://schemas.microsoft.com/office/drawing/2014/main" id="{DADAFE9B-11B0-944F-9F70-098D116B8429}"/>
+              </a:ext>
+            </a:extLst>
+          </p:cNvPr>
+          <p:cNvCxnSpPr>
+            <a:cxnSpLocks/>
+            <a:endCxn id="22" idx="1"/>
+          </p:cNvCxnSpPr>
+          <p:nvPr/>
+        </p:nvCxnSpPr>
+        <p:spPr>
+          <a:xfrm>
+            <a:off x="6814452" y="3954804"/>
+            <a:ext cx="783769" cy="165438"/>
+          </a:xfrm>
+          <a:prstGeom prst="straightConnector1">
+            <a:avLst/>
+          </a:prstGeom>
+          <a:ln w="57150">
+            <a:solidFill>
+              <a:schemeClr val="tx1"/>
+            </a:solidFill>
+            <a:tailEnd type="triangle"/>
+          </a:ln>
+        </p:spPr>
+        <p:style>
+          <a:lnRef idx="1">
+            <a:schemeClr val="accent1"/>
+          </a:lnRef>
+          <a:fillRef idx="0">
+            <a:schemeClr val="accent1"/>
+          </a:fillRef>
+          <a:effectRef idx="0">
+            <a:schemeClr val="accent1"/>
+          </a:effectRef>
+          <a:fontRef idx="minor">
+            <a:schemeClr val="tx1"/>
+          </a:fontRef>
+        </p:style>
+      </p:cxnSp>
+      <p:cxnSp>
+        <p:nvCxnSpPr>
+          <p:cNvPr id="34" name="Straight Arrow Connector 33">
+            <a:extLst>
+              <a:ext uri="{FF2B5EF4-FFF2-40B4-BE49-F238E27FC236}">
+                <a16:creationId xmlns:a16="http://schemas.microsoft.com/office/drawing/2014/main" id="{F4A69DD9-4B9C-B349-BA0D-8DB2380B3999}"/>
+              </a:ext>
+            </a:extLst>
+          </p:cNvPr>
+          <p:cNvCxnSpPr>
+            <a:cxnSpLocks/>
+            <a:endCxn id="23" idx="1"/>
+          </p:cNvCxnSpPr>
+          <p:nvPr/>
+        </p:nvCxnSpPr>
+        <p:spPr>
+          <a:xfrm>
+            <a:off x="6814450" y="4185610"/>
+            <a:ext cx="783771" cy="591632"/>
+          </a:xfrm>
+          <a:prstGeom prst="straightConnector1">
+            <a:avLst/>
+          </a:prstGeom>
+          <a:ln w="57150">
+            <a:solidFill>
+              <a:schemeClr val="tx1"/>
+            </a:solidFill>
+            <a:tailEnd type="triangle"/>
+          </a:ln>
+        </p:spPr>
+        <p:style>
+          <a:lnRef idx="1">
+            <a:schemeClr val="accent1"/>
+          </a:lnRef>
+          <a:fillRef idx="0">
+            <a:schemeClr val="accent1"/>
+          </a:fillRef>
+          <a:effectRef idx="0">
+            <a:schemeClr val="accent1"/>
+          </a:effectRef>
+          <a:fontRef idx="minor">
+            <a:schemeClr val="tx1"/>
+          </a:fontRef>
+        </p:style>
+      </p:cxnSp>
+    </p:spTree>
+    <p:extLst>
+      <p:ext uri="{BB962C8B-B14F-4D97-AF65-F5344CB8AC3E}">
+        <p14:creationId xmlns:p14="http://schemas.microsoft.com/office/powerpoint/2010/main" val="1636464638"/>
       </p:ext>
     </p:extLst>
   </p:cSld>

</xml_diff>

<commit_message>
Deployed 9b0e8a2 with MkDocs version: 1.1.2
</commit_message>
<xml_diff>
--- a/img/figures.pptx
+++ b/img/figures.pptx
@@ -8,6 +8,7 @@
     <p:sldId id="256" r:id="rId2"/>
     <p:sldId id="257" r:id="rId3"/>
     <p:sldId id="258" r:id="rId4"/>
+    <p:sldId id="259" r:id="rId5"/>
   </p:sldIdLst>
   <p:sldSz cx="12192000" cy="6858000"/>
   <p:notesSz cx="6858000" cy="9144000"/>
@@ -106,6 +107,11 @@
       </a:defRPr>
     </a:lvl9pPr>
   </p:defaultTextStyle>
+  <p:extLst>
+    <p:ext uri="{EFAFB233-063F-42B5-8137-9DF3F51BA10A}">
+      <p15:sldGuideLst xmlns:p15="http://schemas.microsoft.com/office/powerpoint/2012/main"/>
+    </p:ext>
+  </p:extLst>
 </p:presentation>
 </file>
 
@@ -256,7 +262,7 @@
           <a:p>
             <a:fld id="{FD3A94D9-38B3-6A4F-AECD-4D297511D178}" type="datetimeFigureOut">
               <a:rPr lang="en-US" smtClean="0"/>
-              <a:t>2/14/21</a:t>
+              <a:t>2/20/21</a:t>
             </a:fld>
             <a:endParaRPr lang="en-US"/>
           </a:p>
@@ -454,7 +460,7 @@
           <a:p>
             <a:fld id="{FD3A94D9-38B3-6A4F-AECD-4D297511D178}" type="datetimeFigureOut">
               <a:rPr lang="en-US" smtClean="0"/>
-              <a:t>2/14/21</a:t>
+              <a:t>2/20/21</a:t>
             </a:fld>
             <a:endParaRPr lang="en-US"/>
           </a:p>
@@ -662,7 +668,7 @@
           <a:p>
             <a:fld id="{FD3A94D9-38B3-6A4F-AECD-4D297511D178}" type="datetimeFigureOut">
               <a:rPr lang="en-US" smtClean="0"/>
-              <a:t>2/14/21</a:t>
+              <a:t>2/20/21</a:t>
             </a:fld>
             <a:endParaRPr lang="en-US"/>
           </a:p>
@@ -860,7 +866,7 @@
           <a:p>
             <a:fld id="{FD3A94D9-38B3-6A4F-AECD-4D297511D178}" type="datetimeFigureOut">
               <a:rPr lang="en-US" smtClean="0"/>
-              <a:t>2/14/21</a:t>
+              <a:t>2/20/21</a:t>
             </a:fld>
             <a:endParaRPr lang="en-US"/>
           </a:p>
@@ -1135,7 +1141,7 @@
           <a:p>
             <a:fld id="{FD3A94D9-38B3-6A4F-AECD-4D297511D178}" type="datetimeFigureOut">
               <a:rPr lang="en-US" smtClean="0"/>
-              <a:t>2/14/21</a:t>
+              <a:t>2/20/21</a:t>
             </a:fld>
             <a:endParaRPr lang="en-US"/>
           </a:p>
@@ -1400,7 +1406,7 @@
           <a:p>
             <a:fld id="{FD3A94D9-38B3-6A4F-AECD-4D297511D178}" type="datetimeFigureOut">
               <a:rPr lang="en-US" smtClean="0"/>
-              <a:t>2/14/21</a:t>
+              <a:t>2/20/21</a:t>
             </a:fld>
             <a:endParaRPr lang="en-US"/>
           </a:p>
@@ -1812,7 +1818,7 @@
           <a:p>
             <a:fld id="{FD3A94D9-38B3-6A4F-AECD-4D297511D178}" type="datetimeFigureOut">
               <a:rPr lang="en-US" smtClean="0"/>
-              <a:t>2/14/21</a:t>
+              <a:t>2/20/21</a:t>
             </a:fld>
             <a:endParaRPr lang="en-US"/>
           </a:p>
@@ -1953,7 +1959,7 @@
           <a:p>
             <a:fld id="{FD3A94D9-38B3-6A4F-AECD-4D297511D178}" type="datetimeFigureOut">
               <a:rPr lang="en-US" smtClean="0"/>
-              <a:t>2/14/21</a:t>
+              <a:t>2/20/21</a:t>
             </a:fld>
             <a:endParaRPr lang="en-US"/>
           </a:p>
@@ -2066,7 +2072,7 @@
           <a:p>
             <a:fld id="{FD3A94D9-38B3-6A4F-AECD-4D297511D178}" type="datetimeFigureOut">
               <a:rPr lang="en-US" smtClean="0"/>
-              <a:t>2/14/21</a:t>
+              <a:t>2/20/21</a:t>
             </a:fld>
             <a:endParaRPr lang="en-US"/>
           </a:p>
@@ -2377,7 +2383,7 @@
           <a:p>
             <a:fld id="{FD3A94D9-38B3-6A4F-AECD-4D297511D178}" type="datetimeFigureOut">
               <a:rPr lang="en-US" smtClean="0"/>
-              <a:t>2/14/21</a:t>
+              <a:t>2/20/21</a:t>
             </a:fld>
             <a:endParaRPr lang="en-US"/>
           </a:p>
@@ -2665,7 +2671,7 @@
           <a:p>
             <a:fld id="{FD3A94D9-38B3-6A4F-AECD-4D297511D178}" type="datetimeFigureOut">
               <a:rPr lang="en-US" smtClean="0"/>
-              <a:t>2/14/21</a:t>
+              <a:t>2/20/21</a:t>
             </a:fld>
             <a:endParaRPr lang="en-US"/>
           </a:p>
@@ -2906,7 +2912,7 @@
           <a:p>
             <a:fld id="{FD3A94D9-38B3-6A4F-AECD-4D297511D178}" type="datetimeFigureOut">
               <a:rPr lang="en-US" smtClean="0"/>
-              <a:t>2/14/21</a:t>
+              <a:t>2/20/21</a:t>
             </a:fld>
             <a:endParaRPr lang="en-US"/>
           </a:p>
@@ -4653,6 +4659,445 @@
 </p:sld>
 </file>
 
+<file path=ppt/slides/slide4.xml><?xml version="1.0" encoding="utf-8"?>
+<p:sld xmlns:a="http://schemas.openxmlformats.org/drawingml/2006/main" xmlns:r="http://schemas.openxmlformats.org/officeDocument/2006/relationships" xmlns:p="http://schemas.openxmlformats.org/presentationml/2006/main">
+  <p:cSld>
+    <p:spTree>
+      <p:nvGrpSpPr>
+        <p:cNvPr id="1" name=""/>
+        <p:cNvGrpSpPr/>
+        <p:nvPr/>
+      </p:nvGrpSpPr>
+      <p:grpSpPr>
+        <a:xfrm>
+          <a:off x="0" y="0"/>
+          <a:ext cx="0" cy="0"/>
+          <a:chOff x="0" y="0"/>
+          <a:chExt cx="0" cy="0"/>
+        </a:xfrm>
+      </p:grpSpPr>
+      <p:sp>
+        <p:nvSpPr>
+          <p:cNvPr id="2" name="Title 1">
+            <a:extLst>
+              <a:ext uri="{FF2B5EF4-FFF2-40B4-BE49-F238E27FC236}">
+                <a16:creationId xmlns:a16="http://schemas.microsoft.com/office/drawing/2014/main" id="{ED13992E-ACB0-5F43-B6DB-E512889979BD}"/>
+              </a:ext>
+            </a:extLst>
+          </p:cNvPr>
+          <p:cNvSpPr>
+            <a:spLocks noGrp="1"/>
+          </p:cNvSpPr>
+          <p:nvPr>
+            <p:ph type="title"/>
+          </p:nvPr>
+        </p:nvSpPr>
+        <p:spPr/>
+        <p:txBody>
+          <a:bodyPr/>
+          <a:lstStyle/>
+          <a:p>
+            <a:endParaRPr lang="en-US" dirty="0"/>
+          </a:p>
+        </p:txBody>
+      </p:sp>
+      <p:sp>
+        <p:nvSpPr>
+          <p:cNvPr id="3" name="Content Placeholder 2">
+            <a:extLst>
+              <a:ext uri="{FF2B5EF4-FFF2-40B4-BE49-F238E27FC236}">
+                <a16:creationId xmlns:a16="http://schemas.microsoft.com/office/drawing/2014/main" id="{22F8F27B-C275-E04C-A244-980B55B9ECF2}"/>
+              </a:ext>
+            </a:extLst>
+          </p:cNvPr>
+          <p:cNvSpPr>
+            <a:spLocks noGrp="1"/>
+          </p:cNvSpPr>
+          <p:nvPr>
+            <p:ph idx="1"/>
+          </p:nvPr>
+        </p:nvSpPr>
+        <p:spPr>
+          <a:xfrm>
+            <a:off x="838200" y="5040085"/>
+            <a:ext cx="10515600" cy="1136877"/>
+          </a:xfrm>
+        </p:spPr>
+        <p:txBody>
+          <a:bodyPr/>
+          <a:lstStyle/>
+          <a:p>
+            <a:endParaRPr lang="en-US" dirty="0"/>
+          </a:p>
+        </p:txBody>
+      </p:sp>
+      <p:pic>
+        <p:nvPicPr>
+          <p:cNvPr id="4" name="Picture 3">
+            <a:extLst>
+              <a:ext uri="{FF2B5EF4-FFF2-40B4-BE49-F238E27FC236}">
+                <a16:creationId xmlns:a16="http://schemas.microsoft.com/office/drawing/2014/main" id="{7643E78D-C933-2D42-931D-154167148B98}"/>
+              </a:ext>
+            </a:extLst>
+          </p:cNvPr>
+          <p:cNvPicPr>
+            <a:picLocks noChangeAspect="1"/>
+          </p:cNvPicPr>
+          <p:nvPr/>
+        </p:nvPicPr>
+        <p:blipFill>
+          <a:blip r:embed="rId2"/>
+          <a:stretch>
+            <a:fillRect/>
+          </a:stretch>
+        </p:blipFill>
+        <p:spPr>
+          <a:xfrm>
+            <a:off x="2042743" y="2188936"/>
+            <a:ext cx="3449100" cy="2002064"/>
+          </a:xfrm>
+          <a:prstGeom prst="rect">
+            <a:avLst/>
+          </a:prstGeom>
+        </p:spPr>
+      </p:pic>
+      <p:cxnSp>
+        <p:nvCxnSpPr>
+          <p:cNvPr id="6" name="Straight Arrow Connector 5">
+            <a:extLst>
+              <a:ext uri="{FF2B5EF4-FFF2-40B4-BE49-F238E27FC236}">
+                <a16:creationId xmlns:a16="http://schemas.microsoft.com/office/drawing/2014/main" id="{15088092-AE27-A14F-8EC7-6B3EF2528DCB}"/>
+              </a:ext>
+            </a:extLst>
+          </p:cNvPr>
+          <p:cNvCxnSpPr/>
+          <p:nvPr/>
+        </p:nvCxnSpPr>
+        <p:spPr>
+          <a:xfrm flipH="1">
+            <a:off x="5617028" y="3038814"/>
+            <a:ext cx="957943" cy="217715"/>
+          </a:xfrm>
+          <a:prstGeom prst="straightConnector1">
+            <a:avLst/>
+          </a:prstGeom>
+          <a:ln w="38100">
+            <a:solidFill>
+              <a:srgbClr val="FF0000"/>
+            </a:solidFill>
+            <a:tailEnd type="triangle"/>
+          </a:ln>
+        </p:spPr>
+        <p:style>
+          <a:lnRef idx="1">
+            <a:schemeClr val="accent1"/>
+          </a:lnRef>
+          <a:fillRef idx="0">
+            <a:schemeClr val="accent1"/>
+          </a:fillRef>
+          <a:effectRef idx="0">
+            <a:schemeClr val="accent1"/>
+          </a:effectRef>
+          <a:fontRef idx="minor">
+            <a:schemeClr val="tx1"/>
+          </a:fontRef>
+        </p:style>
+      </p:cxnSp>
+      <p:cxnSp>
+        <p:nvCxnSpPr>
+          <p:cNvPr id="7" name="Straight Arrow Connector 6">
+            <a:extLst>
+              <a:ext uri="{FF2B5EF4-FFF2-40B4-BE49-F238E27FC236}">
+                <a16:creationId xmlns:a16="http://schemas.microsoft.com/office/drawing/2014/main" id="{B53A1370-833E-674D-A08D-8555DB5A2CBC}"/>
+              </a:ext>
+            </a:extLst>
+          </p:cNvPr>
+          <p:cNvCxnSpPr/>
+          <p:nvPr/>
+        </p:nvCxnSpPr>
+        <p:spPr>
+          <a:xfrm flipH="1">
+            <a:off x="5617027" y="3429000"/>
+            <a:ext cx="957943" cy="217715"/>
+          </a:xfrm>
+          <a:prstGeom prst="straightConnector1">
+            <a:avLst/>
+          </a:prstGeom>
+          <a:ln w="38100">
+            <a:solidFill>
+              <a:schemeClr val="tx1"/>
+            </a:solidFill>
+            <a:tailEnd type="triangle"/>
+          </a:ln>
+        </p:spPr>
+        <p:style>
+          <a:lnRef idx="1">
+            <a:schemeClr val="accent1"/>
+          </a:lnRef>
+          <a:fillRef idx="0">
+            <a:schemeClr val="accent1"/>
+          </a:fillRef>
+          <a:effectRef idx="0">
+            <a:schemeClr val="accent1"/>
+          </a:effectRef>
+          <a:fontRef idx="minor">
+            <a:schemeClr val="tx1"/>
+          </a:fontRef>
+        </p:style>
+      </p:cxnSp>
+      <p:cxnSp>
+        <p:nvCxnSpPr>
+          <p:cNvPr id="8" name="Straight Arrow Connector 7">
+            <a:extLst>
+              <a:ext uri="{FF2B5EF4-FFF2-40B4-BE49-F238E27FC236}">
+                <a16:creationId xmlns:a16="http://schemas.microsoft.com/office/drawing/2014/main" id="{537982A4-1F6F-5348-8A97-D7237304EBA3}"/>
+              </a:ext>
+            </a:extLst>
+          </p:cNvPr>
+          <p:cNvCxnSpPr>
+            <a:cxnSpLocks/>
+          </p:cNvCxnSpPr>
+          <p:nvPr/>
+        </p:nvCxnSpPr>
+        <p:spPr>
+          <a:xfrm>
+            <a:off x="1322614" y="3065801"/>
+            <a:ext cx="720129" cy="163740"/>
+          </a:xfrm>
+          <a:prstGeom prst="straightConnector1">
+            <a:avLst/>
+          </a:prstGeom>
+          <a:ln w="38100">
+            <a:solidFill>
+              <a:schemeClr val="accent1"/>
+            </a:solidFill>
+            <a:tailEnd type="triangle"/>
+          </a:ln>
+        </p:spPr>
+        <p:style>
+          <a:lnRef idx="1">
+            <a:schemeClr val="accent1"/>
+          </a:lnRef>
+          <a:fillRef idx="0">
+            <a:schemeClr val="accent1"/>
+          </a:fillRef>
+          <a:effectRef idx="0">
+            <a:schemeClr val="accent1"/>
+          </a:effectRef>
+          <a:fontRef idx="minor">
+            <a:schemeClr val="tx1"/>
+          </a:fontRef>
+        </p:style>
+      </p:cxnSp>
+      <p:sp>
+        <p:nvSpPr>
+          <p:cNvPr id="11" name="TextBox 10">
+            <a:extLst>
+              <a:ext uri="{FF2B5EF4-FFF2-40B4-BE49-F238E27FC236}">
+                <a16:creationId xmlns:a16="http://schemas.microsoft.com/office/drawing/2014/main" id="{8D76255C-F4B2-0649-9E64-4FF7B5096C57}"/>
+              </a:ext>
+            </a:extLst>
+          </p:cNvPr>
+          <p:cNvSpPr txBox="1"/>
+          <p:nvPr/>
+        </p:nvSpPr>
+        <p:spPr>
+          <a:xfrm>
+            <a:off x="759831" y="2811388"/>
+            <a:ext cx="562783" cy="369332"/>
+          </a:xfrm>
+          <a:prstGeom prst="rect">
+            <a:avLst/>
+          </a:prstGeom>
+          <a:noFill/>
+        </p:spPr>
+        <p:txBody>
+          <a:bodyPr wrap="none" rtlCol="0">
+            <a:spAutoFit/>
+          </a:bodyPr>
+          <a:lstStyle/>
+          <a:p>
+            <a:r>
+              <a:rPr lang="en-US" b="1" dirty="0">
+                <a:solidFill>
+                  <a:schemeClr val="accent1"/>
+                </a:solidFill>
+              </a:rPr>
+              <a:t>SDA</a:t>
+            </a:r>
+          </a:p>
+        </p:txBody>
+      </p:sp>
+      <p:sp>
+        <p:nvSpPr>
+          <p:cNvPr id="12" name="TextBox 11">
+            <a:extLst>
+              <a:ext uri="{FF2B5EF4-FFF2-40B4-BE49-F238E27FC236}">
+                <a16:creationId xmlns:a16="http://schemas.microsoft.com/office/drawing/2014/main" id="{FCC25A68-4D57-6E42-AEF0-B1C5EBF301A5}"/>
+              </a:ext>
+            </a:extLst>
+          </p:cNvPr>
+          <p:cNvSpPr txBox="1"/>
+          <p:nvPr/>
+        </p:nvSpPr>
+        <p:spPr>
+          <a:xfrm>
+            <a:off x="759831" y="3229541"/>
+            <a:ext cx="513282" cy="369332"/>
+          </a:xfrm>
+          <a:prstGeom prst="rect">
+            <a:avLst/>
+          </a:prstGeom>
+          <a:noFill/>
+        </p:spPr>
+        <p:txBody>
+          <a:bodyPr wrap="none" rtlCol="0">
+            <a:spAutoFit/>
+          </a:bodyPr>
+          <a:lstStyle/>
+          <a:p>
+            <a:r>
+              <a:rPr lang="en-US" b="1" dirty="0">
+                <a:solidFill>
+                  <a:srgbClr val="00B050"/>
+                </a:solidFill>
+              </a:rPr>
+              <a:t>SCL</a:t>
+            </a:r>
+          </a:p>
+        </p:txBody>
+      </p:sp>
+      <p:cxnSp>
+        <p:nvCxnSpPr>
+          <p:cNvPr id="13" name="Straight Arrow Connector 12">
+            <a:extLst>
+              <a:ext uri="{FF2B5EF4-FFF2-40B4-BE49-F238E27FC236}">
+                <a16:creationId xmlns:a16="http://schemas.microsoft.com/office/drawing/2014/main" id="{97942B8B-40A6-BD41-AF65-8FF787234B27}"/>
+              </a:ext>
+            </a:extLst>
+          </p:cNvPr>
+          <p:cNvCxnSpPr>
+            <a:cxnSpLocks/>
+          </p:cNvCxnSpPr>
+          <p:nvPr/>
+        </p:nvCxnSpPr>
+        <p:spPr>
+          <a:xfrm>
+            <a:off x="1300513" y="3429000"/>
+            <a:ext cx="617045" cy="1"/>
+          </a:xfrm>
+          <a:prstGeom prst="straightConnector1">
+            <a:avLst/>
+          </a:prstGeom>
+          <a:ln w="38100">
+            <a:solidFill>
+              <a:srgbClr val="00B050"/>
+            </a:solidFill>
+            <a:tailEnd type="triangle"/>
+          </a:ln>
+        </p:spPr>
+        <p:style>
+          <a:lnRef idx="1">
+            <a:schemeClr val="accent1"/>
+          </a:lnRef>
+          <a:fillRef idx="0">
+            <a:schemeClr val="accent1"/>
+          </a:fillRef>
+          <a:effectRef idx="0">
+            <a:schemeClr val="accent1"/>
+          </a:effectRef>
+          <a:fontRef idx="minor">
+            <a:schemeClr val="tx1"/>
+          </a:fontRef>
+        </p:style>
+      </p:cxnSp>
+      <p:sp>
+        <p:nvSpPr>
+          <p:cNvPr id="17" name="TextBox 16">
+            <a:extLst>
+              <a:ext uri="{FF2B5EF4-FFF2-40B4-BE49-F238E27FC236}">
+                <a16:creationId xmlns:a16="http://schemas.microsoft.com/office/drawing/2014/main" id="{C98757C1-4B5E-5144-8A5E-F39D55D389B3}"/>
+              </a:ext>
+            </a:extLst>
+          </p:cNvPr>
+          <p:cNvSpPr txBox="1"/>
+          <p:nvPr/>
+        </p:nvSpPr>
+        <p:spPr>
+          <a:xfrm>
+            <a:off x="6574970" y="2762568"/>
+            <a:ext cx="560859" cy="369332"/>
+          </a:xfrm>
+          <a:prstGeom prst="rect">
+            <a:avLst/>
+          </a:prstGeom>
+          <a:noFill/>
+        </p:spPr>
+        <p:txBody>
+          <a:bodyPr wrap="none" rtlCol="0">
+            <a:spAutoFit/>
+          </a:bodyPr>
+          <a:lstStyle/>
+          <a:p>
+            <a:r>
+              <a:rPr lang="en-US" b="1" dirty="0">
+                <a:solidFill>
+                  <a:srgbClr val="FF0000"/>
+                </a:solidFill>
+              </a:rPr>
+              <a:t>VCC</a:t>
+            </a:r>
+          </a:p>
+        </p:txBody>
+      </p:sp>
+      <p:sp>
+        <p:nvSpPr>
+          <p:cNvPr id="18" name="TextBox 17">
+            <a:extLst>
+              <a:ext uri="{FF2B5EF4-FFF2-40B4-BE49-F238E27FC236}">
+                <a16:creationId xmlns:a16="http://schemas.microsoft.com/office/drawing/2014/main" id="{8CCFEC83-EAEF-3541-9D76-7839B2CC2DDF}"/>
+              </a:ext>
+            </a:extLst>
+          </p:cNvPr>
+          <p:cNvSpPr txBox="1"/>
+          <p:nvPr/>
+        </p:nvSpPr>
+        <p:spPr>
+          <a:xfrm>
+            <a:off x="6574969" y="3223480"/>
+            <a:ext cx="630301" cy="369332"/>
+          </a:xfrm>
+          <a:prstGeom prst="rect">
+            <a:avLst/>
+          </a:prstGeom>
+          <a:noFill/>
+        </p:spPr>
+        <p:txBody>
+          <a:bodyPr wrap="none" rtlCol="0">
+            <a:spAutoFit/>
+          </a:bodyPr>
+          <a:lstStyle/>
+          <a:p>
+            <a:r>
+              <a:rPr lang="en-US" b="1" dirty="0"/>
+              <a:t>GND</a:t>
+            </a:r>
+          </a:p>
+        </p:txBody>
+      </p:sp>
+    </p:spTree>
+    <p:extLst>
+      <p:ext uri="{BB962C8B-B14F-4D97-AF65-F5344CB8AC3E}">
+        <p14:creationId xmlns:p14="http://schemas.microsoft.com/office/powerpoint/2010/main" val="749271388"/>
+      </p:ext>
+    </p:extLst>
+  </p:cSld>
+  <p:clrMapOvr>
+    <a:masterClrMapping/>
+  </p:clrMapOvr>
+</p:sld>
+</file>
+
 <file path=ppt/theme/theme1.xml><?xml version="1.0" encoding="utf-8"?>
 <a:theme xmlns:a="http://schemas.openxmlformats.org/drawingml/2006/main" name="Office Theme">
   <a:themeElements>

</xml_diff>

<commit_message>
Deployed 9a4fad7 with MkDocs version: 1.1.2
</commit_message>
<xml_diff>
--- a/img/figures.pptx
+++ b/img/figures.pptx
@@ -9,6 +9,8 @@
     <p:sldId id="257" r:id="rId3"/>
     <p:sldId id="258" r:id="rId4"/>
     <p:sldId id="259" r:id="rId5"/>
+    <p:sldId id="260" r:id="rId6"/>
+    <p:sldId id="261" r:id="rId7"/>
   </p:sldIdLst>
   <p:sldSz cx="12192000" cy="6858000"/>
   <p:notesSz cx="6858000" cy="9144000"/>
@@ -5098,6 +5100,410 @@
 </p:sld>
 </file>
 
+<file path=ppt/slides/slide5.xml><?xml version="1.0" encoding="utf-8"?>
+<p:sld xmlns:a="http://schemas.openxmlformats.org/drawingml/2006/main" xmlns:r="http://schemas.openxmlformats.org/officeDocument/2006/relationships" xmlns:p="http://schemas.openxmlformats.org/presentationml/2006/main">
+  <p:cSld>
+    <p:spTree>
+      <p:nvGrpSpPr>
+        <p:cNvPr id="1" name=""/>
+        <p:cNvGrpSpPr/>
+        <p:nvPr/>
+      </p:nvGrpSpPr>
+      <p:grpSpPr>
+        <a:xfrm>
+          <a:off x="0" y="0"/>
+          <a:ext cx="0" cy="0"/>
+          <a:chOff x="0" y="0"/>
+          <a:chExt cx="0" cy="0"/>
+        </a:xfrm>
+      </p:grpSpPr>
+      <p:sp>
+        <p:nvSpPr>
+          <p:cNvPr id="2" name="Title 1">
+            <a:extLst>
+              <a:ext uri="{FF2B5EF4-FFF2-40B4-BE49-F238E27FC236}">
+                <a16:creationId xmlns:a16="http://schemas.microsoft.com/office/drawing/2014/main" id="{090F35E0-3B45-1A49-85AF-00B3D04E56FE}"/>
+              </a:ext>
+            </a:extLst>
+          </p:cNvPr>
+          <p:cNvSpPr>
+            <a:spLocks noGrp="1"/>
+          </p:cNvSpPr>
+          <p:nvPr>
+            <p:ph type="title"/>
+          </p:nvPr>
+        </p:nvSpPr>
+        <p:spPr/>
+        <p:txBody>
+          <a:bodyPr/>
+          <a:lstStyle/>
+          <a:p>
+            <a:endParaRPr lang="en-US"/>
+          </a:p>
+        </p:txBody>
+      </p:sp>
+      <p:sp>
+        <p:nvSpPr>
+          <p:cNvPr id="3" name="Content Placeholder 2">
+            <a:extLst>
+              <a:ext uri="{FF2B5EF4-FFF2-40B4-BE49-F238E27FC236}">
+                <a16:creationId xmlns:a16="http://schemas.microsoft.com/office/drawing/2014/main" id="{35B0B27F-22DF-AD4B-ABD4-144696106E39}"/>
+              </a:ext>
+            </a:extLst>
+          </p:cNvPr>
+          <p:cNvSpPr>
+            <a:spLocks noGrp="1"/>
+          </p:cNvSpPr>
+          <p:nvPr>
+            <p:ph idx="1"/>
+          </p:nvPr>
+        </p:nvSpPr>
+        <p:spPr>
+          <a:xfrm>
+            <a:off x="838200" y="5791199"/>
+            <a:ext cx="10515600" cy="385763"/>
+          </a:xfrm>
+        </p:spPr>
+        <p:txBody>
+          <a:bodyPr/>
+          <a:lstStyle/>
+          <a:p>
+            <a:endParaRPr lang="en-US" dirty="0"/>
+          </a:p>
+        </p:txBody>
+      </p:sp>
+      <p:pic>
+        <p:nvPicPr>
+          <p:cNvPr id="4" name="Picture 3">
+            <a:extLst>
+              <a:ext uri="{FF2B5EF4-FFF2-40B4-BE49-F238E27FC236}">
+                <a16:creationId xmlns:a16="http://schemas.microsoft.com/office/drawing/2014/main" id="{64181C19-5C20-0A4D-B419-82929B9A84E3}"/>
+              </a:ext>
+            </a:extLst>
+          </p:cNvPr>
+          <p:cNvPicPr>
+            <a:picLocks noChangeAspect="1"/>
+          </p:cNvPicPr>
+          <p:nvPr/>
+        </p:nvPicPr>
+        <p:blipFill>
+          <a:blip r:embed="rId2"/>
+          <a:stretch>
+            <a:fillRect/>
+          </a:stretch>
+        </p:blipFill>
+        <p:spPr>
+          <a:xfrm>
+            <a:off x="3301970" y="2235993"/>
+            <a:ext cx="5905500" cy="3009900"/>
+          </a:xfrm>
+          <a:prstGeom prst="rect">
+            <a:avLst/>
+          </a:prstGeom>
+        </p:spPr>
+      </p:pic>
+      <p:sp>
+        <p:nvSpPr>
+          <p:cNvPr id="5" name="Oval 4">
+            <a:extLst>
+              <a:ext uri="{FF2B5EF4-FFF2-40B4-BE49-F238E27FC236}">
+                <a16:creationId xmlns:a16="http://schemas.microsoft.com/office/drawing/2014/main" id="{3592E78D-3DCF-414A-8816-97B257214244}"/>
+              </a:ext>
+            </a:extLst>
+          </p:cNvPr>
+          <p:cNvSpPr/>
+          <p:nvPr/>
+        </p:nvSpPr>
+        <p:spPr>
+          <a:xfrm>
+            <a:off x="3113316" y="2323079"/>
+            <a:ext cx="903514" cy="463664"/>
+          </a:xfrm>
+          <a:prstGeom prst="ellipse">
+            <a:avLst/>
+          </a:prstGeom>
+          <a:noFill/>
+          <a:ln w="38100">
+            <a:solidFill>
+              <a:srgbClr val="0070C0"/>
+            </a:solidFill>
+          </a:ln>
+        </p:spPr>
+        <p:style>
+          <a:lnRef idx="2">
+            <a:schemeClr val="accent1">
+              <a:shade val="50000"/>
+            </a:schemeClr>
+          </a:lnRef>
+          <a:fillRef idx="1">
+            <a:schemeClr val="accent1"/>
+          </a:fillRef>
+          <a:effectRef idx="0">
+            <a:schemeClr val="accent1"/>
+          </a:effectRef>
+          <a:fontRef idx="minor">
+            <a:schemeClr val="lt1"/>
+          </a:fontRef>
+        </p:style>
+        <p:txBody>
+          <a:bodyPr rtlCol="0" anchor="ctr"/>
+          <a:lstStyle/>
+          <a:p>
+            <a:pPr algn="ctr"/>
+            <a:endParaRPr lang="en-US"/>
+          </a:p>
+        </p:txBody>
+      </p:sp>
+      <p:cxnSp>
+        <p:nvCxnSpPr>
+          <p:cNvPr id="7" name="Straight Arrow Connector 6">
+            <a:extLst>
+              <a:ext uri="{FF2B5EF4-FFF2-40B4-BE49-F238E27FC236}">
+                <a16:creationId xmlns:a16="http://schemas.microsoft.com/office/drawing/2014/main" id="{9CD88A73-4BB1-6448-8399-D0EBC6A2FFA9}"/>
+              </a:ext>
+            </a:extLst>
+          </p:cNvPr>
+          <p:cNvCxnSpPr>
+            <a:cxnSpLocks/>
+          </p:cNvCxnSpPr>
+          <p:nvPr/>
+        </p:nvCxnSpPr>
+        <p:spPr>
+          <a:xfrm flipH="1">
+            <a:off x="5736772" y="2906486"/>
+            <a:ext cx="783771" cy="152400"/>
+          </a:xfrm>
+          <a:prstGeom prst="straightConnector1">
+            <a:avLst/>
+          </a:prstGeom>
+          <a:ln w="38100">
+            <a:solidFill>
+              <a:srgbClr val="0070C0"/>
+            </a:solidFill>
+            <a:tailEnd type="triangle"/>
+          </a:ln>
+        </p:spPr>
+        <p:style>
+          <a:lnRef idx="1">
+            <a:schemeClr val="accent1"/>
+          </a:lnRef>
+          <a:fillRef idx="0">
+            <a:schemeClr val="accent1"/>
+          </a:fillRef>
+          <a:effectRef idx="0">
+            <a:schemeClr val="accent1"/>
+          </a:effectRef>
+          <a:fontRef idx="minor">
+            <a:schemeClr val="tx1"/>
+          </a:fontRef>
+        </p:style>
+      </p:cxnSp>
+      <p:sp>
+        <p:nvSpPr>
+          <p:cNvPr id="8" name="TextBox 7">
+            <a:extLst>
+              <a:ext uri="{FF2B5EF4-FFF2-40B4-BE49-F238E27FC236}">
+                <a16:creationId xmlns:a16="http://schemas.microsoft.com/office/drawing/2014/main" id="{DBE84331-A0ED-D242-B9C0-5CD8F7F1E5DB}"/>
+              </a:ext>
+            </a:extLst>
+          </p:cNvPr>
+          <p:cNvSpPr txBox="1"/>
+          <p:nvPr/>
+        </p:nvSpPr>
+        <p:spPr>
+          <a:xfrm>
+            <a:off x="2132533" y="2089900"/>
+            <a:ext cx="1703994" cy="646331"/>
+          </a:xfrm>
+          <a:prstGeom prst="rect">
+            <a:avLst/>
+          </a:prstGeom>
+          <a:noFill/>
+        </p:spPr>
+        <p:txBody>
+          <a:bodyPr wrap="square" rtlCol="0">
+            <a:spAutoFit/>
+          </a:bodyPr>
+          <a:lstStyle/>
+          <a:p>
+            <a:r>
+              <a:rPr lang="en-US" dirty="0">
+                <a:solidFill>
+                  <a:srgbClr val="0070C0"/>
+                </a:solidFill>
+              </a:rPr>
+              <a:t>Search for ssd1306</a:t>
+            </a:r>
+          </a:p>
+        </p:txBody>
+      </p:sp>
+      <p:sp>
+        <p:nvSpPr>
+          <p:cNvPr id="11" name="TextBox 10">
+            <a:extLst>
+              <a:ext uri="{FF2B5EF4-FFF2-40B4-BE49-F238E27FC236}">
+                <a16:creationId xmlns:a16="http://schemas.microsoft.com/office/drawing/2014/main" id="{89E0E604-34FB-3745-B873-9DD020D24FD0}"/>
+              </a:ext>
+            </a:extLst>
+          </p:cNvPr>
+          <p:cNvSpPr txBox="1"/>
+          <p:nvPr/>
+        </p:nvSpPr>
+        <p:spPr>
+          <a:xfrm>
+            <a:off x="6520543" y="2721820"/>
+            <a:ext cx="1703994" cy="369332"/>
+          </a:xfrm>
+          <a:prstGeom prst="rect">
+            <a:avLst/>
+          </a:prstGeom>
+          <a:noFill/>
+        </p:spPr>
+        <p:txBody>
+          <a:bodyPr wrap="square" rtlCol="0">
+            <a:spAutoFit/>
+          </a:bodyPr>
+          <a:lstStyle/>
+          <a:p>
+            <a:r>
+              <a:rPr lang="en-US" dirty="0">
+                <a:solidFill>
+                  <a:srgbClr val="0070C0"/>
+                </a:solidFill>
+              </a:rPr>
+              <a:t>Click this line</a:t>
+            </a:r>
+          </a:p>
+        </p:txBody>
+      </p:sp>
+    </p:spTree>
+    <p:extLst>
+      <p:ext uri="{BB962C8B-B14F-4D97-AF65-F5344CB8AC3E}">
+        <p14:creationId xmlns:p14="http://schemas.microsoft.com/office/powerpoint/2010/main" val="3744173077"/>
+      </p:ext>
+    </p:extLst>
+  </p:cSld>
+  <p:clrMapOvr>
+    <a:masterClrMapping/>
+  </p:clrMapOvr>
+</p:sld>
+</file>
+
+<file path=ppt/slides/slide6.xml><?xml version="1.0" encoding="utf-8"?>
+<p:sld xmlns:a="http://schemas.openxmlformats.org/drawingml/2006/main" xmlns:r="http://schemas.openxmlformats.org/officeDocument/2006/relationships" xmlns:p="http://schemas.openxmlformats.org/presentationml/2006/main">
+  <p:cSld>
+    <p:spTree>
+      <p:nvGrpSpPr>
+        <p:cNvPr id="1" name=""/>
+        <p:cNvGrpSpPr/>
+        <p:nvPr/>
+      </p:nvGrpSpPr>
+      <p:grpSpPr>
+        <a:xfrm>
+          <a:off x="0" y="0"/>
+          <a:ext cx="0" cy="0"/>
+          <a:chOff x="0" y="0"/>
+          <a:chExt cx="0" cy="0"/>
+        </a:xfrm>
+      </p:grpSpPr>
+      <p:sp>
+        <p:nvSpPr>
+          <p:cNvPr id="2" name="Title 1">
+            <a:extLst>
+              <a:ext uri="{FF2B5EF4-FFF2-40B4-BE49-F238E27FC236}">
+                <a16:creationId xmlns:a16="http://schemas.microsoft.com/office/drawing/2014/main" id="{7BDD8CEB-20AC-1E4A-9E1A-AB5326ABDE49}"/>
+              </a:ext>
+            </a:extLst>
+          </p:cNvPr>
+          <p:cNvSpPr>
+            <a:spLocks noGrp="1"/>
+          </p:cNvSpPr>
+          <p:nvPr>
+            <p:ph type="title"/>
+          </p:nvPr>
+        </p:nvSpPr>
+        <p:spPr/>
+        <p:txBody>
+          <a:bodyPr/>
+          <a:lstStyle/>
+          <a:p>
+            <a:endParaRPr lang="en-US"/>
+          </a:p>
+        </p:txBody>
+      </p:sp>
+      <p:sp>
+        <p:nvSpPr>
+          <p:cNvPr id="3" name="Content Placeholder 2">
+            <a:extLst>
+              <a:ext uri="{FF2B5EF4-FFF2-40B4-BE49-F238E27FC236}">
+                <a16:creationId xmlns:a16="http://schemas.microsoft.com/office/drawing/2014/main" id="{3B71E1D9-D100-4E48-8D82-B66290B2D1DD}"/>
+              </a:ext>
+            </a:extLst>
+          </p:cNvPr>
+          <p:cNvSpPr>
+            <a:spLocks noGrp="1"/>
+          </p:cNvSpPr>
+          <p:nvPr>
+            <p:ph idx="1"/>
+          </p:nvPr>
+        </p:nvSpPr>
+        <p:spPr>
+          <a:xfrm>
+            <a:off x="838200" y="4190999"/>
+            <a:ext cx="10515600" cy="1985963"/>
+          </a:xfrm>
+        </p:spPr>
+        <p:txBody>
+          <a:bodyPr/>
+          <a:lstStyle/>
+          <a:p>
+            <a:endParaRPr lang="en-US" dirty="0"/>
+          </a:p>
+        </p:txBody>
+      </p:sp>
+      <p:pic>
+        <p:nvPicPr>
+          <p:cNvPr id="4" name="Picture 3">
+            <a:extLst>
+              <a:ext uri="{FF2B5EF4-FFF2-40B4-BE49-F238E27FC236}">
+                <a16:creationId xmlns:a16="http://schemas.microsoft.com/office/drawing/2014/main" id="{19A7642D-CF10-BB43-9B4B-90AA712D84C0}"/>
+              </a:ext>
+            </a:extLst>
+          </p:cNvPr>
+          <p:cNvPicPr>
+            <a:picLocks noChangeAspect="1"/>
+          </p:cNvPicPr>
+          <p:nvPr/>
+        </p:nvPicPr>
+        <p:blipFill>
+          <a:blip r:embed="rId2"/>
+          <a:stretch>
+            <a:fillRect/>
+          </a:stretch>
+        </p:blipFill>
+        <p:spPr>
+          <a:xfrm>
+            <a:off x="2159377" y="2050026"/>
+            <a:ext cx="7127191" cy="1569679"/>
+          </a:xfrm>
+          <a:prstGeom prst="rect">
+            <a:avLst/>
+          </a:prstGeom>
+        </p:spPr>
+      </p:pic>
+    </p:spTree>
+    <p:extLst>
+      <p:ext uri="{BB962C8B-B14F-4D97-AF65-F5344CB8AC3E}">
+        <p14:creationId xmlns:p14="http://schemas.microsoft.com/office/powerpoint/2010/main" val="1729174337"/>
+      </p:ext>
+    </p:extLst>
+  </p:cSld>
+  <p:clrMapOvr>
+    <a:masterClrMapping/>
+  </p:clrMapOvr>
+</p:sld>
+</file>
+
 <file path=ppt/theme/theme1.xml><?xml version="1.0" encoding="utf-8"?>
 <a:theme xmlns:a="http://schemas.openxmlformats.org/drawingml/2006/main" name="Office Theme">
   <a:themeElements>

</xml_diff>

<commit_message>
Deployed 644c5f8 with MkDocs version: 1.1.2
</commit_message>
<xml_diff>
--- a/img/figures.pptx
+++ b/img/figures.pptx
@@ -6,11 +6,12 @@
   </p:sldMasterIdLst>
   <p:sldIdLst>
     <p:sldId id="256" r:id="rId2"/>
-    <p:sldId id="257" r:id="rId3"/>
-    <p:sldId id="258" r:id="rId4"/>
-    <p:sldId id="259" r:id="rId5"/>
-    <p:sldId id="260" r:id="rId6"/>
-    <p:sldId id="261" r:id="rId7"/>
+    <p:sldId id="262" r:id="rId3"/>
+    <p:sldId id="257" r:id="rId4"/>
+    <p:sldId id="258" r:id="rId5"/>
+    <p:sldId id="259" r:id="rId6"/>
+    <p:sldId id="260" r:id="rId7"/>
+    <p:sldId id="261" r:id="rId8"/>
   </p:sldIdLst>
   <p:sldSz cx="12192000" cy="6858000"/>
   <p:notesSz cx="6858000" cy="9144000"/>
@@ -264,7 +265,7 @@
           <a:p>
             <a:fld id="{FD3A94D9-38B3-6A4F-AECD-4D297511D178}" type="datetimeFigureOut">
               <a:rPr lang="en-US" smtClean="0"/>
-              <a:t>2/20/21</a:t>
+              <a:t>3/2/21</a:t>
             </a:fld>
             <a:endParaRPr lang="en-US"/>
           </a:p>
@@ -462,7 +463,7 @@
           <a:p>
             <a:fld id="{FD3A94D9-38B3-6A4F-AECD-4D297511D178}" type="datetimeFigureOut">
               <a:rPr lang="en-US" smtClean="0"/>
-              <a:t>2/20/21</a:t>
+              <a:t>3/2/21</a:t>
             </a:fld>
             <a:endParaRPr lang="en-US"/>
           </a:p>
@@ -670,7 +671,7 @@
           <a:p>
             <a:fld id="{FD3A94D9-38B3-6A4F-AECD-4D297511D178}" type="datetimeFigureOut">
               <a:rPr lang="en-US" smtClean="0"/>
-              <a:t>2/20/21</a:t>
+              <a:t>3/2/21</a:t>
             </a:fld>
             <a:endParaRPr lang="en-US"/>
           </a:p>
@@ -868,7 +869,7 @@
           <a:p>
             <a:fld id="{FD3A94D9-38B3-6A4F-AECD-4D297511D178}" type="datetimeFigureOut">
               <a:rPr lang="en-US" smtClean="0"/>
-              <a:t>2/20/21</a:t>
+              <a:t>3/2/21</a:t>
             </a:fld>
             <a:endParaRPr lang="en-US"/>
           </a:p>
@@ -1143,7 +1144,7 @@
           <a:p>
             <a:fld id="{FD3A94D9-38B3-6A4F-AECD-4D297511D178}" type="datetimeFigureOut">
               <a:rPr lang="en-US" smtClean="0"/>
-              <a:t>2/20/21</a:t>
+              <a:t>3/2/21</a:t>
             </a:fld>
             <a:endParaRPr lang="en-US"/>
           </a:p>
@@ -1408,7 +1409,7 @@
           <a:p>
             <a:fld id="{FD3A94D9-38B3-6A4F-AECD-4D297511D178}" type="datetimeFigureOut">
               <a:rPr lang="en-US" smtClean="0"/>
-              <a:t>2/20/21</a:t>
+              <a:t>3/2/21</a:t>
             </a:fld>
             <a:endParaRPr lang="en-US"/>
           </a:p>
@@ -1820,7 +1821,7 @@
           <a:p>
             <a:fld id="{FD3A94D9-38B3-6A4F-AECD-4D297511D178}" type="datetimeFigureOut">
               <a:rPr lang="en-US" smtClean="0"/>
-              <a:t>2/20/21</a:t>
+              <a:t>3/2/21</a:t>
             </a:fld>
             <a:endParaRPr lang="en-US"/>
           </a:p>
@@ -1961,7 +1962,7 @@
           <a:p>
             <a:fld id="{FD3A94D9-38B3-6A4F-AECD-4D297511D178}" type="datetimeFigureOut">
               <a:rPr lang="en-US" smtClean="0"/>
-              <a:t>2/20/21</a:t>
+              <a:t>3/2/21</a:t>
             </a:fld>
             <a:endParaRPr lang="en-US"/>
           </a:p>
@@ -2074,7 +2075,7 @@
           <a:p>
             <a:fld id="{FD3A94D9-38B3-6A4F-AECD-4D297511D178}" type="datetimeFigureOut">
               <a:rPr lang="en-US" smtClean="0"/>
-              <a:t>2/20/21</a:t>
+              <a:t>3/2/21</a:t>
             </a:fld>
             <a:endParaRPr lang="en-US"/>
           </a:p>
@@ -2385,7 +2386,7 @@
           <a:p>
             <a:fld id="{FD3A94D9-38B3-6A4F-AECD-4D297511D178}" type="datetimeFigureOut">
               <a:rPr lang="en-US" smtClean="0"/>
-              <a:t>2/20/21</a:t>
+              <a:t>3/2/21</a:t>
             </a:fld>
             <a:endParaRPr lang="en-US"/>
           </a:p>
@@ -2673,7 +2674,7 @@
           <a:p>
             <a:fld id="{FD3A94D9-38B3-6A4F-AECD-4D297511D178}" type="datetimeFigureOut">
               <a:rPr lang="en-US" smtClean="0"/>
-              <a:t>2/20/21</a:t>
+              <a:t>3/2/21</a:t>
             </a:fld>
             <a:endParaRPr lang="en-US"/>
           </a:p>
@@ -2914,7 +2915,7 @@
           <a:p>
             <a:fld id="{FD3A94D9-38B3-6A4F-AECD-4D297511D178}" type="datetimeFigureOut">
               <a:rPr lang="en-US" smtClean="0"/>
-              <a:t>2/20/21</a:t>
+              <a:t>3/2/21</a:t>
             </a:fld>
             <a:endParaRPr lang="en-US"/>
           </a:p>
@@ -3423,7 +3424,7 @@
           <p:cNvPr id="2" name="Title 1">
             <a:extLst>
               <a:ext uri="{FF2B5EF4-FFF2-40B4-BE49-F238E27FC236}">
-                <a16:creationId xmlns:a16="http://schemas.microsoft.com/office/drawing/2014/main" id="{C7119EB3-D2A0-064A-9682-F16094EDA15C}"/>
+                <a16:creationId xmlns:a16="http://schemas.microsoft.com/office/drawing/2014/main" id="{06CA91BD-CD6A-3644-A23B-B410EFE3DBFB}"/>
               </a:ext>
             </a:extLst>
           </p:cNvPr>
@@ -3448,7 +3449,7 @@
           <p:cNvPr id="3" name="Content Placeholder 2">
             <a:extLst>
               <a:ext uri="{FF2B5EF4-FFF2-40B4-BE49-F238E27FC236}">
-                <a16:creationId xmlns:a16="http://schemas.microsoft.com/office/drawing/2014/main" id="{347A4B86-BE59-7F4F-884D-0531A10E757C}"/>
+                <a16:creationId xmlns:a16="http://schemas.microsoft.com/office/drawing/2014/main" id="{B93A9E78-594A-B747-9CC3-823772E305EC}"/>
               </a:ext>
             </a:extLst>
           </p:cNvPr>
@@ -3461,185 +3462,175 @@
         </p:nvSpPr>
         <p:spPr>
           <a:xfrm>
-            <a:off x="838200" y="5170713"/>
-            <a:ext cx="10515600" cy="1006249"/>
-          </a:xfrm>
-        </p:spPr>
-        <p:txBody>
-          <a:bodyPr/>
+            <a:off x="838200" y="5724939"/>
+            <a:ext cx="10515600" cy="452024"/>
+          </a:xfrm>
+        </p:spPr>
+        <p:txBody>
+          <a:bodyPr>
+            <a:normAutofit lnSpcReduction="10000"/>
+          </a:bodyPr>
           <a:lstStyle/>
           <a:p>
             <a:endParaRPr lang="en-US" dirty="0"/>
           </a:p>
         </p:txBody>
       </p:sp>
-      <p:sp>
-        <p:nvSpPr>
-          <p:cNvPr id="4" name="Right Arrow 3">
-            <a:extLst>
-              <a:ext uri="{FF2B5EF4-FFF2-40B4-BE49-F238E27FC236}">
-                <a16:creationId xmlns:a16="http://schemas.microsoft.com/office/drawing/2014/main" id="{A7766BFB-BE8C-6442-8A40-6A519FBB4254}"/>
-              </a:ext>
-            </a:extLst>
-          </p:cNvPr>
-          <p:cNvSpPr/>
+      <p:pic>
+        <p:nvPicPr>
+          <p:cNvPr id="4" name="Picture 3">
+            <a:extLst>
+              <a:ext uri="{FF2B5EF4-FFF2-40B4-BE49-F238E27FC236}">
+                <a16:creationId xmlns:a16="http://schemas.microsoft.com/office/drawing/2014/main" id="{A42EA778-C4C5-474B-ACEC-8F1B4212D034}"/>
+              </a:ext>
+            </a:extLst>
+          </p:cNvPr>
+          <p:cNvPicPr>
+            <a:picLocks noChangeAspect="1"/>
+          </p:cNvPicPr>
           <p:nvPr/>
-        </p:nvSpPr>
+        </p:nvPicPr>
+        <p:blipFill>
+          <a:blip r:embed="rId2"/>
+          <a:stretch>
+            <a:fillRect/>
+          </a:stretch>
+        </p:blipFill>
         <p:spPr>
           <a:xfrm>
-            <a:off x="2895600" y="2922813"/>
-            <a:ext cx="1872343" cy="1045029"/>
-          </a:xfrm>
-          <a:prstGeom prst="rightArrow">
-            <a:avLst/>
-          </a:prstGeom>
-          <a:solidFill>
-            <a:schemeClr val="accent4"/>
-          </a:solidFill>
-          <a:ln w="28575"/>
-        </p:spPr>
-        <p:style>
-          <a:lnRef idx="2">
-            <a:schemeClr val="accent1">
-              <a:shade val="50000"/>
-            </a:schemeClr>
-          </a:lnRef>
-          <a:fillRef idx="1">
-            <a:schemeClr val="accent1"/>
-          </a:fillRef>
-          <a:effectRef idx="0">
-            <a:schemeClr val="accent1"/>
-          </a:effectRef>
-          <a:fontRef idx="minor">
-            <a:schemeClr val="lt1"/>
-          </a:fontRef>
-        </p:style>
-        <p:txBody>
-          <a:bodyPr rtlCol="0" anchor="ctr"/>
-          <a:lstStyle/>
-          <a:p>
-            <a:pPr algn="ctr"/>
-            <a:r>
-              <a:rPr lang="en-US" sz="2400" b="1" dirty="0">
-                <a:solidFill>
-                  <a:schemeClr val="tx1"/>
-                </a:solidFill>
-              </a:rPr>
-              <a:t>Sensors</a:t>
-            </a:r>
-          </a:p>
-        </p:txBody>
-      </p:sp>
-      <p:sp>
-        <p:nvSpPr>
-          <p:cNvPr id="5" name="Rectangle 4">
-            <a:extLst>
-              <a:ext uri="{FF2B5EF4-FFF2-40B4-BE49-F238E27FC236}">
-                <a16:creationId xmlns:a16="http://schemas.microsoft.com/office/drawing/2014/main" id="{54740CAB-1CBF-F24B-A4BD-39863CD87FA6}"/>
-              </a:ext>
-            </a:extLst>
-          </p:cNvPr>
-          <p:cNvSpPr/>
-          <p:nvPr/>
-        </p:nvSpPr>
-        <p:spPr>
-          <a:xfrm>
-            <a:off x="4767943" y="2852057"/>
-            <a:ext cx="2296886" cy="1186543"/>
+            <a:off x="1759348" y="2633616"/>
+            <a:ext cx="2729866" cy="2052430"/>
           </a:xfrm>
           <a:prstGeom prst="rect">
             <a:avLst/>
           </a:prstGeom>
-          <a:solidFill>
-            <a:srgbClr val="FFFF00"/>
-          </a:solidFill>
-          <a:ln w="28575"/>
-        </p:spPr>
-        <p:style>
-          <a:lnRef idx="2">
-            <a:schemeClr val="accent1">
-              <a:shade val="50000"/>
-            </a:schemeClr>
-          </a:lnRef>
-          <a:fillRef idx="1">
-            <a:schemeClr val="accent1"/>
-          </a:fillRef>
-          <a:effectRef idx="0">
-            <a:schemeClr val="accent1"/>
-          </a:effectRef>
-          <a:fontRef idx="minor">
-            <a:schemeClr val="lt1"/>
-          </a:fontRef>
-        </p:style>
-        <p:txBody>
-          <a:bodyPr rtlCol="0" anchor="ctr"/>
-          <a:lstStyle/>
-          <a:p>
-            <a:pPr algn="ctr"/>
-            <a:r>
-              <a:rPr lang="en-US" sz="2400" b="1" dirty="0">
-                <a:solidFill>
-                  <a:schemeClr val="tx1"/>
-                </a:solidFill>
-              </a:rPr>
-              <a:t>Microcontroller</a:t>
-            </a:r>
-          </a:p>
-        </p:txBody>
-      </p:sp>
-      <p:sp>
-        <p:nvSpPr>
-          <p:cNvPr id="6" name="Right Arrow 5">
-            <a:extLst>
-              <a:ext uri="{FF2B5EF4-FFF2-40B4-BE49-F238E27FC236}">
-                <a16:creationId xmlns:a16="http://schemas.microsoft.com/office/drawing/2014/main" id="{B7CF6584-92C4-2049-90E6-C632485B2C42}"/>
-              </a:ext>
-            </a:extLst>
-          </p:cNvPr>
-          <p:cNvSpPr/>
+        </p:spPr>
+      </p:pic>
+      <p:sp>
+        <p:nvSpPr>
+          <p:cNvPr id="5" name="TextBox 4">
+            <a:extLst>
+              <a:ext uri="{FF2B5EF4-FFF2-40B4-BE49-F238E27FC236}">
+                <a16:creationId xmlns:a16="http://schemas.microsoft.com/office/drawing/2014/main" id="{E128A4BB-0EF8-0047-869B-42F1DCA6675C}"/>
+              </a:ext>
+            </a:extLst>
+          </p:cNvPr>
+          <p:cNvSpPr txBox="1"/>
           <p:nvPr/>
         </p:nvSpPr>
         <p:spPr>
           <a:xfrm>
-            <a:off x="7064829" y="2922813"/>
-            <a:ext cx="2841171" cy="1045029"/>
-          </a:xfrm>
-          <a:prstGeom prst="rightArrow">
+            <a:off x="4662341" y="2382559"/>
+            <a:ext cx="5495450" cy="2554545"/>
+          </a:xfrm>
+          <a:prstGeom prst="rect">
             <a:avLst/>
           </a:prstGeom>
-          <a:solidFill>
-            <a:srgbClr val="00B050"/>
-          </a:solidFill>
-          <a:ln w="28575"/>
-        </p:spPr>
-        <p:style>
-          <a:lnRef idx="2">
-            <a:schemeClr val="accent1">
-              <a:shade val="50000"/>
-            </a:schemeClr>
-          </a:lnRef>
-          <a:fillRef idx="1">
-            <a:schemeClr val="accent1"/>
-          </a:fillRef>
-          <a:effectRef idx="0">
-            <a:schemeClr val="accent1"/>
-          </a:effectRef>
-          <a:fontRef idx="minor">
-            <a:schemeClr val="lt1"/>
-          </a:fontRef>
-        </p:style>
-        <p:txBody>
-          <a:bodyPr rtlCol="0" anchor="ctr"/>
-          <a:lstStyle/>
-          <a:p>
-            <a:pPr algn="ctr"/>
-            <a:r>
-              <a:rPr lang="en-US" sz="2400" b="1" dirty="0">
-                <a:solidFill>
-                  <a:schemeClr val="tx1"/>
-                </a:solidFill>
-              </a:rPr>
-              <a:t>Output Controls</a:t>
+          <a:noFill/>
+        </p:spPr>
+        <p:txBody>
+          <a:bodyPr wrap="square" rtlCol="0">
+            <a:spAutoFit/>
+          </a:bodyPr>
+          <a:lstStyle/>
+          <a:p>
+            <a:pPr marL="285750" indent="-285750">
+              <a:buFont typeface="Arial" panose="020B0604020202020204" pitchFamily="34" charset="0"/>
+              <a:buChar char="•"/>
+            </a:pPr>
+            <a:r>
+              <a:rPr lang="en-US" sz="1600" dirty="0"/>
+              <a:t>$4 list price</a:t>
+            </a:r>
+          </a:p>
+          <a:p>
+            <a:pPr marL="285750" indent="-285750">
+              <a:buFont typeface="Arial" panose="020B0604020202020204" pitchFamily="34" charset="0"/>
+              <a:buChar char="•"/>
+            </a:pPr>
+            <a:r>
+              <a:rPr lang="en-US" sz="1600" dirty="0"/>
+              <a:t>264K RAM</a:t>
+            </a:r>
+          </a:p>
+          <a:p>
+            <a:pPr marL="285750" indent="-285750">
+              <a:buFont typeface="Arial" panose="020B0604020202020204" pitchFamily="34" charset="0"/>
+              <a:buChar char="•"/>
+            </a:pPr>
+            <a:r>
+              <a:rPr lang="en-US" sz="1600" dirty="0"/>
+              <a:t>26 3.3V GPIO Ports</a:t>
+            </a:r>
+          </a:p>
+          <a:p>
+            <a:pPr marL="285750" indent="-285750">
+              <a:buFont typeface="Arial" panose="020B0604020202020204" pitchFamily="34" charset="0"/>
+              <a:buChar char="•"/>
+            </a:pPr>
+            <a:r>
+              <a:rPr lang="en-US" sz="1600" dirty="0"/>
+              <a:t>2MByte Flash</a:t>
+            </a:r>
+          </a:p>
+          <a:p>
+            <a:pPr marL="285750" indent="-285750">
+              <a:buFont typeface="Arial" panose="020B0604020202020204" pitchFamily="34" charset="0"/>
+              <a:buChar char="•"/>
+            </a:pPr>
+            <a:r>
+              <a:rPr lang="en-US" sz="1600" dirty="0"/>
+              <a:t>BOOTSEL mounts as a file system</a:t>
+            </a:r>
+          </a:p>
+          <a:p>
+            <a:pPr marL="285750" indent="-285750">
+              <a:buFont typeface="Arial" panose="020B0604020202020204" pitchFamily="34" charset="0"/>
+              <a:buChar char="•"/>
+            </a:pPr>
+            <a:r>
+              <a:rPr lang="en-US" sz="1600" dirty="0"/>
+              <a:t>Micro USB B (built in USB controller)</a:t>
+            </a:r>
+          </a:p>
+          <a:p>
+            <a:pPr marL="285750" indent="-285750">
+              <a:buFont typeface="Arial" panose="020B0604020202020204" pitchFamily="34" charset="0"/>
+              <a:buChar char="•"/>
+            </a:pPr>
+            <a:r>
+              <a:rPr lang="en-US" sz="1600" dirty="0"/>
+              <a:t>3 12-bit analog to digital pins</a:t>
+            </a:r>
+          </a:p>
+          <a:p>
+            <a:pPr marL="285750" indent="-285750">
+              <a:buFont typeface="Arial" panose="020B0604020202020204" pitchFamily="34" charset="0"/>
+              <a:buChar char="•"/>
+            </a:pPr>
+            <a:r>
+              <a:rPr lang="en-US" sz="1600" dirty="0"/>
+              <a:t>2 × UART, 2 × I2C, 2 × SPI, 16 × PWM channels</a:t>
+            </a:r>
+          </a:p>
+          <a:p>
+            <a:pPr marL="285750" indent="-285750">
+              <a:buFont typeface="Arial" panose="020B0604020202020204" pitchFamily="34" charset="0"/>
+              <a:buChar char="•"/>
+            </a:pPr>
+            <a:r>
+              <a:rPr lang="en-US" sz="1600" dirty="0"/>
+              <a:t>1 × Timer with 4 alarms, 1 × Real Time Counter</a:t>
+            </a:r>
+          </a:p>
+          <a:p>
+            <a:pPr marL="285750" indent="-285750">
+              <a:buFont typeface="Arial" panose="020B0604020202020204" pitchFamily="34" charset="0"/>
+              <a:buChar char="•"/>
+            </a:pPr>
+            <a:r>
+              <a:rPr lang="en-US" sz="1600" dirty="0"/>
+              <a:t>2 × Programmable IO (PIO) blocks, 8 state machines total</a:t>
             </a:r>
           </a:p>
         </p:txBody>
@@ -3647,7 +3638,7 @@
     </p:spTree>
     <p:extLst>
       <p:ext uri="{BB962C8B-B14F-4D97-AF65-F5344CB8AC3E}">
-        <p14:creationId xmlns:p14="http://schemas.microsoft.com/office/powerpoint/2010/main" val="558389087"/>
+        <p14:creationId xmlns:p14="http://schemas.microsoft.com/office/powerpoint/2010/main" val="3698708309"/>
       </p:ext>
     </p:extLst>
   </p:cSld>
@@ -3679,7 +3670,7 @@
           <p:cNvPr id="2" name="Title 1">
             <a:extLst>
               <a:ext uri="{FF2B5EF4-FFF2-40B4-BE49-F238E27FC236}">
-                <a16:creationId xmlns:a16="http://schemas.microsoft.com/office/drawing/2014/main" id="{72E15970-820C-6641-8B83-F3860EDA1AE0}"/>
+                <a16:creationId xmlns:a16="http://schemas.microsoft.com/office/drawing/2014/main" id="{C7119EB3-D2A0-064A-9682-F16094EDA15C}"/>
               </a:ext>
             </a:extLst>
           </p:cNvPr>
@@ -3704,7 +3695,7 @@
           <p:cNvPr id="3" name="Content Placeholder 2">
             <a:extLst>
               <a:ext uri="{FF2B5EF4-FFF2-40B4-BE49-F238E27FC236}">
-                <a16:creationId xmlns:a16="http://schemas.microsoft.com/office/drawing/2014/main" id="{1A5A24DC-9779-0F48-B7B7-8E56F95B0F88}"/>
+                <a16:creationId xmlns:a16="http://schemas.microsoft.com/office/drawing/2014/main" id="{347A4B86-BE59-7F4F-884D-0531A10E757C}"/>
               </a:ext>
             </a:extLst>
           </p:cNvPr>
@@ -3717,8 +3708,8 @@
         </p:nvSpPr>
         <p:spPr>
           <a:xfrm>
-            <a:off x="838200" y="5595483"/>
-            <a:ext cx="10515600" cy="897392"/>
+            <a:off x="838200" y="5170713"/>
+            <a:ext cx="10515600" cy="1006249"/>
           </a:xfrm>
         </p:spPr>
         <p:txBody>
@@ -3731,10 +3722,10 @@
       </p:sp>
       <p:sp>
         <p:nvSpPr>
-          <p:cNvPr id="4" name="Rectangle 3">
-            <a:extLst>
-              <a:ext uri="{FF2B5EF4-FFF2-40B4-BE49-F238E27FC236}">
-                <a16:creationId xmlns:a16="http://schemas.microsoft.com/office/drawing/2014/main" id="{2F801350-0380-A14C-B912-49A0104988CD}"/>
+          <p:cNvPr id="4" name="Right Arrow 3">
+            <a:extLst>
+              <a:ext uri="{FF2B5EF4-FFF2-40B4-BE49-F238E27FC236}">
+                <a16:creationId xmlns:a16="http://schemas.microsoft.com/office/drawing/2014/main" id="{A7766BFB-BE8C-6442-8A40-6A519FBB4254}"/>
               </a:ext>
             </a:extLst>
           </p:cNvPr>
@@ -3743,20 +3734,16 @@
         </p:nvSpPr>
         <p:spPr>
           <a:xfrm>
-            <a:off x="1763484" y="3140529"/>
-            <a:ext cx="1970315" cy="576942"/>
-          </a:xfrm>
-          <a:prstGeom prst="rect">
+            <a:off x="2895600" y="2922813"/>
+            <a:ext cx="1872343" cy="1045029"/>
+          </a:xfrm>
+          <a:prstGeom prst="rightArrow">
             <a:avLst/>
           </a:prstGeom>
           <a:solidFill>
-            <a:schemeClr val="accent2"/>
+            <a:schemeClr val="accent4"/>
           </a:solidFill>
-          <a:ln w="28575">
-            <a:solidFill>
-              <a:schemeClr val="tx1"/>
-            </a:solidFill>
-          </a:ln>
+          <a:ln w="28575"/>
         </p:spPr>
         <p:style>
           <a:lnRef idx="2">
@@ -3780,12 +3767,12 @@
           <a:p>
             <a:pPr algn="ctr"/>
             <a:r>
-              <a:rPr lang="en-US" dirty="0">
+              <a:rPr lang="en-US" sz="2400" b="1" dirty="0">
                 <a:solidFill>
                   <a:schemeClr val="tx1"/>
                 </a:solidFill>
               </a:rPr>
-              <a:t>Light Sensor</a:t>
+              <a:t>Sensors</a:t>
             </a:r>
           </a:p>
         </p:txBody>
@@ -3795,7 +3782,7 @@
           <p:cNvPr id="5" name="Rectangle 4">
             <a:extLst>
               <a:ext uri="{FF2B5EF4-FFF2-40B4-BE49-F238E27FC236}">
-                <a16:creationId xmlns:a16="http://schemas.microsoft.com/office/drawing/2014/main" id="{1FAA985C-9FB9-574F-80A8-0E3550E6F974}"/>
+                <a16:creationId xmlns:a16="http://schemas.microsoft.com/office/drawing/2014/main" id="{54740CAB-1CBF-F24B-A4BD-39863CD87FA6}"/>
               </a:ext>
             </a:extLst>
           </p:cNvPr>
@@ -3804,20 +3791,16 @@
         </p:nvSpPr>
         <p:spPr>
           <a:xfrm>
-            <a:off x="1763485" y="2454730"/>
-            <a:ext cx="1970316" cy="576942"/>
+            <a:off x="4767943" y="2852057"/>
+            <a:ext cx="2296886" cy="1186543"/>
           </a:xfrm>
           <a:prstGeom prst="rect">
             <a:avLst/>
           </a:prstGeom>
           <a:solidFill>
-            <a:schemeClr val="accent2"/>
+            <a:srgbClr val="FFFF00"/>
           </a:solidFill>
-          <a:ln w="28575">
-            <a:solidFill>
-              <a:schemeClr val="tx1"/>
-            </a:solidFill>
-          </a:ln>
+          <a:ln w="28575"/>
         </p:spPr>
         <p:style>
           <a:lnRef idx="2">
@@ -3841,22 +3824,22 @@
           <a:p>
             <a:pPr algn="ctr"/>
             <a:r>
-              <a:rPr lang="en-US" dirty="0">
+              <a:rPr lang="en-US" sz="2400" b="1" dirty="0">
                 <a:solidFill>
                   <a:schemeClr val="tx1"/>
                 </a:solidFill>
               </a:rPr>
-              <a:t>Distance Sensor</a:t>
-            </a:r>
-          </a:p>
-        </p:txBody>
-      </p:sp>
-      <p:sp>
-        <p:nvSpPr>
-          <p:cNvPr id="6" name="Rectangle 5">
-            <a:extLst>
-              <a:ext uri="{FF2B5EF4-FFF2-40B4-BE49-F238E27FC236}">
-                <a16:creationId xmlns:a16="http://schemas.microsoft.com/office/drawing/2014/main" id="{EE905EA8-E624-4E4F-862E-84D086F2CA43}"/>
+              <a:t>Microcontroller</a:t>
+            </a:r>
+          </a:p>
+        </p:txBody>
+      </p:sp>
+      <p:sp>
+        <p:nvSpPr>
+          <p:cNvPr id="6" name="Right Arrow 5">
+            <a:extLst>
+              <a:ext uri="{FF2B5EF4-FFF2-40B4-BE49-F238E27FC236}">
+                <a16:creationId xmlns:a16="http://schemas.microsoft.com/office/drawing/2014/main" id="{B7CF6584-92C4-2049-90E6-C632485B2C42}"/>
               </a:ext>
             </a:extLst>
           </p:cNvPr>
@@ -3865,20 +3848,16 @@
         </p:nvSpPr>
         <p:spPr>
           <a:xfrm>
-            <a:off x="1763484" y="3826328"/>
-            <a:ext cx="1970315" cy="576942"/>
-          </a:xfrm>
-          <a:prstGeom prst="rect">
+            <a:off x="7064829" y="2922813"/>
+            <a:ext cx="2841171" cy="1045029"/>
+          </a:xfrm>
+          <a:prstGeom prst="rightArrow">
             <a:avLst/>
           </a:prstGeom>
           <a:solidFill>
-            <a:schemeClr val="accent2"/>
+            <a:srgbClr val="00B050"/>
           </a:solidFill>
-          <a:ln w="28575">
-            <a:solidFill>
-              <a:schemeClr val="tx1"/>
-            </a:solidFill>
-          </a:ln>
+          <a:ln w="28575"/>
         </p:spPr>
         <p:style>
           <a:lnRef idx="2">
@@ -3902,756 +3881,20 @@
           <a:p>
             <a:pPr algn="ctr"/>
             <a:r>
-              <a:rPr lang="en-US" dirty="0">
-                <a:solidFill>
-                  <a:schemeClr val="tx1"/>
-                </a:solidFill>
-              </a:rPr>
-              <a:t>Motion Sensor</a:t>
-            </a:r>
-          </a:p>
-        </p:txBody>
-      </p:sp>
-      <p:sp>
-        <p:nvSpPr>
-          <p:cNvPr id="7" name="Rectangle 6">
-            <a:extLst>
-              <a:ext uri="{FF2B5EF4-FFF2-40B4-BE49-F238E27FC236}">
-                <a16:creationId xmlns:a16="http://schemas.microsoft.com/office/drawing/2014/main" id="{BF2B3342-F2AC-3648-A106-A26CF4E66CC0}"/>
-              </a:ext>
-            </a:extLst>
-          </p:cNvPr>
-          <p:cNvSpPr/>
-          <p:nvPr/>
-        </p:nvSpPr>
-        <p:spPr>
-          <a:xfrm>
-            <a:off x="1763484" y="4535942"/>
-            <a:ext cx="1970315" cy="576942"/>
-          </a:xfrm>
-          <a:prstGeom prst="rect">
-            <a:avLst/>
-          </a:prstGeom>
-          <a:solidFill>
-            <a:schemeClr val="accent2"/>
-          </a:solidFill>
-          <a:ln w="28575">
-            <a:solidFill>
-              <a:schemeClr val="tx1"/>
-            </a:solidFill>
-          </a:ln>
-        </p:spPr>
-        <p:style>
-          <a:lnRef idx="2">
-            <a:schemeClr val="accent1">
-              <a:shade val="50000"/>
-            </a:schemeClr>
-          </a:lnRef>
-          <a:fillRef idx="1">
-            <a:schemeClr val="accent1"/>
-          </a:fillRef>
-          <a:effectRef idx="0">
-            <a:schemeClr val="accent1"/>
-          </a:effectRef>
-          <a:fontRef idx="minor">
-            <a:schemeClr val="lt1"/>
-          </a:fontRef>
-        </p:style>
-        <p:txBody>
-          <a:bodyPr rtlCol="0" anchor="ctr"/>
-          <a:lstStyle/>
-          <a:p>
-            <a:pPr algn="ctr"/>
-            <a:r>
-              <a:rPr lang="en-US" dirty="0">
-                <a:solidFill>
-                  <a:schemeClr val="tx1"/>
-                </a:solidFill>
-              </a:rPr>
-              <a:t>Sound Sensor</a:t>
-            </a:r>
-          </a:p>
-        </p:txBody>
-      </p:sp>
-      <p:sp>
-        <p:nvSpPr>
-          <p:cNvPr id="8" name="Rectangle 7">
-            <a:extLst>
-              <a:ext uri="{FF2B5EF4-FFF2-40B4-BE49-F238E27FC236}">
-                <a16:creationId xmlns:a16="http://schemas.microsoft.com/office/drawing/2014/main" id="{93194C55-8D28-DF45-A3FE-FFE03F9649AD}"/>
-              </a:ext>
-            </a:extLst>
-          </p:cNvPr>
-          <p:cNvSpPr/>
-          <p:nvPr/>
-        </p:nvSpPr>
-        <p:spPr>
-          <a:xfrm>
-            <a:off x="4517568" y="3243035"/>
-            <a:ext cx="2296886" cy="1186543"/>
-          </a:xfrm>
-          <a:prstGeom prst="rect">
-            <a:avLst/>
-          </a:prstGeom>
-          <a:solidFill>
-            <a:srgbClr val="FFFF00"/>
-          </a:solidFill>
-          <a:ln w="28575">
-            <a:solidFill>
-              <a:schemeClr val="tx1"/>
-            </a:solidFill>
-          </a:ln>
-        </p:spPr>
-        <p:style>
-          <a:lnRef idx="2">
-            <a:schemeClr val="accent1">
-              <a:shade val="50000"/>
-            </a:schemeClr>
-          </a:lnRef>
-          <a:fillRef idx="1">
-            <a:schemeClr val="accent1"/>
-          </a:fillRef>
-          <a:effectRef idx="0">
-            <a:schemeClr val="accent1"/>
-          </a:effectRef>
-          <a:fontRef idx="minor">
-            <a:schemeClr val="lt1"/>
-          </a:fontRef>
-        </p:style>
-        <p:txBody>
-          <a:bodyPr rtlCol="0" anchor="ctr"/>
-          <a:lstStyle/>
-          <a:p>
-            <a:pPr algn="ctr"/>
-            <a:r>
               <a:rPr lang="en-US" sz="2400" b="1" dirty="0">
                 <a:solidFill>
                   <a:schemeClr val="tx1"/>
                 </a:solidFill>
               </a:rPr>
-              <a:t>Raspberry Pi</a:t>
-            </a:r>
-          </a:p>
-          <a:p>
-            <a:pPr algn="ctr"/>
-            <a:r>
-              <a:rPr lang="en-US" sz="2400" b="1" dirty="0">
-                <a:solidFill>
-                  <a:schemeClr val="tx1"/>
-                </a:solidFill>
-              </a:rPr>
-              <a:t>Pico</a:t>
-            </a:r>
-          </a:p>
-        </p:txBody>
-      </p:sp>
-      <p:cxnSp>
-        <p:nvCxnSpPr>
-          <p:cNvPr id="10" name="Straight Arrow Connector 9">
-            <a:extLst>
-              <a:ext uri="{FF2B5EF4-FFF2-40B4-BE49-F238E27FC236}">
-                <a16:creationId xmlns:a16="http://schemas.microsoft.com/office/drawing/2014/main" id="{BCF1FA16-123C-C04D-91C5-87842992BC8C}"/>
-              </a:ext>
-            </a:extLst>
-          </p:cNvPr>
-          <p:cNvCxnSpPr>
-            <a:stCxn id="5" idx="3"/>
-          </p:cNvCxnSpPr>
-          <p:nvPr/>
-        </p:nvCxnSpPr>
-        <p:spPr>
-          <a:xfrm>
-            <a:off x="3733801" y="2743201"/>
-            <a:ext cx="783771" cy="685799"/>
-          </a:xfrm>
-          <a:prstGeom prst="straightConnector1">
-            <a:avLst/>
-          </a:prstGeom>
-          <a:ln w="57150">
-            <a:solidFill>
-              <a:schemeClr val="tx1"/>
-            </a:solidFill>
-            <a:tailEnd type="triangle"/>
-          </a:ln>
-        </p:spPr>
-        <p:style>
-          <a:lnRef idx="1">
-            <a:schemeClr val="accent1"/>
-          </a:lnRef>
-          <a:fillRef idx="0">
-            <a:schemeClr val="accent1"/>
-          </a:fillRef>
-          <a:effectRef idx="0">
-            <a:schemeClr val="accent1"/>
-          </a:effectRef>
-          <a:fontRef idx="minor">
-            <a:schemeClr val="tx1"/>
-          </a:fontRef>
-        </p:style>
-      </p:cxnSp>
-      <p:cxnSp>
-        <p:nvCxnSpPr>
-          <p:cNvPr id="11" name="Straight Arrow Connector 10">
-            <a:extLst>
-              <a:ext uri="{FF2B5EF4-FFF2-40B4-BE49-F238E27FC236}">
-                <a16:creationId xmlns:a16="http://schemas.microsoft.com/office/drawing/2014/main" id="{57757574-4FEA-7F44-BB17-553C236E2BBE}"/>
-              </a:ext>
-            </a:extLst>
-          </p:cNvPr>
-          <p:cNvCxnSpPr>
-            <a:cxnSpLocks/>
-            <a:stCxn id="4" idx="3"/>
-          </p:cNvCxnSpPr>
-          <p:nvPr/>
-        </p:nvCxnSpPr>
-        <p:spPr>
-          <a:xfrm>
-            <a:off x="3733799" y="3429000"/>
-            <a:ext cx="783771" cy="254792"/>
-          </a:xfrm>
-          <a:prstGeom prst="straightConnector1">
-            <a:avLst/>
-          </a:prstGeom>
-          <a:ln w="57150">
-            <a:solidFill>
-              <a:schemeClr val="tx1"/>
-            </a:solidFill>
-            <a:tailEnd type="triangle"/>
-          </a:ln>
-        </p:spPr>
-        <p:style>
-          <a:lnRef idx="1">
-            <a:schemeClr val="accent1"/>
-          </a:lnRef>
-          <a:fillRef idx="0">
-            <a:schemeClr val="accent1"/>
-          </a:fillRef>
-          <a:effectRef idx="0">
-            <a:schemeClr val="accent1"/>
-          </a:effectRef>
-          <a:fontRef idx="minor">
-            <a:schemeClr val="tx1"/>
-          </a:fontRef>
-        </p:style>
-      </p:cxnSp>
-      <p:cxnSp>
-        <p:nvCxnSpPr>
-          <p:cNvPr id="14" name="Straight Arrow Connector 13">
-            <a:extLst>
-              <a:ext uri="{FF2B5EF4-FFF2-40B4-BE49-F238E27FC236}">
-                <a16:creationId xmlns:a16="http://schemas.microsoft.com/office/drawing/2014/main" id="{C380C91A-7886-3047-8C66-45C37317222D}"/>
-              </a:ext>
-            </a:extLst>
-          </p:cNvPr>
-          <p:cNvCxnSpPr>
-            <a:cxnSpLocks/>
-            <a:stCxn id="6" idx="3"/>
-          </p:cNvCxnSpPr>
-          <p:nvPr/>
-        </p:nvCxnSpPr>
-        <p:spPr>
-          <a:xfrm flipV="1">
-            <a:off x="3733799" y="3970564"/>
-            <a:ext cx="783771" cy="144235"/>
-          </a:xfrm>
-          <a:prstGeom prst="straightConnector1">
-            <a:avLst/>
-          </a:prstGeom>
-          <a:ln w="57150">
-            <a:solidFill>
-              <a:schemeClr val="tx1"/>
-            </a:solidFill>
-            <a:tailEnd type="triangle"/>
-          </a:ln>
-        </p:spPr>
-        <p:style>
-          <a:lnRef idx="1">
-            <a:schemeClr val="accent1"/>
-          </a:lnRef>
-          <a:fillRef idx="0">
-            <a:schemeClr val="accent1"/>
-          </a:fillRef>
-          <a:effectRef idx="0">
-            <a:schemeClr val="accent1"/>
-          </a:effectRef>
-          <a:fontRef idx="minor">
-            <a:schemeClr val="tx1"/>
-          </a:fontRef>
-        </p:style>
-      </p:cxnSp>
-      <p:cxnSp>
-        <p:nvCxnSpPr>
-          <p:cNvPr id="17" name="Straight Arrow Connector 16">
-            <a:extLst>
-              <a:ext uri="{FF2B5EF4-FFF2-40B4-BE49-F238E27FC236}">
-                <a16:creationId xmlns:a16="http://schemas.microsoft.com/office/drawing/2014/main" id="{FB2EBF8F-7BEC-314C-B2B3-C2264A914BD8}"/>
-              </a:ext>
-            </a:extLst>
-          </p:cNvPr>
-          <p:cNvCxnSpPr>
-            <a:cxnSpLocks/>
-            <a:stCxn id="7" idx="3"/>
-          </p:cNvCxnSpPr>
-          <p:nvPr/>
-        </p:nvCxnSpPr>
-        <p:spPr>
-          <a:xfrm flipV="1">
-            <a:off x="3733799" y="4243613"/>
-            <a:ext cx="783769" cy="580800"/>
-          </a:xfrm>
-          <a:prstGeom prst="straightConnector1">
-            <a:avLst/>
-          </a:prstGeom>
-          <a:ln w="57150">
-            <a:solidFill>
-              <a:schemeClr val="tx1"/>
-            </a:solidFill>
-            <a:tailEnd type="triangle"/>
-          </a:ln>
-        </p:spPr>
-        <p:style>
-          <a:lnRef idx="1">
-            <a:schemeClr val="accent1"/>
-          </a:lnRef>
-          <a:fillRef idx="0">
-            <a:schemeClr val="accent1"/>
-          </a:fillRef>
-          <a:effectRef idx="0">
-            <a:schemeClr val="accent1"/>
-          </a:effectRef>
-          <a:fontRef idx="minor">
-            <a:schemeClr val="tx1"/>
-          </a:fontRef>
-        </p:style>
-      </p:cxnSp>
-      <p:sp>
-        <p:nvSpPr>
-          <p:cNvPr id="20" name="Rectangle 19">
-            <a:extLst>
-              <a:ext uri="{FF2B5EF4-FFF2-40B4-BE49-F238E27FC236}">
-                <a16:creationId xmlns:a16="http://schemas.microsoft.com/office/drawing/2014/main" id="{1BD6CE95-3C27-0743-A8DD-81BEACEA34F2}"/>
-              </a:ext>
-            </a:extLst>
-          </p:cNvPr>
-          <p:cNvSpPr/>
-          <p:nvPr/>
-        </p:nvSpPr>
-        <p:spPr>
-          <a:xfrm>
-            <a:off x="7598221" y="2522766"/>
-            <a:ext cx="1273636" cy="576942"/>
-          </a:xfrm>
-          <a:prstGeom prst="rect">
-            <a:avLst/>
-          </a:prstGeom>
-          <a:solidFill>
-            <a:srgbClr val="00B050"/>
-          </a:solidFill>
-          <a:ln w="28575">
-            <a:solidFill>
-              <a:schemeClr val="tx1"/>
-            </a:solidFill>
-          </a:ln>
-        </p:spPr>
-        <p:style>
-          <a:lnRef idx="2">
-            <a:schemeClr val="accent1">
-              <a:shade val="50000"/>
-            </a:schemeClr>
-          </a:lnRef>
-          <a:fillRef idx="1">
-            <a:schemeClr val="accent1"/>
-          </a:fillRef>
-          <a:effectRef idx="0">
-            <a:schemeClr val="accent1"/>
-          </a:effectRef>
-          <a:fontRef idx="minor">
-            <a:schemeClr val="lt1"/>
-          </a:fontRef>
-        </p:style>
-        <p:txBody>
-          <a:bodyPr rtlCol="0" anchor="ctr"/>
-          <a:lstStyle/>
-          <a:p>
-            <a:pPr algn="ctr"/>
-            <a:r>
-              <a:rPr lang="en-US" dirty="0">
-                <a:solidFill>
-                  <a:schemeClr val="tx1"/>
-                </a:solidFill>
-              </a:rPr>
-              <a:t>Motor</a:t>
-            </a:r>
-          </a:p>
-        </p:txBody>
-      </p:sp>
-      <p:sp>
-        <p:nvSpPr>
-          <p:cNvPr id="21" name="Rectangle 20">
-            <a:extLst>
-              <a:ext uri="{FF2B5EF4-FFF2-40B4-BE49-F238E27FC236}">
-                <a16:creationId xmlns:a16="http://schemas.microsoft.com/office/drawing/2014/main" id="{E489E27C-DA9F-5443-9F4A-EA38A3F08948}"/>
-              </a:ext>
-            </a:extLst>
-          </p:cNvPr>
-          <p:cNvSpPr/>
-          <p:nvPr/>
-        </p:nvSpPr>
-        <p:spPr>
-          <a:xfrm>
-            <a:off x="7598221" y="3158673"/>
-            <a:ext cx="1273636" cy="576942"/>
-          </a:xfrm>
-          <a:prstGeom prst="rect">
-            <a:avLst/>
-          </a:prstGeom>
-          <a:solidFill>
-            <a:srgbClr val="00B050"/>
-          </a:solidFill>
-          <a:ln w="28575">
-            <a:solidFill>
-              <a:schemeClr val="tx1"/>
-            </a:solidFill>
-          </a:ln>
-        </p:spPr>
-        <p:style>
-          <a:lnRef idx="2">
-            <a:schemeClr val="accent1">
-              <a:shade val="50000"/>
-            </a:schemeClr>
-          </a:lnRef>
-          <a:fillRef idx="1">
-            <a:schemeClr val="accent1"/>
-          </a:fillRef>
-          <a:effectRef idx="0">
-            <a:schemeClr val="accent1"/>
-          </a:effectRef>
-          <a:fontRef idx="minor">
-            <a:schemeClr val="lt1"/>
-          </a:fontRef>
-        </p:style>
-        <p:txBody>
-          <a:bodyPr rtlCol="0" anchor="ctr"/>
-          <a:lstStyle/>
-          <a:p>
-            <a:pPr algn="ctr"/>
-            <a:r>
-              <a:rPr lang="en-US" dirty="0">
-                <a:solidFill>
-                  <a:schemeClr val="tx1"/>
-                </a:solidFill>
-              </a:rPr>
-              <a:t>Servo</a:t>
-            </a:r>
-          </a:p>
-        </p:txBody>
-      </p:sp>
-      <p:sp>
-        <p:nvSpPr>
-          <p:cNvPr id="22" name="Rectangle 21">
-            <a:extLst>
-              <a:ext uri="{FF2B5EF4-FFF2-40B4-BE49-F238E27FC236}">
-                <a16:creationId xmlns:a16="http://schemas.microsoft.com/office/drawing/2014/main" id="{72D333B7-7F9F-3042-9954-97C939B693EC}"/>
-              </a:ext>
-            </a:extLst>
-          </p:cNvPr>
-          <p:cNvSpPr/>
-          <p:nvPr/>
-        </p:nvSpPr>
-        <p:spPr>
-          <a:xfrm>
-            <a:off x="7598221" y="3831771"/>
-            <a:ext cx="1273636" cy="576942"/>
-          </a:xfrm>
-          <a:prstGeom prst="rect">
-            <a:avLst/>
-          </a:prstGeom>
-          <a:solidFill>
-            <a:srgbClr val="00B050"/>
-          </a:solidFill>
-          <a:ln w="28575">
-            <a:solidFill>
-              <a:schemeClr val="tx1"/>
-            </a:solidFill>
-          </a:ln>
-        </p:spPr>
-        <p:style>
-          <a:lnRef idx="2">
-            <a:schemeClr val="accent1">
-              <a:shade val="50000"/>
-            </a:schemeClr>
-          </a:lnRef>
-          <a:fillRef idx="1">
-            <a:schemeClr val="accent1"/>
-          </a:fillRef>
-          <a:effectRef idx="0">
-            <a:schemeClr val="accent1"/>
-          </a:effectRef>
-          <a:fontRef idx="minor">
-            <a:schemeClr val="lt1"/>
-          </a:fontRef>
-        </p:style>
-        <p:txBody>
-          <a:bodyPr rtlCol="0" anchor="ctr"/>
-          <a:lstStyle/>
-          <a:p>
-            <a:pPr algn="ctr"/>
-            <a:r>
-              <a:rPr lang="en-US" dirty="0">
-                <a:solidFill>
-                  <a:schemeClr val="tx1"/>
-                </a:solidFill>
-              </a:rPr>
-              <a:t>LED</a:t>
-            </a:r>
-          </a:p>
-        </p:txBody>
-      </p:sp>
-      <p:sp>
-        <p:nvSpPr>
-          <p:cNvPr id="23" name="Rectangle 22">
-            <a:extLst>
-              <a:ext uri="{FF2B5EF4-FFF2-40B4-BE49-F238E27FC236}">
-                <a16:creationId xmlns:a16="http://schemas.microsoft.com/office/drawing/2014/main" id="{192A7DCB-BEB2-D944-8B0E-8BE7F348D80B}"/>
-              </a:ext>
-            </a:extLst>
-          </p:cNvPr>
-          <p:cNvSpPr/>
-          <p:nvPr/>
-        </p:nvSpPr>
-        <p:spPr>
-          <a:xfrm>
-            <a:off x="7598221" y="4488771"/>
-            <a:ext cx="1273636" cy="576942"/>
-          </a:xfrm>
-          <a:prstGeom prst="rect">
-            <a:avLst/>
-          </a:prstGeom>
-          <a:solidFill>
-            <a:srgbClr val="00B050"/>
-          </a:solidFill>
-          <a:ln w="28575">
-            <a:solidFill>
-              <a:schemeClr val="tx1"/>
-            </a:solidFill>
-          </a:ln>
-        </p:spPr>
-        <p:style>
-          <a:lnRef idx="2">
-            <a:schemeClr val="accent1">
-              <a:shade val="50000"/>
-            </a:schemeClr>
-          </a:lnRef>
-          <a:fillRef idx="1">
-            <a:schemeClr val="accent1"/>
-          </a:fillRef>
-          <a:effectRef idx="0">
-            <a:schemeClr val="accent1"/>
-          </a:effectRef>
-          <a:fontRef idx="minor">
-            <a:schemeClr val="lt1"/>
-          </a:fontRef>
-        </p:style>
-        <p:txBody>
-          <a:bodyPr rtlCol="0" anchor="ctr"/>
-          <a:lstStyle/>
-          <a:p>
-            <a:pPr algn="ctr"/>
-            <a:r>
-              <a:rPr lang="en-US" dirty="0">
-                <a:solidFill>
-                  <a:schemeClr val="tx1"/>
-                </a:solidFill>
-              </a:rPr>
-              <a:t>Display</a:t>
-            </a:r>
-          </a:p>
-        </p:txBody>
-      </p:sp>
-      <p:cxnSp>
-        <p:nvCxnSpPr>
-          <p:cNvPr id="24" name="Straight Arrow Connector 23">
-            <a:extLst>
-              <a:ext uri="{FF2B5EF4-FFF2-40B4-BE49-F238E27FC236}">
-                <a16:creationId xmlns:a16="http://schemas.microsoft.com/office/drawing/2014/main" id="{8B88448C-63D6-CC43-B591-B6301AAEFA6B}"/>
-              </a:ext>
-            </a:extLst>
-          </p:cNvPr>
-          <p:cNvCxnSpPr>
-            <a:cxnSpLocks/>
-            <a:endCxn id="20" idx="1"/>
-          </p:cNvCxnSpPr>
-          <p:nvPr/>
-        </p:nvCxnSpPr>
-        <p:spPr>
-          <a:xfrm flipV="1">
-            <a:off x="6814454" y="2811237"/>
-            <a:ext cx="783767" cy="660968"/>
-          </a:xfrm>
-          <a:prstGeom prst="straightConnector1">
-            <a:avLst/>
-          </a:prstGeom>
-          <a:ln w="57150">
-            <a:solidFill>
-              <a:schemeClr val="tx1"/>
-            </a:solidFill>
-            <a:tailEnd type="triangle"/>
-          </a:ln>
-        </p:spPr>
-        <p:style>
-          <a:lnRef idx="1">
-            <a:schemeClr val="accent1"/>
-          </a:lnRef>
-          <a:fillRef idx="0">
-            <a:schemeClr val="accent1"/>
-          </a:fillRef>
-          <a:effectRef idx="0">
-            <a:schemeClr val="accent1"/>
-          </a:effectRef>
-          <a:fontRef idx="minor">
-            <a:schemeClr val="tx1"/>
-          </a:fontRef>
-        </p:style>
-      </p:cxnSp>
-      <p:cxnSp>
-        <p:nvCxnSpPr>
-          <p:cNvPr id="28" name="Straight Arrow Connector 27">
-            <a:extLst>
-              <a:ext uri="{FF2B5EF4-FFF2-40B4-BE49-F238E27FC236}">
-                <a16:creationId xmlns:a16="http://schemas.microsoft.com/office/drawing/2014/main" id="{9462C1F5-8D8E-FA49-BF66-F246B2828481}"/>
-              </a:ext>
-            </a:extLst>
-          </p:cNvPr>
-          <p:cNvCxnSpPr>
-            <a:cxnSpLocks/>
-            <a:endCxn id="21" idx="1"/>
-          </p:cNvCxnSpPr>
-          <p:nvPr/>
-        </p:nvCxnSpPr>
-        <p:spPr>
-          <a:xfrm flipV="1">
-            <a:off x="6814452" y="3447144"/>
-            <a:ext cx="783769" cy="255867"/>
-          </a:xfrm>
-          <a:prstGeom prst="straightConnector1">
-            <a:avLst/>
-          </a:prstGeom>
-          <a:ln w="57150">
-            <a:solidFill>
-              <a:schemeClr val="tx1"/>
-            </a:solidFill>
-            <a:tailEnd type="triangle"/>
-          </a:ln>
-        </p:spPr>
-        <p:style>
-          <a:lnRef idx="1">
-            <a:schemeClr val="accent1"/>
-          </a:lnRef>
-          <a:fillRef idx="0">
-            <a:schemeClr val="accent1"/>
-          </a:fillRef>
-          <a:effectRef idx="0">
-            <a:schemeClr val="accent1"/>
-          </a:effectRef>
-          <a:fontRef idx="minor">
-            <a:schemeClr val="tx1"/>
-          </a:fontRef>
-        </p:style>
-      </p:cxnSp>
-      <p:cxnSp>
-        <p:nvCxnSpPr>
-          <p:cNvPr id="31" name="Straight Arrow Connector 30">
-            <a:extLst>
-              <a:ext uri="{FF2B5EF4-FFF2-40B4-BE49-F238E27FC236}">
-                <a16:creationId xmlns:a16="http://schemas.microsoft.com/office/drawing/2014/main" id="{DADAFE9B-11B0-944F-9F70-098D116B8429}"/>
-              </a:ext>
-            </a:extLst>
-          </p:cNvPr>
-          <p:cNvCxnSpPr>
-            <a:cxnSpLocks/>
-            <a:endCxn id="22" idx="1"/>
-          </p:cNvCxnSpPr>
-          <p:nvPr/>
-        </p:nvCxnSpPr>
-        <p:spPr>
-          <a:xfrm>
-            <a:off x="6814452" y="3954804"/>
-            <a:ext cx="783769" cy="165438"/>
-          </a:xfrm>
-          <a:prstGeom prst="straightConnector1">
-            <a:avLst/>
-          </a:prstGeom>
-          <a:ln w="57150">
-            <a:solidFill>
-              <a:schemeClr val="tx1"/>
-            </a:solidFill>
-            <a:tailEnd type="triangle"/>
-          </a:ln>
-        </p:spPr>
-        <p:style>
-          <a:lnRef idx="1">
-            <a:schemeClr val="accent1"/>
-          </a:lnRef>
-          <a:fillRef idx="0">
-            <a:schemeClr val="accent1"/>
-          </a:fillRef>
-          <a:effectRef idx="0">
-            <a:schemeClr val="accent1"/>
-          </a:effectRef>
-          <a:fontRef idx="minor">
-            <a:schemeClr val="tx1"/>
-          </a:fontRef>
-        </p:style>
-      </p:cxnSp>
-      <p:cxnSp>
-        <p:nvCxnSpPr>
-          <p:cNvPr id="34" name="Straight Arrow Connector 33">
-            <a:extLst>
-              <a:ext uri="{FF2B5EF4-FFF2-40B4-BE49-F238E27FC236}">
-                <a16:creationId xmlns:a16="http://schemas.microsoft.com/office/drawing/2014/main" id="{F4A69DD9-4B9C-B349-BA0D-8DB2380B3999}"/>
-              </a:ext>
-            </a:extLst>
-          </p:cNvPr>
-          <p:cNvCxnSpPr>
-            <a:cxnSpLocks/>
-            <a:endCxn id="23" idx="1"/>
-          </p:cNvCxnSpPr>
-          <p:nvPr/>
-        </p:nvCxnSpPr>
-        <p:spPr>
-          <a:xfrm>
-            <a:off x="6814450" y="4185610"/>
-            <a:ext cx="783771" cy="591632"/>
-          </a:xfrm>
-          <a:prstGeom prst="straightConnector1">
-            <a:avLst/>
-          </a:prstGeom>
-          <a:ln w="57150">
-            <a:solidFill>
-              <a:schemeClr val="tx1"/>
-            </a:solidFill>
-            <a:tailEnd type="triangle"/>
-          </a:ln>
-        </p:spPr>
-        <p:style>
-          <a:lnRef idx="1">
-            <a:schemeClr val="accent1"/>
-          </a:lnRef>
-          <a:fillRef idx="0">
-            <a:schemeClr val="accent1"/>
-          </a:fillRef>
-          <a:effectRef idx="0">
-            <a:schemeClr val="accent1"/>
-          </a:effectRef>
-          <a:fontRef idx="minor">
-            <a:schemeClr val="tx1"/>
-          </a:fontRef>
-        </p:style>
-      </p:cxnSp>
+              <a:t>Output Controls</a:t>
+            </a:r>
+          </a:p>
+        </p:txBody>
+      </p:sp>
     </p:spTree>
     <p:extLst>
       <p:ext uri="{BB962C8B-B14F-4D97-AF65-F5344CB8AC3E}">
-        <p14:creationId xmlns:p14="http://schemas.microsoft.com/office/powerpoint/2010/main" val="1636464638"/>
+        <p14:creationId xmlns:p14="http://schemas.microsoft.com/office/powerpoint/2010/main" val="558389087"/>
       </p:ext>
     </p:extLst>
   </p:cSld>
@@ -4683,7 +3926,7 @@
           <p:cNvPr id="2" name="Title 1">
             <a:extLst>
               <a:ext uri="{FF2B5EF4-FFF2-40B4-BE49-F238E27FC236}">
-                <a16:creationId xmlns:a16="http://schemas.microsoft.com/office/drawing/2014/main" id="{ED13992E-ACB0-5F43-B6DB-E512889979BD}"/>
+                <a16:creationId xmlns:a16="http://schemas.microsoft.com/office/drawing/2014/main" id="{72E15970-820C-6641-8B83-F3860EDA1AE0}"/>
               </a:ext>
             </a:extLst>
           </p:cNvPr>
@@ -4699,93 +3942,381 @@
           <a:bodyPr/>
           <a:lstStyle/>
           <a:p>
+            <a:endParaRPr lang="en-US"/>
+          </a:p>
+        </p:txBody>
+      </p:sp>
+      <p:sp>
+        <p:nvSpPr>
+          <p:cNvPr id="3" name="Content Placeholder 2">
+            <a:extLst>
+              <a:ext uri="{FF2B5EF4-FFF2-40B4-BE49-F238E27FC236}">
+                <a16:creationId xmlns:a16="http://schemas.microsoft.com/office/drawing/2014/main" id="{1A5A24DC-9779-0F48-B7B7-8E56F95B0F88}"/>
+              </a:ext>
+            </a:extLst>
+          </p:cNvPr>
+          <p:cNvSpPr>
+            <a:spLocks noGrp="1"/>
+          </p:cNvSpPr>
+          <p:nvPr>
+            <p:ph idx="1"/>
+          </p:nvPr>
+        </p:nvSpPr>
+        <p:spPr>
+          <a:xfrm>
+            <a:off x="838200" y="5595483"/>
+            <a:ext cx="10515600" cy="897392"/>
+          </a:xfrm>
+        </p:spPr>
+        <p:txBody>
+          <a:bodyPr/>
+          <a:lstStyle/>
+          <a:p>
             <a:endParaRPr lang="en-US" dirty="0"/>
           </a:p>
         </p:txBody>
       </p:sp>
       <p:sp>
         <p:nvSpPr>
-          <p:cNvPr id="3" name="Content Placeholder 2">
-            <a:extLst>
-              <a:ext uri="{FF2B5EF4-FFF2-40B4-BE49-F238E27FC236}">
-                <a16:creationId xmlns:a16="http://schemas.microsoft.com/office/drawing/2014/main" id="{22F8F27B-C275-E04C-A244-980B55B9ECF2}"/>
-              </a:ext>
-            </a:extLst>
-          </p:cNvPr>
-          <p:cNvSpPr>
-            <a:spLocks noGrp="1"/>
-          </p:cNvSpPr>
-          <p:nvPr>
-            <p:ph idx="1"/>
-          </p:nvPr>
+          <p:cNvPr id="4" name="Rectangle 3">
+            <a:extLst>
+              <a:ext uri="{FF2B5EF4-FFF2-40B4-BE49-F238E27FC236}">
+                <a16:creationId xmlns:a16="http://schemas.microsoft.com/office/drawing/2014/main" id="{2F801350-0380-A14C-B912-49A0104988CD}"/>
+              </a:ext>
+            </a:extLst>
+          </p:cNvPr>
+          <p:cNvSpPr/>
+          <p:nvPr/>
         </p:nvSpPr>
         <p:spPr>
           <a:xfrm>
-            <a:off x="838200" y="5040085"/>
-            <a:ext cx="10515600" cy="1136877"/>
-          </a:xfrm>
-        </p:spPr>
-        <p:txBody>
-          <a:bodyPr/>
-          <a:lstStyle/>
-          <a:p>
-            <a:endParaRPr lang="en-US" dirty="0"/>
-          </a:p>
-        </p:txBody>
-      </p:sp>
-      <p:pic>
-        <p:nvPicPr>
-          <p:cNvPr id="4" name="Picture 3">
-            <a:extLst>
-              <a:ext uri="{FF2B5EF4-FFF2-40B4-BE49-F238E27FC236}">
-                <a16:creationId xmlns:a16="http://schemas.microsoft.com/office/drawing/2014/main" id="{7643E78D-C933-2D42-931D-154167148B98}"/>
-              </a:ext>
-            </a:extLst>
-          </p:cNvPr>
-          <p:cNvPicPr>
-            <a:picLocks noChangeAspect="1"/>
-          </p:cNvPicPr>
-          <p:nvPr/>
-        </p:nvPicPr>
-        <p:blipFill>
-          <a:blip r:embed="rId2"/>
-          <a:stretch>
-            <a:fillRect/>
-          </a:stretch>
-        </p:blipFill>
-        <p:spPr>
-          <a:xfrm>
-            <a:off x="2042743" y="2188936"/>
-            <a:ext cx="3449100" cy="2002064"/>
+            <a:off x="1763484" y="3140529"/>
+            <a:ext cx="1970315" cy="576942"/>
           </a:xfrm>
           <a:prstGeom prst="rect">
             <a:avLst/>
           </a:prstGeom>
-        </p:spPr>
-      </p:pic>
+          <a:solidFill>
+            <a:schemeClr val="accent2"/>
+          </a:solidFill>
+          <a:ln w="28575">
+            <a:solidFill>
+              <a:schemeClr val="tx1"/>
+            </a:solidFill>
+          </a:ln>
+        </p:spPr>
+        <p:style>
+          <a:lnRef idx="2">
+            <a:schemeClr val="accent1">
+              <a:shade val="50000"/>
+            </a:schemeClr>
+          </a:lnRef>
+          <a:fillRef idx="1">
+            <a:schemeClr val="accent1"/>
+          </a:fillRef>
+          <a:effectRef idx="0">
+            <a:schemeClr val="accent1"/>
+          </a:effectRef>
+          <a:fontRef idx="minor">
+            <a:schemeClr val="lt1"/>
+          </a:fontRef>
+        </p:style>
+        <p:txBody>
+          <a:bodyPr rtlCol="0" anchor="ctr"/>
+          <a:lstStyle/>
+          <a:p>
+            <a:pPr algn="ctr"/>
+            <a:r>
+              <a:rPr lang="en-US" dirty="0">
+                <a:solidFill>
+                  <a:schemeClr val="tx1"/>
+                </a:solidFill>
+              </a:rPr>
+              <a:t>Light Sensor</a:t>
+            </a:r>
+          </a:p>
+        </p:txBody>
+      </p:sp>
+      <p:sp>
+        <p:nvSpPr>
+          <p:cNvPr id="5" name="Rectangle 4">
+            <a:extLst>
+              <a:ext uri="{FF2B5EF4-FFF2-40B4-BE49-F238E27FC236}">
+                <a16:creationId xmlns:a16="http://schemas.microsoft.com/office/drawing/2014/main" id="{1FAA985C-9FB9-574F-80A8-0E3550E6F974}"/>
+              </a:ext>
+            </a:extLst>
+          </p:cNvPr>
+          <p:cNvSpPr/>
+          <p:nvPr/>
+        </p:nvSpPr>
+        <p:spPr>
+          <a:xfrm>
+            <a:off x="1763485" y="2454730"/>
+            <a:ext cx="1970316" cy="576942"/>
+          </a:xfrm>
+          <a:prstGeom prst="rect">
+            <a:avLst/>
+          </a:prstGeom>
+          <a:solidFill>
+            <a:schemeClr val="accent2"/>
+          </a:solidFill>
+          <a:ln w="28575">
+            <a:solidFill>
+              <a:schemeClr val="tx1"/>
+            </a:solidFill>
+          </a:ln>
+        </p:spPr>
+        <p:style>
+          <a:lnRef idx="2">
+            <a:schemeClr val="accent1">
+              <a:shade val="50000"/>
+            </a:schemeClr>
+          </a:lnRef>
+          <a:fillRef idx="1">
+            <a:schemeClr val="accent1"/>
+          </a:fillRef>
+          <a:effectRef idx="0">
+            <a:schemeClr val="accent1"/>
+          </a:effectRef>
+          <a:fontRef idx="minor">
+            <a:schemeClr val="lt1"/>
+          </a:fontRef>
+        </p:style>
+        <p:txBody>
+          <a:bodyPr rtlCol="0" anchor="ctr"/>
+          <a:lstStyle/>
+          <a:p>
+            <a:pPr algn="ctr"/>
+            <a:r>
+              <a:rPr lang="en-US" dirty="0">
+                <a:solidFill>
+                  <a:schemeClr val="tx1"/>
+                </a:solidFill>
+              </a:rPr>
+              <a:t>Distance Sensor</a:t>
+            </a:r>
+          </a:p>
+        </p:txBody>
+      </p:sp>
+      <p:sp>
+        <p:nvSpPr>
+          <p:cNvPr id="6" name="Rectangle 5">
+            <a:extLst>
+              <a:ext uri="{FF2B5EF4-FFF2-40B4-BE49-F238E27FC236}">
+                <a16:creationId xmlns:a16="http://schemas.microsoft.com/office/drawing/2014/main" id="{EE905EA8-E624-4E4F-862E-84D086F2CA43}"/>
+              </a:ext>
+            </a:extLst>
+          </p:cNvPr>
+          <p:cNvSpPr/>
+          <p:nvPr/>
+        </p:nvSpPr>
+        <p:spPr>
+          <a:xfrm>
+            <a:off x="1763484" y="3826328"/>
+            <a:ext cx="1970315" cy="576942"/>
+          </a:xfrm>
+          <a:prstGeom prst="rect">
+            <a:avLst/>
+          </a:prstGeom>
+          <a:solidFill>
+            <a:schemeClr val="accent2"/>
+          </a:solidFill>
+          <a:ln w="28575">
+            <a:solidFill>
+              <a:schemeClr val="tx1"/>
+            </a:solidFill>
+          </a:ln>
+        </p:spPr>
+        <p:style>
+          <a:lnRef idx="2">
+            <a:schemeClr val="accent1">
+              <a:shade val="50000"/>
+            </a:schemeClr>
+          </a:lnRef>
+          <a:fillRef idx="1">
+            <a:schemeClr val="accent1"/>
+          </a:fillRef>
+          <a:effectRef idx="0">
+            <a:schemeClr val="accent1"/>
+          </a:effectRef>
+          <a:fontRef idx="minor">
+            <a:schemeClr val="lt1"/>
+          </a:fontRef>
+        </p:style>
+        <p:txBody>
+          <a:bodyPr rtlCol="0" anchor="ctr"/>
+          <a:lstStyle/>
+          <a:p>
+            <a:pPr algn="ctr"/>
+            <a:r>
+              <a:rPr lang="en-US" dirty="0">
+                <a:solidFill>
+                  <a:schemeClr val="tx1"/>
+                </a:solidFill>
+              </a:rPr>
+              <a:t>Motion Sensor</a:t>
+            </a:r>
+          </a:p>
+        </p:txBody>
+      </p:sp>
+      <p:sp>
+        <p:nvSpPr>
+          <p:cNvPr id="7" name="Rectangle 6">
+            <a:extLst>
+              <a:ext uri="{FF2B5EF4-FFF2-40B4-BE49-F238E27FC236}">
+                <a16:creationId xmlns:a16="http://schemas.microsoft.com/office/drawing/2014/main" id="{BF2B3342-F2AC-3648-A106-A26CF4E66CC0}"/>
+              </a:ext>
+            </a:extLst>
+          </p:cNvPr>
+          <p:cNvSpPr/>
+          <p:nvPr/>
+        </p:nvSpPr>
+        <p:spPr>
+          <a:xfrm>
+            <a:off x="1763484" y="4535942"/>
+            <a:ext cx="1970315" cy="576942"/>
+          </a:xfrm>
+          <a:prstGeom prst="rect">
+            <a:avLst/>
+          </a:prstGeom>
+          <a:solidFill>
+            <a:schemeClr val="accent2"/>
+          </a:solidFill>
+          <a:ln w="28575">
+            <a:solidFill>
+              <a:schemeClr val="tx1"/>
+            </a:solidFill>
+          </a:ln>
+        </p:spPr>
+        <p:style>
+          <a:lnRef idx="2">
+            <a:schemeClr val="accent1">
+              <a:shade val="50000"/>
+            </a:schemeClr>
+          </a:lnRef>
+          <a:fillRef idx="1">
+            <a:schemeClr val="accent1"/>
+          </a:fillRef>
+          <a:effectRef idx="0">
+            <a:schemeClr val="accent1"/>
+          </a:effectRef>
+          <a:fontRef idx="minor">
+            <a:schemeClr val="lt1"/>
+          </a:fontRef>
+        </p:style>
+        <p:txBody>
+          <a:bodyPr rtlCol="0" anchor="ctr"/>
+          <a:lstStyle/>
+          <a:p>
+            <a:pPr algn="ctr"/>
+            <a:r>
+              <a:rPr lang="en-US" dirty="0">
+                <a:solidFill>
+                  <a:schemeClr val="tx1"/>
+                </a:solidFill>
+              </a:rPr>
+              <a:t>Sound Sensor</a:t>
+            </a:r>
+          </a:p>
+        </p:txBody>
+      </p:sp>
+      <p:sp>
+        <p:nvSpPr>
+          <p:cNvPr id="8" name="Rectangle 7">
+            <a:extLst>
+              <a:ext uri="{FF2B5EF4-FFF2-40B4-BE49-F238E27FC236}">
+                <a16:creationId xmlns:a16="http://schemas.microsoft.com/office/drawing/2014/main" id="{93194C55-8D28-DF45-A3FE-FFE03F9649AD}"/>
+              </a:ext>
+            </a:extLst>
+          </p:cNvPr>
+          <p:cNvSpPr/>
+          <p:nvPr/>
+        </p:nvSpPr>
+        <p:spPr>
+          <a:xfrm>
+            <a:off x="4517568" y="3243035"/>
+            <a:ext cx="2296886" cy="1186543"/>
+          </a:xfrm>
+          <a:prstGeom prst="rect">
+            <a:avLst/>
+          </a:prstGeom>
+          <a:solidFill>
+            <a:srgbClr val="FFFF00"/>
+          </a:solidFill>
+          <a:ln w="28575">
+            <a:solidFill>
+              <a:schemeClr val="tx1"/>
+            </a:solidFill>
+          </a:ln>
+        </p:spPr>
+        <p:style>
+          <a:lnRef idx="2">
+            <a:schemeClr val="accent1">
+              <a:shade val="50000"/>
+            </a:schemeClr>
+          </a:lnRef>
+          <a:fillRef idx="1">
+            <a:schemeClr val="accent1"/>
+          </a:fillRef>
+          <a:effectRef idx="0">
+            <a:schemeClr val="accent1"/>
+          </a:effectRef>
+          <a:fontRef idx="minor">
+            <a:schemeClr val="lt1"/>
+          </a:fontRef>
+        </p:style>
+        <p:txBody>
+          <a:bodyPr rtlCol="0" anchor="ctr"/>
+          <a:lstStyle/>
+          <a:p>
+            <a:pPr algn="ctr"/>
+            <a:r>
+              <a:rPr lang="en-US" sz="2400" b="1" dirty="0">
+                <a:solidFill>
+                  <a:schemeClr val="tx1"/>
+                </a:solidFill>
+              </a:rPr>
+              <a:t>Raspberry Pi</a:t>
+            </a:r>
+          </a:p>
+          <a:p>
+            <a:pPr algn="ctr"/>
+            <a:r>
+              <a:rPr lang="en-US" sz="2400" b="1" dirty="0">
+                <a:solidFill>
+                  <a:schemeClr val="tx1"/>
+                </a:solidFill>
+              </a:rPr>
+              <a:t>Pico</a:t>
+            </a:r>
+          </a:p>
+        </p:txBody>
+      </p:sp>
       <p:cxnSp>
         <p:nvCxnSpPr>
-          <p:cNvPr id="6" name="Straight Arrow Connector 5">
-            <a:extLst>
-              <a:ext uri="{FF2B5EF4-FFF2-40B4-BE49-F238E27FC236}">
-                <a16:creationId xmlns:a16="http://schemas.microsoft.com/office/drawing/2014/main" id="{15088092-AE27-A14F-8EC7-6B3EF2528DCB}"/>
-              </a:ext>
-            </a:extLst>
-          </p:cNvPr>
-          <p:cNvCxnSpPr/>
+          <p:cNvPr id="10" name="Straight Arrow Connector 9">
+            <a:extLst>
+              <a:ext uri="{FF2B5EF4-FFF2-40B4-BE49-F238E27FC236}">
+                <a16:creationId xmlns:a16="http://schemas.microsoft.com/office/drawing/2014/main" id="{BCF1FA16-123C-C04D-91C5-87842992BC8C}"/>
+              </a:ext>
+            </a:extLst>
+          </p:cNvPr>
+          <p:cNvCxnSpPr>
+            <a:stCxn id="5" idx="3"/>
+          </p:cNvCxnSpPr>
           <p:nvPr/>
         </p:nvCxnSpPr>
         <p:spPr>
-          <a:xfrm flipH="1">
-            <a:off x="5617028" y="3038814"/>
-            <a:ext cx="957943" cy="217715"/>
+          <a:xfrm>
+            <a:off x="3733801" y="2743201"/>
+            <a:ext cx="783771" cy="685799"/>
           </a:xfrm>
           <a:prstGeom prst="straightConnector1">
             <a:avLst/>
           </a:prstGeom>
-          <a:ln w="38100">
+          <a:ln w="57150">
             <a:solidFill>
-              <a:srgbClr val="FF0000"/>
+              <a:schemeClr val="tx1"/>
             </a:solidFill>
             <a:tailEnd type="triangle"/>
           </a:ln>
@@ -4807,25 +4338,28 @@
       </p:cxnSp>
       <p:cxnSp>
         <p:nvCxnSpPr>
-          <p:cNvPr id="7" name="Straight Arrow Connector 6">
-            <a:extLst>
-              <a:ext uri="{FF2B5EF4-FFF2-40B4-BE49-F238E27FC236}">
-                <a16:creationId xmlns:a16="http://schemas.microsoft.com/office/drawing/2014/main" id="{B53A1370-833E-674D-A08D-8555DB5A2CBC}"/>
-              </a:ext>
-            </a:extLst>
-          </p:cNvPr>
-          <p:cNvCxnSpPr/>
+          <p:cNvPr id="11" name="Straight Arrow Connector 10">
+            <a:extLst>
+              <a:ext uri="{FF2B5EF4-FFF2-40B4-BE49-F238E27FC236}">
+                <a16:creationId xmlns:a16="http://schemas.microsoft.com/office/drawing/2014/main" id="{57757574-4FEA-7F44-BB17-553C236E2BBE}"/>
+              </a:ext>
+            </a:extLst>
+          </p:cNvPr>
+          <p:cNvCxnSpPr>
+            <a:cxnSpLocks/>
+            <a:stCxn id="4" idx="3"/>
+          </p:cNvCxnSpPr>
           <p:nvPr/>
         </p:nvCxnSpPr>
         <p:spPr>
-          <a:xfrm flipH="1">
-            <a:off x="5617027" y="3429000"/>
-            <a:ext cx="957943" cy="217715"/>
+          <a:xfrm>
+            <a:off x="3733799" y="3429000"/>
+            <a:ext cx="783771" cy="254792"/>
           </a:xfrm>
           <a:prstGeom prst="straightConnector1">
             <a:avLst/>
           </a:prstGeom>
-          <a:ln w="38100">
+          <a:ln w="57150">
             <a:solidFill>
               <a:schemeClr val="tx1"/>
             </a:solidFill>
@@ -4849,29 +4383,30 @@
       </p:cxnSp>
       <p:cxnSp>
         <p:nvCxnSpPr>
-          <p:cNvPr id="8" name="Straight Arrow Connector 7">
-            <a:extLst>
-              <a:ext uri="{FF2B5EF4-FFF2-40B4-BE49-F238E27FC236}">
-                <a16:creationId xmlns:a16="http://schemas.microsoft.com/office/drawing/2014/main" id="{537982A4-1F6F-5348-8A97-D7237304EBA3}"/>
+          <p:cNvPr id="14" name="Straight Arrow Connector 13">
+            <a:extLst>
+              <a:ext uri="{FF2B5EF4-FFF2-40B4-BE49-F238E27FC236}">
+                <a16:creationId xmlns:a16="http://schemas.microsoft.com/office/drawing/2014/main" id="{C380C91A-7886-3047-8C66-45C37317222D}"/>
               </a:ext>
             </a:extLst>
           </p:cNvPr>
           <p:cNvCxnSpPr>
             <a:cxnSpLocks/>
+            <a:stCxn id="6" idx="3"/>
           </p:cNvCxnSpPr>
           <p:nvPr/>
         </p:nvCxnSpPr>
         <p:spPr>
-          <a:xfrm>
-            <a:off x="1322614" y="3065801"/>
-            <a:ext cx="720129" cy="163740"/>
+          <a:xfrm flipV="1">
+            <a:off x="3733799" y="3970564"/>
+            <a:ext cx="783771" cy="144235"/>
           </a:xfrm>
           <a:prstGeom prst="straightConnector1">
             <a:avLst/>
           </a:prstGeom>
-          <a:ln w="38100">
+          <a:ln w="57150">
             <a:solidFill>
-              <a:schemeClr val="accent1"/>
+              <a:schemeClr val="tx1"/>
             </a:solidFill>
             <a:tailEnd type="triangle"/>
           </a:ln>
@@ -4891,109 +4426,32 @@
           </a:fontRef>
         </p:style>
       </p:cxnSp>
-      <p:sp>
-        <p:nvSpPr>
-          <p:cNvPr id="11" name="TextBox 10">
-            <a:extLst>
-              <a:ext uri="{FF2B5EF4-FFF2-40B4-BE49-F238E27FC236}">
-                <a16:creationId xmlns:a16="http://schemas.microsoft.com/office/drawing/2014/main" id="{8D76255C-F4B2-0649-9E64-4FF7B5096C57}"/>
-              </a:ext>
-            </a:extLst>
-          </p:cNvPr>
-          <p:cNvSpPr txBox="1"/>
-          <p:nvPr/>
-        </p:nvSpPr>
-        <p:spPr>
-          <a:xfrm>
-            <a:off x="759831" y="2811388"/>
-            <a:ext cx="562783" cy="369332"/>
-          </a:xfrm>
-          <a:prstGeom prst="rect">
-            <a:avLst/>
-          </a:prstGeom>
-          <a:noFill/>
-        </p:spPr>
-        <p:txBody>
-          <a:bodyPr wrap="none" rtlCol="0">
-            <a:spAutoFit/>
-          </a:bodyPr>
-          <a:lstStyle/>
-          <a:p>
-            <a:r>
-              <a:rPr lang="en-US" b="1" dirty="0">
-                <a:solidFill>
-                  <a:schemeClr val="accent1"/>
-                </a:solidFill>
-              </a:rPr>
-              <a:t>SDA</a:t>
-            </a:r>
-          </a:p>
-        </p:txBody>
-      </p:sp>
-      <p:sp>
-        <p:nvSpPr>
-          <p:cNvPr id="12" name="TextBox 11">
-            <a:extLst>
-              <a:ext uri="{FF2B5EF4-FFF2-40B4-BE49-F238E27FC236}">
-                <a16:creationId xmlns:a16="http://schemas.microsoft.com/office/drawing/2014/main" id="{FCC25A68-4D57-6E42-AEF0-B1C5EBF301A5}"/>
-              </a:ext>
-            </a:extLst>
-          </p:cNvPr>
-          <p:cNvSpPr txBox="1"/>
-          <p:nvPr/>
-        </p:nvSpPr>
-        <p:spPr>
-          <a:xfrm>
-            <a:off x="759831" y="3229541"/>
-            <a:ext cx="513282" cy="369332"/>
-          </a:xfrm>
-          <a:prstGeom prst="rect">
-            <a:avLst/>
-          </a:prstGeom>
-          <a:noFill/>
-        </p:spPr>
-        <p:txBody>
-          <a:bodyPr wrap="none" rtlCol="0">
-            <a:spAutoFit/>
-          </a:bodyPr>
-          <a:lstStyle/>
-          <a:p>
-            <a:r>
-              <a:rPr lang="en-US" b="1" dirty="0">
-                <a:solidFill>
-                  <a:srgbClr val="00B050"/>
-                </a:solidFill>
-              </a:rPr>
-              <a:t>SCL</a:t>
-            </a:r>
-          </a:p>
-        </p:txBody>
-      </p:sp>
       <p:cxnSp>
         <p:nvCxnSpPr>
-          <p:cNvPr id="13" name="Straight Arrow Connector 12">
-            <a:extLst>
-              <a:ext uri="{FF2B5EF4-FFF2-40B4-BE49-F238E27FC236}">
-                <a16:creationId xmlns:a16="http://schemas.microsoft.com/office/drawing/2014/main" id="{97942B8B-40A6-BD41-AF65-8FF787234B27}"/>
+          <p:cNvPr id="17" name="Straight Arrow Connector 16">
+            <a:extLst>
+              <a:ext uri="{FF2B5EF4-FFF2-40B4-BE49-F238E27FC236}">
+                <a16:creationId xmlns:a16="http://schemas.microsoft.com/office/drawing/2014/main" id="{FB2EBF8F-7BEC-314C-B2B3-C2264A914BD8}"/>
               </a:ext>
             </a:extLst>
           </p:cNvPr>
           <p:cNvCxnSpPr>
             <a:cxnSpLocks/>
+            <a:stCxn id="7" idx="3"/>
           </p:cNvCxnSpPr>
           <p:nvPr/>
         </p:nvCxnSpPr>
         <p:spPr>
-          <a:xfrm>
-            <a:off x="1300513" y="3429000"/>
-            <a:ext cx="617045" cy="1"/>
+          <a:xfrm flipV="1">
+            <a:off x="3733799" y="4243613"/>
+            <a:ext cx="783769" cy="580800"/>
           </a:xfrm>
           <a:prstGeom prst="straightConnector1">
             <a:avLst/>
           </a:prstGeom>
-          <a:ln w="38100">
+          <a:ln w="57150">
             <a:solidFill>
-              <a:srgbClr val="00B050"/>
+              <a:schemeClr val="tx1"/>
             </a:solidFill>
             <a:tailEnd type="triangle"/>
           </a:ln>
@@ -5015,82 +4473,432 @@
       </p:cxnSp>
       <p:sp>
         <p:nvSpPr>
-          <p:cNvPr id="17" name="TextBox 16">
-            <a:extLst>
-              <a:ext uri="{FF2B5EF4-FFF2-40B4-BE49-F238E27FC236}">
-                <a16:creationId xmlns:a16="http://schemas.microsoft.com/office/drawing/2014/main" id="{C98757C1-4B5E-5144-8A5E-F39D55D389B3}"/>
-              </a:ext>
-            </a:extLst>
-          </p:cNvPr>
-          <p:cNvSpPr txBox="1"/>
+          <p:cNvPr id="20" name="Rectangle 19">
+            <a:extLst>
+              <a:ext uri="{FF2B5EF4-FFF2-40B4-BE49-F238E27FC236}">
+                <a16:creationId xmlns:a16="http://schemas.microsoft.com/office/drawing/2014/main" id="{1BD6CE95-3C27-0743-A8DD-81BEACEA34F2}"/>
+              </a:ext>
+            </a:extLst>
+          </p:cNvPr>
+          <p:cNvSpPr/>
           <p:nvPr/>
         </p:nvSpPr>
         <p:spPr>
           <a:xfrm>
-            <a:off x="6574970" y="2762568"/>
-            <a:ext cx="560859" cy="369332"/>
+            <a:off x="7598221" y="2522766"/>
+            <a:ext cx="1273636" cy="576942"/>
           </a:xfrm>
           <a:prstGeom prst="rect">
             <a:avLst/>
           </a:prstGeom>
-          <a:noFill/>
-        </p:spPr>
-        <p:txBody>
-          <a:bodyPr wrap="none" rtlCol="0">
-            <a:spAutoFit/>
-          </a:bodyPr>
-          <a:lstStyle/>
-          <a:p>
-            <a:r>
-              <a:rPr lang="en-US" b="1" dirty="0">
+          <a:solidFill>
+            <a:srgbClr val="00B050"/>
+          </a:solidFill>
+          <a:ln w="28575">
+            <a:solidFill>
+              <a:schemeClr val="tx1"/>
+            </a:solidFill>
+          </a:ln>
+        </p:spPr>
+        <p:style>
+          <a:lnRef idx="2">
+            <a:schemeClr val="accent1">
+              <a:shade val="50000"/>
+            </a:schemeClr>
+          </a:lnRef>
+          <a:fillRef idx="1">
+            <a:schemeClr val="accent1"/>
+          </a:fillRef>
+          <a:effectRef idx="0">
+            <a:schemeClr val="accent1"/>
+          </a:effectRef>
+          <a:fontRef idx="minor">
+            <a:schemeClr val="lt1"/>
+          </a:fontRef>
+        </p:style>
+        <p:txBody>
+          <a:bodyPr rtlCol="0" anchor="ctr"/>
+          <a:lstStyle/>
+          <a:p>
+            <a:pPr algn="ctr"/>
+            <a:r>
+              <a:rPr lang="en-US" dirty="0">
                 <a:solidFill>
-                  <a:srgbClr val="FF0000"/>
+                  <a:schemeClr val="tx1"/>
                 </a:solidFill>
               </a:rPr>
-              <a:t>VCC</a:t>
-            </a:r>
-          </a:p>
-        </p:txBody>
-      </p:sp>
-      <p:sp>
-        <p:nvSpPr>
-          <p:cNvPr id="18" name="TextBox 17">
-            <a:extLst>
-              <a:ext uri="{FF2B5EF4-FFF2-40B4-BE49-F238E27FC236}">
-                <a16:creationId xmlns:a16="http://schemas.microsoft.com/office/drawing/2014/main" id="{8CCFEC83-EAEF-3541-9D76-7839B2CC2DDF}"/>
-              </a:ext>
-            </a:extLst>
-          </p:cNvPr>
-          <p:cNvSpPr txBox="1"/>
+              <a:t>Motor</a:t>
+            </a:r>
+          </a:p>
+        </p:txBody>
+      </p:sp>
+      <p:sp>
+        <p:nvSpPr>
+          <p:cNvPr id="21" name="Rectangle 20">
+            <a:extLst>
+              <a:ext uri="{FF2B5EF4-FFF2-40B4-BE49-F238E27FC236}">
+                <a16:creationId xmlns:a16="http://schemas.microsoft.com/office/drawing/2014/main" id="{E489E27C-DA9F-5443-9F4A-EA38A3F08948}"/>
+              </a:ext>
+            </a:extLst>
+          </p:cNvPr>
+          <p:cNvSpPr/>
           <p:nvPr/>
         </p:nvSpPr>
         <p:spPr>
           <a:xfrm>
-            <a:off x="6574969" y="3223480"/>
-            <a:ext cx="630301" cy="369332"/>
+            <a:off x="7598221" y="3158673"/>
+            <a:ext cx="1273636" cy="576942"/>
           </a:xfrm>
           <a:prstGeom prst="rect">
             <a:avLst/>
           </a:prstGeom>
-          <a:noFill/>
-        </p:spPr>
-        <p:txBody>
-          <a:bodyPr wrap="none" rtlCol="0">
-            <a:spAutoFit/>
-          </a:bodyPr>
-          <a:lstStyle/>
-          <a:p>
-            <a:r>
-              <a:rPr lang="en-US" b="1" dirty="0"/>
-              <a:t>GND</a:t>
-            </a:r>
-          </a:p>
-        </p:txBody>
-      </p:sp>
+          <a:solidFill>
+            <a:srgbClr val="00B050"/>
+          </a:solidFill>
+          <a:ln w="28575">
+            <a:solidFill>
+              <a:schemeClr val="tx1"/>
+            </a:solidFill>
+          </a:ln>
+        </p:spPr>
+        <p:style>
+          <a:lnRef idx="2">
+            <a:schemeClr val="accent1">
+              <a:shade val="50000"/>
+            </a:schemeClr>
+          </a:lnRef>
+          <a:fillRef idx="1">
+            <a:schemeClr val="accent1"/>
+          </a:fillRef>
+          <a:effectRef idx="0">
+            <a:schemeClr val="accent1"/>
+          </a:effectRef>
+          <a:fontRef idx="minor">
+            <a:schemeClr val="lt1"/>
+          </a:fontRef>
+        </p:style>
+        <p:txBody>
+          <a:bodyPr rtlCol="0" anchor="ctr"/>
+          <a:lstStyle/>
+          <a:p>
+            <a:pPr algn="ctr"/>
+            <a:r>
+              <a:rPr lang="en-US" dirty="0">
+                <a:solidFill>
+                  <a:schemeClr val="tx1"/>
+                </a:solidFill>
+              </a:rPr>
+              <a:t>Servo</a:t>
+            </a:r>
+          </a:p>
+        </p:txBody>
+      </p:sp>
+      <p:sp>
+        <p:nvSpPr>
+          <p:cNvPr id="22" name="Rectangle 21">
+            <a:extLst>
+              <a:ext uri="{FF2B5EF4-FFF2-40B4-BE49-F238E27FC236}">
+                <a16:creationId xmlns:a16="http://schemas.microsoft.com/office/drawing/2014/main" id="{72D333B7-7F9F-3042-9954-97C939B693EC}"/>
+              </a:ext>
+            </a:extLst>
+          </p:cNvPr>
+          <p:cNvSpPr/>
+          <p:nvPr/>
+        </p:nvSpPr>
+        <p:spPr>
+          <a:xfrm>
+            <a:off x="7598221" y="3831771"/>
+            <a:ext cx="1273636" cy="576942"/>
+          </a:xfrm>
+          <a:prstGeom prst="rect">
+            <a:avLst/>
+          </a:prstGeom>
+          <a:solidFill>
+            <a:srgbClr val="00B050"/>
+          </a:solidFill>
+          <a:ln w="28575">
+            <a:solidFill>
+              <a:schemeClr val="tx1"/>
+            </a:solidFill>
+          </a:ln>
+        </p:spPr>
+        <p:style>
+          <a:lnRef idx="2">
+            <a:schemeClr val="accent1">
+              <a:shade val="50000"/>
+            </a:schemeClr>
+          </a:lnRef>
+          <a:fillRef idx="1">
+            <a:schemeClr val="accent1"/>
+          </a:fillRef>
+          <a:effectRef idx="0">
+            <a:schemeClr val="accent1"/>
+          </a:effectRef>
+          <a:fontRef idx="minor">
+            <a:schemeClr val="lt1"/>
+          </a:fontRef>
+        </p:style>
+        <p:txBody>
+          <a:bodyPr rtlCol="0" anchor="ctr"/>
+          <a:lstStyle/>
+          <a:p>
+            <a:pPr algn="ctr"/>
+            <a:r>
+              <a:rPr lang="en-US" dirty="0">
+                <a:solidFill>
+                  <a:schemeClr val="tx1"/>
+                </a:solidFill>
+              </a:rPr>
+              <a:t>LED</a:t>
+            </a:r>
+          </a:p>
+        </p:txBody>
+      </p:sp>
+      <p:sp>
+        <p:nvSpPr>
+          <p:cNvPr id="23" name="Rectangle 22">
+            <a:extLst>
+              <a:ext uri="{FF2B5EF4-FFF2-40B4-BE49-F238E27FC236}">
+                <a16:creationId xmlns:a16="http://schemas.microsoft.com/office/drawing/2014/main" id="{192A7DCB-BEB2-D944-8B0E-8BE7F348D80B}"/>
+              </a:ext>
+            </a:extLst>
+          </p:cNvPr>
+          <p:cNvSpPr/>
+          <p:nvPr/>
+        </p:nvSpPr>
+        <p:spPr>
+          <a:xfrm>
+            <a:off x="7598221" y="4488771"/>
+            <a:ext cx="1273636" cy="576942"/>
+          </a:xfrm>
+          <a:prstGeom prst="rect">
+            <a:avLst/>
+          </a:prstGeom>
+          <a:solidFill>
+            <a:srgbClr val="00B050"/>
+          </a:solidFill>
+          <a:ln w="28575">
+            <a:solidFill>
+              <a:schemeClr val="tx1"/>
+            </a:solidFill>
+          </a:ln>
+        </p:spPr>
+        <p:style>
+          <a:lnRef idx="2">
+            <a:schemeClr val="accent1">
+              <a:shade val="50000"/>
+            </a:schemeClr>
+          </a:lnRef>
+          <a:fillRef idx="1">
+            <a:schemeClr val="accent1"/>
+          </a:fillRef>
+          <a:effectRef idx="0">
+            <a:schemeClr val="accent1"/>
+          </a:effectRef>
+          <a:fontRef idx="minor">
+            <a:schemeClr val="lt1"/>
+          </a:fontRef>
+        </p:style>
+        <p:txBody>
+          <a:bodyPr rtlCol="0" anchor="ctr"/>
+          <a:lstStyle/>
+          <a:p>
+            <a:pPr algn="ctr"/>
+            <a:r>
+              <a:rPr lang="en-US" dirty="0">
+                <a:solidFill>
+                  <a:schemeClr val="tx1"/>
+                </a:solidFill>
+              </a:rPr>
+              <a:t>Display</a:t>
+            </a:r>
+          </a:p>
+        </p:txBody>
+      </p:sp>
+      <p:cxnSp>
+        <p:nvCxnSpPr>
+          <p:cNvPr id="24" name="Straight Arrow Connector 23">
+            <a:extLst>
+              <a:ext uri="{FF2B5EF4-FFF2-40B4-BE49-F238E27FC236}">
+                <a16:creationId xmlns:a16="http://schemas.microsoft.com/office/drawing/2014/main" id="{8B88448C-63D6-CC43-B591-B6301AAEFA6B}"/>
+              </a:ext>
+            </a:extLst>
+          </p:cNvPr>
+          <p:cNvCxnSpPr>
+            <a:cxnSpLocks/>
+            <a:endCxn id="20" idx="1"/>
+          </p:cNvCxnSpPr>
+          <p:nvPr/>
+        </p:nvCxnSpPr>
+        <p:spPr>
+          <a:xfrm flipV="1">
+            <a:off x="6814454" y="2811237"/>
+            <a:ext cx="783767" cy="660968"/>
+          </a:xfrm>
+          <a:prstGeom prst="straightConnector1">
+            <a:avLst/>
+          </a:prstGeom>
+          <a:ln w="57150">
+            <a:solidFill>
+              <a:schemeClr val="tx1"/>
+            </a:solidFill>
+            <a:tailEnd type="triangle"/>
+          </a:ln>
+        </p:spPr>
+        <p:style>
+          <a:lnRef idx="1">
+            <a:schemeClr val="accent1"/>
+          </a:lnRef>
+          <a:fillRef idx="0">
+            <a:schemeClr val="accent1"/>
+          </a:fillRef>
+          <a:effectRef idx="0">
+            <a:schemeClr val="accent1"/>
+          </a:effectRef>
+          <a:fontRef idx="minor">
+            <a:schemeClr val="tx1"/>
+          </a:fontRef>
+        </p:style>
+      </p:cxnSp>
+      <p:cxnSp>
+        <p:nvCxnSpPr>
+          <p:cNvPr id="28" name="Straight Arrow Connector 27">
+            <a:extLst>
+              <a:ext uri="{FF2B5EF4-FFF2-40B4-BE49-F238E27FC236}">
+                <a16:creationId xmlns:a16="http://schemas.microsoft.com/office/drawing/2014/main" id="{9462C1F5-8D8E-FA49-BF66-F246B2828481}"/>
+              </a:ext>
+            </a:extLst>
+          </p:cNvPr>
+          <p:cNvCxnSpPr>
+            <a:cxnSpLocks/>
+            <a:endCxn id="21" idx="1"/>
+          </p:cNvCxnSpPr>
+          <p:nvPr/>
+        </p:nvCxnSpPr>
+        <p:spPr>
+          <a:xfrm flipV="1">
+            <a:off x="6814452" y="3447144"/>
+            <a:ext cx="783769" cy="255867"/>
+          </a:xfrm>
+          <a:prstGeom prst="straightConnector1">
+            <a:avLst/>
+          </a:prstGeom>
+          <a:ln w="57150">
+            <a:solidFill>
+              <a:schemeClr val="tx1"/>
+            </a:solidFill>
+            <a:tailEnd type="triangle"/>
+          </a:ln>
+        </p:spPr>
+        <p:style>
+          <a:lnRef idx="1">
+            <a:schemeClr val="accent1"/>
+          </a:lnRef>
+          <a:fillRef idx="0">
+            <a:schemeClr val="accent1"/>
+          </a:fillRef>
+          <a:effectRef idx="0">
+            <a:schemeClr val="accent1"/>
+          </a:effectRef>
+          <a:fontRef idx="minor">
+            <a:schemeClr val="tx1"/>
+          </a:fontRef>
+        </p:style>
+      </p:cxnSp>
+      <p:cxnSp>
+        <p:nvCxnSpPr>
+          <p:cNvPr id="31" name="Straight Arrow Connector 30">
+            <a:extLst>
+              <a:ext uri="{FF2B5EF4-FFF2-40B4-BE49-F238E27FC236}">
+                <a16:creationId xmlns:a16="http://schemas.microsoft.com/office/drawing/2014/main" id="{DADAFE9B-11B0-944F-9F70-098D116B8429}"/>
+              </a:ext>
+            </a:extLst>
+          </p:cNvPr>
+          <p:cNvCxnSpPr>
+            <a:cxnSpLocks/>
+            <a:endCxn id="22" idx="1"/>
+          </p:cNvCxnSpPr>
+          <p:nvPr/>
+        </p:nvCxnSpPr>
+        <p:spPr>
+          <a:xfrm>
+            <a:off x="6814452" y="3954804"/>
+            <a:ext cx="783769" cy="165438"/>
+          </a:xfrm>
+          <a:prstGeom prst="straightConnector1">
+            <a:avLst/>
+          </a:prstGeom>
+          <a:ln w="57150">
+            <a:solidFill>
+              <a:schemeClr val="tx1"/>
+            </a:solidFill>
+            <a:tailEnd type="triangle"/>
+          </a:ln>
+        </p:spPr>
+        <p:style>
+          <a:lnRef idx="1">
+            <a:schemeClr val="accent1"/>
+          </a:lnRef>
+          <a:fillRef idx="0">
+            <a:schemeClr val="accent1"/>
+          </a:fillRef>
+          <a:effectRef idx="0">
+            <a:schemeClr val="accent1"/>
+          </a:effectRef>
+          <a:fontRef idx="minor">
+            <a:schemeClr val="tx1"/>
+          </a:fontRef>
+        </p:style>
+      </p:cxnSp>
+      <p:cxnSp>
+        <p:nvCxnSpPr>
+          <p:cNvPr id="34" name="Straight Arrow Connector 33">
+            <a:extLst>
+              <a:ext uri="{FF2B5EF4-FFF2-40B4-BE49-F238E27FC236}">
+                <a16:creationId xmlns:a16="http://schemas.microsoft.com/office/drawing/2014/main" id="{F4A69DD9-4B9C-B349-BA0D-8DB2380B3999}"/>
+              </a:ext>
+            </a:extLst>
+          </p:cNvPr>
+          <p:cNvCxnSpPr>
+            <a:cxnSpLocks/>
+            <a:endCxn id="23" idx="1"/>
+          </p:cNvCxnSpPr>
+          <p:nvPr/>
+        </p:nvCxnSpPr>
+        <p:spPr>
+          <a:xfrm>
+            <a:off x="6814450" y="4185610"/>
+            <a:ext cx="783771" cy="591632"/>
+          </a:xfrm>
+          <a:prstGeom prst="straightConnector1">
+            <a:avLst/>
+          </a:prstGeom>
+          <a:ln w="57150">
+            <a:solidFill>
+              <a:schemeClr val="tx1"/>
+            </a:solidFill>
+            <a:tailEnd type="triangle"/>
+          </a:ln>
+        </p:spPr>
+        <p:style>
+          <a:lnRef idx="1">
+            <a:schemeClr val="accent1"/>
+          </a:lnRef>
+          <a:fillRef idx="0">
+            <a:schemeClr val="accent1"/>
+          </a:fillRef>
+          <a:effectRef idx="0">
+            <a:schemeClr val="accent1"/>
+          </a:effectRef>
+          <a:fontRef idx="minor">
+            <a:schemeClr val="tx1"/>
+          </a:fontRef>
+        </p:style>
+      </p:cxnSp>
     </p:spTree>
     <p:extLst>
       <p:ext uri="{BB962C8B-B14F-4D97-AF65-F5344CB8AC3E}">
-        <p14:creationId xmlns:p14="http://schemas.microsoft.com/office/powerpoint/2010/main" val="749271388"/>
+        <p14:creationId xmlns:p14="http://schemas.microsoft.com/office/powerpoint/2010/main" val="1636464638"/>
       </p:ext>
     </p:extLst>
   </p:cSld>
@@ -5122,6 +4930,445 @@
           <p:cNvPr id="2" name="Title 1">
             <a:extLst>
               <a:ext uri="{FF2B5EF4-FFF2-40B4-BE49-F238E27FC236}">
+                <a16:creationId xmlns:a16="http://schemas.microsoft.com/office/drawing/2014/main" id="{ED13992E-ACB0-5F43-B6DB-E512889979BD}"/>
+              </a:ext>
+            </a:extLst>
+          </p:cNvPr>
+          <p:cNvSpPr>
+            <a:spLocks noGrp="1"/>
+          </p:cNvSpPr>
+          <p:nvPr>
+            <p:ph type="title"/>
+          </p:nvPr>
+        </p:nvSpPr>
+        <p:spPr/>
+        <p:txBody>
+          <a:bodyPr/>
+          <a:lstStyle/>
+          <a:p>
+            <a:endParaRPr lang="en-US" dirty="0"/>
+          </a:p>
+        </p:txBody>
+      </p:sp>
+      <p:sp>
+        <p:nvSpPr>
+          <p:cNvPr id="3" name="Content Placeholder 2">
+            <a:extLst>
+              <a:ext uri="{FF2B5EF4-FFF2-40B4-BE49-F238E27FC236}">
+                <a16:creationId xmlns:a16="http://schemas.microsoft.com/office/drawing/2014/main" id="{22F8F27B-C275-E04C-A244-980B55B9ECF2}"/>
+              </a:ext>
+            </a:extLst>
+          </p:cNvPr>
+          <p:cNvSpPr>
+            <a:spLocks noGrp="1"/>
+          </p:cNvSpPr>
+          <p:nvPr>
+            <p:ph idx="1"/>
+          </p:nvPr>
+        </p:nvSpPr>
+        <p:spPr>
+          <a:xfrm>
+            <a:off x="838200" y="5040085"/>
+            <a:ext cx="10515600" cy="1136877"/>
+          </a:xfrm>
+        </p:spPr>
+        <p:txBody>
+          <a:bodyPr/>
+          <a:lstStyle/>
+          <a:p>
+            <a:endParaRPr lang="en-US" dirty="0"/>
+          </a:p>
+        </p:txBody>
+      </p:sp>
+      <p:pic>
+        <p:nvPicPr>
+          <p:cNvPr id="4" name="Picture 3">
+            <a:extLst>
+              <a:ext uri="{FF2B5EF4-FFF2-40B4-BE49-F238E27FC236}">
+                <a16:creationId xmlns:a16="http://schemas.microsoft.com/office/drawing/2014/main" id="{7643E78D-C933-2D42-931D-154167148B98}"/>
+              </a:ext>
+            </a:extLst>
+          </p:cNvPr>
+          <p:cNvPicPr>
+            <a:picLocks noChangeAspect="1"/>
+          </p:cNvPicPr>
+          <p:nvPr/>
+        </p:nvPicPr>
+        <p:blipFill>
+          <a:blip r:embed="rId2"/>
+          <a:stretch>
+            <a:fillRect/>
+          </a:stretch>
+        </p:blipFill>
+        <p:spPr>
+          <a:xfrm>
+            <a:off x="2042743" y="2188936"/>
+            <a:ext cx="3449100" cy="2002064"/>
+          </a:xfrm>
+          <a:prstGeom prst="rect">
+            <a:avLst/>
+          </a:prstGeom>
+        </p:spPr>
+      </p:pic>
+      <p:cxnSp>
+        <p:nvCxnSpPr>
+          <p:cNvPr id="6" name="Straight Arrow Connector 5">
+            <a:extLst>
+              <a:ext uri="{FF2B5EF4-FFF2-40B4-BE49-F238E27FC236}">
+                <a16:creationId xmlns:a16="http://schemas.microsoft.com/office/drawing/2014/main" id="{15088092-AE27-A14F-8EC7-6B3EF2528DCB}"/>
+              </a:ext>
+            </a:extLst>
+          </p:cNvPr>
+          <p:cNvCxnSpPr/>
+          <p:nvPr/>
+        </p:nvCxnSpPr>
+        <p:spPr>
+          <a:xfrm flipH="1">
+            <a:off x="5617028" y="3038814"/>
+            <a:ext cx="957943" cy="217715"/>
+          </a:xfrm>
+          <a:prstGeom prst="straightConnector1">
+            <a:avLst/>
+          </a:prstGeom>
+          <a:ln w="38100">
+            <a:solidFill>
+              <a:srgbClr val="FF0000"/>
+            </a:solidFill>
+            <a:tailEnd type="triangle"/>
+          </a:ln>
+        </p:spPr>
+        <p:style>
+          <a:lnRef idx="1">
+            <a:schemeClr val="accent1"/>
+          </a:lnRef>
+          <a:fillRef idx="0">
+            <a:schemeClr val="accent1"/>
+          </a:fillRef>
+          <a:effectRef idx="0">
+            <a:schemeClr val="accent1"/>
+          </a:effectRef>
+          <a:fontRef idx="minor">
+            <a:schemeClr val="tx1"/>
+          </a:fontRef>
+        </p:style>
+      </p:cxnSp>
+      <p:cxnSp>
+        <p:nvCxnSpPr>
+          <p:cNvPr id="7" name="Straight Arrow Connector 6">
+            <a:extLst>
+              <a:ext uri="{FF2B5EF4-FFF2-40B4-BE49-F238E27FC236}">
+                <a16:creationId xmlns:a16="http://schemas.microsoft.com/office/drawing/2014/main" id="{B53A1370-833E-674D-A08D-8555DB5A2CBC}"/>
+              </a:ext>
+            </a:extLst>
+          </p:cNvPr>
+          <p:cNvCxnSpPr/>
+          <p:nvPr/>
+        </p:nvCxnSpPr>
+        <p:spPr>
+          <a:xfrm flipH="1">
+            <a:off x="5617027" y="3429000"/>
+            <a:ext cx="957943" cy="217715"/>
+          </a:xfrm>
+          <a:prstGeom prst="straightConnector1">
+            <a:avLst/>
+          </a:prstGeom>
+          <a:ln w="38100">
+            <a:solidFill>
+              <a:schemeClr val="tx1"/>
+            </a:solidFill>
+            <a:tailEnd type="triangle"/>
+          </a:ln>
+        </p:spPr>
+        <p:style>
+          <a:lnRef idx="1">
+            <a:schemeClr val="accent1"/>
+          </a:lnRef>
+          <a:fillRef idx="0">
+            <a:schemeClr val="accent1"/>
+          </a:fillRef>
+          <a:effectRef idx="0">
+            <a:schemeClr val="accent1"/>
+          </a:effectRef>
+          <a:fontRef idx="minor">
+            <a:schemeClr val="tx1"/>
+          </a:fontRef>
+        </p:style>
+      </p:cxnSp>
+      <p:cxnSp>
+        <p:nvCxnSpPr>
+          <p:cNvPr id="8" name="Straight Arrow Connector 7">
+            <a:extLst>
+              <a:ext uri="{FF2B5EF4-FFF2-40B4-BE49-F238E27FC236}">
+                <a16:creationId xmlns:a16="http://schemas.microsoft.com/office/drawing/2014/main" id="{537982A4-1F6F-5348-8A97-D7237304EBA3}"/>
+              </a:ext>
+            </a:extLst>
+          </p:cNvPr>
+          <p:cNvCxnSpPr>
+            <a:cxnSpLocks/>
+          </p:cNvCxnSpPr>
+          <p:nvPr/>
+        </p:nvCxnSpPr>
+        <p:spPr>
+          <a:xfrm>
+            <a:off x="1322614" y="3065801"/>
+            <a:ext cx="720129" cy="163740"/>
+          </a:xfrm>
+          <a:prstGeom prst="straightConnector1">
+            <a:avLst/>
+          </a:prstGeom>
+          <a:ln w="38100">
+            <a:solidFill>
+              <a:schemeClr val="accent1"/>
+            </a:solidFill>
+            <a:tailEnd type="triangle"/>
+          </a:ln>
+        </p:spPr>
+        <p:style>
+          <a:lnRef idx="1">
+            <a:schemeClr val="accent1"/>
+          </a:lnRef>
+          <a:fillRef idx="0">
+            <a:schemeClr val="accent1"/>
+          </a:fillRef>
+          <a:effectRef idx="0">
+            <a:schemeClr val="accent1"/>
+          </a:effectRef>
+          <a:fontRef idx="minor">
+            <a:schemeClr val="tx1"/>
+          </a:fontRef>
+        </p:style>
+      </p:cxnSp>
+      <p:sp>
+        <p:nvSpPr>
+          <p:cNvPr id="11" name="TextBox 10">
+            <a:extLst>
+              <a:ext uri="{FF2B5EF4-FFF2-40B4-BE49-F238E27FC236}">
+                <a16:creationId xmlns:a16="http://schemas.microsoft.com/office/drawing/2014/main" id="{8D76255C-F4B2-0649-9E64-4FF7B5096C57}"/>
+              </a:ext>
+            </a:extLst>
+          </p:cNvPr>
+          <p:cNvSpPr txBox="1"/>
+          <p:nvPr/>
+        </p:nvSpPr>
+        <p:spPr>
+          <a:xfrm>
+            <a:off x="759831" y="2811388"/>
+            <a:ext cx="562783" cy="369332"/>
+          </a:xfrm>
+          <a:prstGeom prst="rect">
+            <a:avLst/>
+          </a:prstGeom>
+          <a:noFill/>
+        </p:spPr>
+        <p:txBody>
+          <a:bodyPr wrap="none" rtlCol="0">
+            <a:spAutoFit/>
+          </a:bodyPr>
+          <a:lstStyle/>
+          <a:p>
+            <a:r>
+              <a:rPr lang="en-US" b="1" dirty="0">
+                <a:solidFill>
+                  <a:schemeClr val="accent1"/>
+                </a:solidFill>
+              </a:rPr>
+              <a:t>SDA</a:t>
+            </a:r>
+          </a:p>
+        </p:txBody>
+      </p:sp>
+      <p:sp>
+        <p:nvSpPr>
+          <p:cNvPr id="12" name="TextBox 11">
+            <a:extLst>
+              <a:ext uri="{FF2B5EF4-FFF2-40B4-BE49-F238E27FC236}">
+                <a16:creationId xmlns:a16="http://schemas.microsoft.com/office/drawing/2014/main" id="{FCC25A68-4D57-6E42-AEF0-B1C5EBF301A5}"/>
+              </a:ext>
+            </a:extLst>
+          </p:cNvPr>
+          <p:cNvSpPr txBox="1"/>
+          <p:nvPr/>
+        </p:nvSpPr>
+        <p:spPr>
+          <a:xfrm>
+            <a:off x="759831" y="3229541"/>
+            <a:ext cx="513282" cy="369332"/>
+          </a:xfrm>
+          <a:prstGeom prst="rect">
+            <a:avLst/>
+          </a:prstGeom>
+          <a:noFill/>
+        </p:spPr>
+        <p:txBody>
+          <a:bodyPr wrap="none" rtlCol="0">
+            <a:spAutoFit/>
+          </a:bodyPr>
+          <a:lstStyle/>
+          <a:p>
+            <a:r>
+              <a:rPr lang="en-US" b="1" dirty="0">
+                <a:solidFill>
+                  <a:srgbClr val="00B050"/>
+                </a:solidFill>
+              </a:rPr>
+              <a:t>SCL</a:t>
+            </a:r>
+          </a:p>
+        </p:txBody>
+      </p:sp>
+      <p:cxnSp>
+        <p:nvCxnSpPr>
+          <p:cNvPr id="13" name="Straight Arrow Connector 12">
+            <a:extLst>
+              <a:ext uri="{FF2B5EF4-FFF2-40B4-BE49-F238E27FC236}">
+                <a16:creationId xmlns:a16="http://schemas.microsoft.com/office/drawing/2014/main" id="{97942B8B-40A6-BD41-AF65-8FF787234B27}"/>
+              </a:ext>
+            </a:extLst>
+          </p:cNvPr>
+          <p:cNvCxnSpPr>
+            <a:cxnSpLocks/>
+          </p:cNvCxnSpPr>
+          <p:nvPr/>
+        </p:nvCxnSpPr>
+        <p:spPr>
+          <a:xfrm>
+            <a:off x="1300513" y="3429000"/>
+            <a:ext cx="617045" cy="1"/>
+          </a:xfrm>
+          <a:prstGeom prst="straightConnector1">
+            <a:avLst/>
+          </a:prstGeom>
+          <a:ln w="38100">
+            <a:solidFill>
+              <a:srgbClr val="00B050"/>
+            </a:solidFill>
+            <a:tailEnd type="triangle"/>
+          </a:ln>
+        </p:spPr>
+        <p:style>
+          <a:lnRef idx="1">
+            <a:schemeClr val="accent1"/>
+          </a:lnRef>
+          <a:fillRef idx="0">
+            <a:schemeClr val="accent1"/>
+          </a:fillRef>
+          <a:effectRef idx="0">
+            <a:schemeClr val="accent1"/>
+          </a:effectRef>
+          <a:fontRef idx="minor">
+            <a:schemeClr val="tx1"/>
+          </a:fontRef>
+        </p:style>
+      </p:cxnSp>
+      <p:sp>
+        <p:nvSpPr>
+          <p:cNvPr id="17" name="TextBox 16">
+            <a:extLst>
+              <a:ext uri="{FF2B5EF4-FFF2-40B4-BE49-F238E27FC236}">
+                <a16:creationId xmlns:a16="http://schemas.microsoft.com/office/drawing/2014/main" id="{C98757C1-4B5E-5144-8A5E-F39D55D389B3}"/>
+              </a:ext>
+            </a:extLst>
+          </p:cNvPr>
+          <p:cNvSpPr txBox="1"/>
+          <p:nvPr/>
+        </p:nvSpPr>
+        <p:spPr>
+          <a:xfrm>
+            <a:off x="6574970" y="2762568"/>
+            <a:ext cx="560859" cy="369332"/>
+          </a:xfrm>
+          <a:prstGeom prst="rect">
+            <a:avLst/>
+          </a:prstGeom>
+          <a:noFill/>
+        </p:spPr>
+        <p:txBody>
+          <a:bodyPr wrap="none" rtlCol="0">
+            <a:spAutoFit/>
+          </a:bodyPr>
+          <a:lstStyle/>
+          <a:p>
+            <a:r>
+              <a:rPr lang="en-US" b="1" dirty="0">
+                <a:solidFill>
+                  <a:srgbClr val="FF0000"/>
+                </a:solidFill>
+              </a:rPr>
+              <a:t>VCC</a:t>
+            </a:r>
+          </a:p>
+        </p:txBody>
+      </p:sp>
+      <p:sp>
+        <p:nvSpPr>
+          <p:cNvPr id="18" name="TextBox 17">
+            <a:extLst>
+              <a:ext uri="{FF2B5EF4-FFF2-40B4-BE49-F238E27FC236}">
+                <a16:creationId xmlns:a16="http://schemas.microsoft.com/office/drawing/2014/main" id="{8CCFEC83-EAEF-3541-9D76-7839B2CC2DDF}"/>
+              </a:ext>
+            </a:extLst>
+          </p:cNvPr>
+          <p:cNvSpPr txBox="1"/>
+          <p:nvPr/>
+        </p:nvSpPr>
+        <p:spPr>
+          <a:xfrm>
+            <a:off x="6574969" y="3223480"/>
+            <a:ext cx="630301" cy="369332"/>
+          </a:xfrm>
+          <a:prstGeom prst="rect">
+            <a:avLst/>
+          </a:prstGeom>
+          <a:noFill/>
+        </p:spPr>
+        <p:txBody>
+          <a:bodyPr wrap="none" rtlCol="0">
+            <a:spAutoFit/>
+          </a:bodyPr>
+          <a:lstStyle/>
+          <a:p>
+            <a:r>
+              <a:rPr lang="en-US" b="1" dirty="0"/>
+              <a:t>GND</a:t>
+            </a:r>
+          </a:p>
+        </p:txBody>
+      </p:sp>
+    </p:spTree>
+    <p:extLst>
+      <p:ext uri="{BB962C8B-B14F-4D97-AF65-F5344CB8AC3E}">
+        <p14:creationId xmlns:p14="http://schemas.microsoft.com/office/powerpoint/2010/main" val="749271388"/>
+      </p:ext>
+    </p:extLst>
+  </p:cSld>
+  <p:clrMapOvr>
+    <a:masterClrMapping/>
+  </p:clrMapOvr>
+</p:sld>
+</file>
+
+<file path=ppt/slides/slide6.xml><?xml version="1.0" encoding="utf-8"?>
+<p:sld xmlns:a="http://schemas.openxmlformats.org/drawingml/2006/main" xmlns:r="http://schemas.openxmlformats.org/officeDocument/2006/relationships" xmlns:p="http://schemas.openxmlformats.org/presentationml/2006/main">
+  <p:cSld>
+    <p:spTree>
+      <p:nvGrpSpPr>
+        <p:cNvPr id="1" name=""/>
+        <p:cNvGrpSpPr/>
+        <p:nvPr/>
+      </p:nvGrpSpPr>
+      <p:grpSpPr>
+        <a:xfrm>
+          <a:off x="0" y="0"/>
+          <a:ext cx="0" cy="0"/>
+          <a:chOff x="0" y="0"/>
+          <a:chExt cx="0" cy="0"/>
+        </a:xfrm>
+      </p:grpSpPr>
+      <p:sp>
+        <p:nvSpPr>
+          <p:cNvPr id="2" name="Title 1">
+            <a:extLst>
+              <a:ext uri="{FF2B5EF4-FFF2-40B4-BE49-F238E27FC236}">
                 <a16:creationId xmlns:a16="http://schemas.microsoft.com/office/drawing/2014/main" id="{090F35E0-3B45-1A49-85AF-00B3D04E56FE}"/>
               </a:ext>
             </a:extLst>
@@ -5165,7 +5412,9 @@
           </a:xfrm>
         </p:spPr>
         <p:txBody>
-          <a:bodyPr/>
+          <a:bodyPr>
+            <a:normAutofit fontScale="85000" lnSpcReduction="20000"/>
+          </a:bodyPr>
           <a:lstStyle/>
           <a:p>
             <a:endParaRPr lang="en-US" dirty="0"/>
@@ -5389,7 +5638,7 @@
 </p:sld>
 </file>
 
-<file path=ppt/slides/slide6.xml><?xml version="1.0" encoding="utf-8"?>
+<file path=ppt/slides/slide7.xml><?xml version="1.0" encoding="utf-8"?>
 <p:sld xmlns:a="http://schemas.openxmlformats.org/drawingml/2006/main" xmlns:r="http://schemas.openxmlformats.org/officeDocument/2006/relationships" xmlns:p="http://schemas.openxmlformats.org/presentationml/2006/main">
   <p:cSld>
     <p:spTree>

</xml_diff>

<commit_message>
Deployed 5988518 with MkDocs version: 1.1.2
</commit_message>
<xml_diff>
--- a/img/figures.pptx
+++ b/img/figures.pptx
@@ -12,6 +12,7 @@
     <p:sldId id="259" r:id="rId6"/>
     <p:sldId id="260" r:id="rId7"/>
     <p:sldId id="261" r:id="rId8"/>
+    <p:sldId id="263" r:id="rId9"/>
   </p:sldIdLst>
   <p:sldSz cx="12192000" cy="6858000"/>
   <p:notesSz cx="6858000" cy="9144000"/>
@@ -265,7 +266,7 @@
           <a:p>
             <a:fld id="{FD3A94D9-38B3-6A4F-AECD-4D297511D178}" type="datetimeFigureOut">
               <a:rPr lang="en-US" smtClean="0"/>
-              <a:t>3/2/21</a:t>
+              <a:t>3/12/21</a:t>
             </a:fld>
             <a:endParaRPr lang="en-US"/>
           </a:p>
@@ -463,7 +464,7 @@
           <a:p>
             <a:fld id="{FD3A94D9-38B3-6A4F-AECD-4D297511D178}" type="datetimeFigureOut">
               <a:rPr lang="en-US" smtClean="0"/>
-              <a:t>3/2/21</a:t>
+              <a:t>3/12/21</a:t>
             </a:fld>
             <a:endParaRPr lang="en-US"/>
           </a:p>
@@ -671,7 +672,7 @@
           <a:p>
             <a:fld id="{FD3A94D9-38B3-6A4F-AECD-4D297511D178}" type="datetimeFigureOut">
               <a:rPr lang="en-US" smtClean="0"/>
-              <a:t>3/2/21</a:t>
+              <a:t>3/12/21</a:t>
             </a:fld>
             <a:endParaRPr lang="en-US"/>
           </a:p>
@@ -869,7 +870,7 @@
           <a:p>
             <a:fld id="{FD3A94D9-38B3-6A4F-AECD-4D297511D178}" type="datetimeFigureOut">
               <a:rPr lang="en-US" smtClean="0"/>
-              <a:t>3/2/21</a:t>
+              <a:t>3/12/21</a:t>
             </a:fld>
             <a:endParaRPr lang="en-US"/>
           </a:p>
@@ -1144,7 +1145,7 @@
           <a:p>
             <a:fld id="{FD3A94D9-38B3-6A4F-AECD-4D297511D178}" type="datetimeFigureOut">
               <a:rPr lang="en-US" smtClean="0"/>
-              <a:t>3/2/21</a:t>
+              <a:t>3/12/21</a:t>
             </a:fld>
             <a:endParaRPr lang="en-US"/>
           </a:p>
@@ -1409,7 +1410,7 @@
           <a:p>
             <a:fld id="{FD3A94D9-38B3-6A4F-AECD-4D297511D178}" type="datetimeFigureOut">
               <a:rPr lang="en-US" smtClean="0"/>
-              <a:t>3/2/21</a:t>
+              <a:t>3/12/21</a:t>
             </a:fld>
             <a:endParaRPr lang="en-US"/>
           </a:p>
@@ -1821,7 +1822,7 @@
           <a:p>
             <a:fld id="{FD3A94D9-38B3-6A4F-AECD-4D297511D178}" type="datetimeFigureOut">
               <a:rPr lang="en-US" smtClean="0"/>
-              <a:t>3/2/21</a:t>
+              <a:t>3/12/21</a:t>
             </a:fld>
             <a:endParaRPr lang="en-US"/>
           </a:p>
@@ -1962,7 +1963,7 @@
           <a:p>
             <a:fld id="{FD3A94D9-38B3-6A4F-AECD-4D297511D178}" type="datetimeFigureOut">
               <a:rPr lang="en-US" smtClean="0"/>
-              <a:t>3/2/21</a:t>
+              <a:t>3/12/21</a:t>
             </a:fld>
             <a:endParaRPr lang="en-US"/>
           </a:p>
@@ -2075,7 +2076,7 @@
           <a:p>
             <a:fld id="{FD3A94D9-38B3-6A4F-AECD-4D297511D178}" type="datetimeFigureOut">
               <a:rPr lang="en-US" smtClean="0"/>
-              <a:t>3/2/21</a:t>
+              <a:t>3/12/21</a:t>
             </a:fld>
             <a:endParaRPr lang="en-US"/>
           </a:p>
@@ -2386,7 +2387,7 @@
           <a:p>
             <a:fld id="{FD3A94D9-38B3-6A4F-AECD-4D297511D178}" type="datetimeFigureOut">
               <a:rPr lang="en-US" smtClean="0"/>
-              <a:t>3/2/21</a:t>
+              <a:t>3/12/21</a:t>
             </a:fld>
             <a:endParaRPr lang="en-US"/>
           </a:p>
@@ -2674,7 +2675,7 @@
           <a:p>
             <a:fld id="{FD3A94D9-38B3-6A4F-AECD-4D297511D178}" type="datetimeFigureOut">
               <a:rPr lang="en-US" smtClean="0"/>
-              <a:t>3/2/21</a:t>
+              <a:t>3/12/21</a:t>
             </a:fld>
             <a:endParaRPr lang="en-US"/>
           </a:p>
@@ -2915,7 +2916,7 @@
           <a:p>
             <a:fld id="{FD3A94D9-38B3-6A4F-AECD-4D297511D178}" type="datetimeFigureOut">
               <a:rPr lang="en-US" smtClean="0"/>
-              <a:t>3/2/21</a:t>
+              <a:t>3/12/21</a:t>
             </a:fld>
             <a:endParaRPr lang="en-US"/>
           </a:p>
@@ -5753,6 +5754,956 @@
 </p:sld>
 </file>
 
+<file path=ppt/slides/slide8.xml><?xml version="1.0" encoding="utf-8"?>
+<p:sld xmlns:a="http://schemas.openxmlformats.org/drawingml/2006/main" xmlns:r="http://schemas.openxmlformats.org/officeDocument/2006/relationships" xmlns:p="http://schemas.openxmlformats.org/presentationml/2006/main">
+  <p:cSld>
+    <p:spTree>
+      <p:nvGrpSpPr>
+        <p:cNvPr id="1" name=""/>
+        <p:cNvGrpSpPr/>
+        <p:nvPr/>
+      </p:nvGrpSpPr>
+      <p:grpSpPr>
+        <a:xfrm>
+          <a:off x="0" y="0"/>
+          <a:ext cx="0" cy="0"/>
+          <a:chOff x="0" y="0"/>
+          <a:chExt cx="0" cy="0"/>
+        </a:xfrm>
+      </p:grpSpPr>
+      <p:sp>
+        <p:nvSpPr>
+          <p:cNvPr id="2" name="Title 1">
+            <a:extLst>
+              <a:ext uri="{FF2B5EF4-FFF2-40B4-BE49-F238E27FC236}">
+                <a16:creationId xmlns:a16="http://schemas.microsoft.com/office/drawing/2014/main" id="{210A1B92-FE32-A64F-9EE0-003856F2DE06}"/>
+              </a:ext>
+            </a:extLst>
+          </p:cNvPr>
+          <p:cNvSpPr>
+            <a:spLocks noGrp="1"/>
+          </p:cNvSpPr>
+          <p:nvPr>
+            <p:ph type="title"/>
+          </p:nvPr>
+        </p:nvSpPr>
+        <p:spPr>
+          <a:xfrm>
+            <a:off x="243289" y="200911"/>
+            <a:ext cx="10515600" cy="451428"/>
+          </a:xfrm>
+        </p:spPr>
+        <p:txBody>
+          <a:bodyPr>
+            <a:normAutofit fontScale="90000"/>
+          </a:bodyPr>
+          <a:lstStyle/>
+          <a:p>
+            <a:r>
+              <a:rPr lang="en-US" dirty="0"/>
+              <a:t>SSH1306 SPI Connections</a:t>
+            </a:r>
+          </a:p>
+        </p:txBody>
+      </p:sp>
+      <p:sp>
+        <p:nvSpPr>
+          <p:cNvPr id="3" name="Content Placeholder 2">
+            <a:extLst>
+              <a:ext uri="{FF2B5EF4-FFF2-40B4-BE49-F238E27FC236}">
+                <a16:creationId xmlns:a16="http://schemas.microsoft.com/office/drawing/2014/main" id="{A64E334F-828C-D04E-AD58-EC477FD7F46E}"/>
+              </a:ext>
+            </a:extLst>
+          </p:cNvPr>
+          <p:cNvSpPr>
+            <a:spLocks noGrp="1"/>
+          </p:cNvSpPr>
+          <p:nvPr>
+            <p:ph idx="1"/>
+          </p:nvPr>
+        </p:nvSpPr>
+        <p:spPr>
+          <a:xfrm>
+            <a:off x="185069" y="4751927"/>
+            <a:ext cx="5810804" cy="1930780"/>
+          </a:xfrm>
+        </p:spPr>
+        <p:txBody>
+          <a:bodyPr>
+            <a:normAutofit fontScale="47500" lnSpcReduction="20000"/>
+          </a:bodyPr>
+          <a:lstStyle/>
+          <a:p>
+            <a:pPr marL="0" indent="0">
+              <a:buNone/>
+            </a:pPr>
+            <a:r>
+              <a:rPr lang="en-US" dirty="0" err="1"/>
+              <a:t>spi_sck</a:t>
+            </a:r>
+            <a:r>
+              <a:rPr lang="en-US" dirty="0"/>
+              <a:t>=</a:t>
+            </a:r>
+            <a:r>
+              <a:rPr lang="en-US" dirty="0" err="1"/>
+              <a:t>machine.Pin</a:t>
+            </a:r>
+            <a:r>
+              <a:rPr lang="en-US" dirty="0"/>
+              <a:t>(2)</a:t>
+            </a:r>
+          </a:p>
+          <a:p>
+            <a:pPr marL="0" indent="0">
+              <a:buNone/>
+            </a:pPr>
+            <a:r>
+              <a:rPr lang="en-US" dirty="0" err="1"/>
+              <a:t>spi_tx</a:t>
+            </a:r>
+            <a:r>
+              <a:rPr lang="en-US" dirty="0"/>
+              <a:t>=</a:t>
+            </a:r>
+            <a:r>
+              <a:rPr lang="en-US" dirty="0" err="1"/>
+              <a:t>machine.Pin</a:t>
+            </a:r>
+            <a:r>
+              <a:rPr lang="en-US" dirty="0"/>
+              <a:t>(3)</a:t>
+            </a:r>
+          </a:p>
+          <a:p>
+            <a:pPr marL="0" indent="0">
+              <a:buNone/>
+            </a:pPr>
+            <a:r>
+              <a:rPr lang="en-US" dirty="0" err="1"/>
+              <a:t>spi</a:t>
+            </a:r>
+            <a:r>
+              <a:rPr lang="en-US" dirty="0"/>
+              <a:t>=</a:t>
+            </a:r>
+            <a:r>
+              <a:rPr lang="en-US" dirty="0" err="1"/>
+              <a:t>machine.SPI</a:t>
+            </a:r>
+            <a:r>
+              <a:rPr lang="en-US" dirty="0"/>
+              <a:t>(0,baudrate=100000,sck=</a:t>
+            </a:r>
+            <a:r>
+              <a:rPr lang="en-US" dirty="0" err="1"/>
+              <a:t>spi_sck</a:t>
+            </a:r>
+            <a:r>
+              <a:rPr lang="en-US" dirty="0"/>
+              <a:t>, </a:t>
+            </a:r>
+            <a:r>
+              <a:rPr lang="en-US" dirty="0" err="1"/>
+              <a:t>mosi</a:t>
+            </a:r>
+            <a:r>
+              <a:rPr lang="en-US" dirty="0"/>
+              <a:t>=</a:t>
+            </a:r>
+            <a:r>
+              <a:rPr lang="en-US" dirty="0" err="1"/>
+              <a:t>spi_tx</a:t>
+            </a:r>
+            <a:r>
+              <a:rPr lang="en-US" dirty="0"/>
+              <a:t>)</a:t>
+            </a:r>
+          </a:p>
+          <a:p>
+            <a:pPr marL="0" indent="0">
+              <a:buNone/>
+            </a:pPr>
+            <a:r>
+              <a:rPr lang="en-US" dirty="0"/>
+              <a:t>CS = </a:t>
+            </a:r>
+            <a:r>
+              <a:rPr lang="en-US" dirty="0" err="1"/>
+              <a:t>machine.Pin</a:t>
+            </a:r>
+            <a:r>
+              <a:rPr lang="en-US" dirty="0"/>
+              <a:t>(1)</a:t>
+            </a:r>
+          </a:p>
+          <a:p>
+            <a:pPr marL="0" indent="0">
+              <a:buNone/>
+            </a:pPr>
+            <a:r>
+              <a:rPr lang="en-US" dirty="0"/>
+              <a:t>DC = </a:t>
+            </a:r>
+            <a:r>
+              <a:rPr lang="en-US" dirty="0" err="1"/>
+              <a:t>machine.Pin</a:t>
+            </a:r>
+            <a:r>
+              <a:rPr lang="en-US" dirty="0"/>
+              <a:t>(4)</a:t>
+            </a:r>
+          </a:p>
+          <a:p>
+            <a:pPr marL="0" indent="0">
+              <a:buNone/>
+            </a:pPr>
+            <a:r>
+              <a:rPr lang="en-US" dirty="0"/>
+              <a:t>RES = </a:t>
+            </a:r>
+            <a:r>
+              <a:rPr lang="en-US" dirty="0" err="1"/>
+              <a:t>machine.Pin</a:t>
+            </a:r>
+            <a:r>
+              <a:rPr lang="en-US" dirty="0"/>
+              <a:t>(5)</a:t>
+            </a:r>
+          </a:p>
+          <a:p>
+            <a:pPr marL="0" indent="0">
+              <a:buNone/>
+            </a:pPr>
+            <a:r>
+              <a:rPr lang="en-US" dirty="0" err="1"/>
+              <a:t>oled</a:t>
+            </a:r>
+            <a:r>
+              <a:rPr lang="en-US" dirty="0"/>
+              <a:t> = ssd1306.SSD1306_SPI(128, 64, </a:t>
+            </a:r>
+            <a:r>
+              <a:rPr lang="en-US" dirty="0" err="1"/>
+              <a:t>spi</a:t>
+            </a:r>
+            <a:r>
+              <a:rPr lang="en-US" dirty="0"/>
+              <a:t>, DC, RES, CS)</a:t>
+            </a:r>
+          </a:p>
+          <a:p>
+            <a:pPr marL="0" indent="0">
+              <a:buNone/>
+            </a:pPr>
+            <a:endParaRPr lang="en-US" dirty="0"/>
+          </a:p>
+          <a:p>
+            <a:pPr marL="0" indent="0">
+              <a:buNone/>
+            </a:pPr>
+            <a:endParaRPr lang="en-US" sz="1000" dirty="0"/>
+          </a:p>
+        </p:txBody>
+      </p:sp>
+      <p:pic>
+        <p:nvPicPr>
+          <p:cNvPr id="4" name="Picture 3">
+            <a:extLst>
+              <a:ext uri="{FF2B5EF4-FFF2-40B4-BE49-F238E27FC236}">
+                <a16:creationId xmlns:a16="http://schemas.microsoft.com/office/drawing/2014/main" id="{2A74A638-6B9F-C243-A51A-63E49271E027}"/>
+              </a:ext>
+            </a:extLst>
+          </p:cNvPr>
+          <p:cNvPicPr>
+            <a:picLocks noChangeAspect="1"/>
+          </p:cNvPicPr>
+          <p:nvPr/>
+        </p:nvPicPr>
+        <p:blipFill rotWithShape="1">
+          <a:blip r:embed="rId2"/>
+          <a:srcRect b="2668"/>
+          <a:stretch/>
+        </p:blipFill>
+        <p:spPr>
+          <a:xfrm>
+            <a:off x="3234521" y="1446315"/>
+            <a:ext cx="5722958" cy="3030076"/>
+          </a:xfrm>
+          <a:prstGeom prst="rect">
+            <a:avLst/>
+          </a:prstGeom>
+        </p:spPr>
+      </p:pic>
+      <p:cxnSp>
+        <p:nvCxnSpPr>
+          <p:cNvPr id="5" name="Straight Arrow Connector 4">
+            <a:extLst>
+              <a:ext uri="{FF2B5EF4-FFF2-40B4-BE49-F238E27FC236}">
+                <a16:creationId xmlns:a16="http://schemas.microsoft.com/office/drawing/2014/main" id="{F2672062-D70A-E043-9250-CE86E97EAD3C}"/>
+              </a:ext>
+            </a:extLst>
+          </p:cNvPr>
+          <p:cNvCxnSpPr/>
+          <p:nvPr/>
+        </p:nvCxnSpPr>
+        <p:spPr>
+          <a:xfrm flipH="1">
+            <a:off x="8105395" y="2755882"/>
+            <a:ext cx="957943" cy="217715"/>
+          </a:xfrm>
+          <a:prstGeom prst="straightConnector1">
+            <a:avLst/>
+          </a:prstGeom>
+          <a:ln w="38100">
+            <a:solidFill>
+              <a:srgbClr val="FF0000"/>
+            </a:solidFill>
+            <a:tailEnd type="triangle"/>
+          </a:ln>
+        </p:spPr>
+        <p:style>
+          <a:lnRef idx="1">
+            <a:schemeClr val="accent1"/>
+          </a:lnRef>
+          <a:fillRef idx="0">
+            <a:schemeClr val="accent1"/>
+          </a:fillRef>
+          <a:effectRef idx="0">
+            <a:schemeClr val="accent1"/>
+          </a:effectRef>
+          <a:fontRef idx="minor">
+            <a:schemeClr val="tx1"/>
+          </a:fontRef>
+        </p:style>
+      </p:cxnSp>
+      <p:cxnSp>
+        <p:nvCxnSpPr>
+          <p:cNvPr id="6" name="Straight Arrow Connector 5">
+            <a:extLst>
+              <a:ext uri="{FF2B5EF4-FFF2-40B4-BE49-F238E27FC236}">
+                <a16:creationId xmlns:a16="http://schemas.microsoft.com/office/drawing/2014/main" id="{60DAED21-D6A4-6D4A-B0B2-3BD0A6AC1DDD}"/>
+              </a:ext>
+            </a:extLst>
+          </p:cNvPr>
+          <p:cNvCxnSpPr/>
+          <p:nvPr/>
+        </p:nvCxnSpPr>
+        <p:spPr>
+          <a:xfrm flipH="1">
+            <a:off x="8105395" y="2199656"/>
+            <a:ext cx="957943" cy="217715"/>
+          </a:xfrm>
+          <a:prstGeom prst="straightConnector1">
+            <a:avLst/>
+          </a:prstGeom>
+          <a:ln w="38100">
+            <a:solidFill>
+              <a:schemeClr val="tx1"/>
+            </a:solidFill>
+            <a:tailEnd type="triangle"/>
+          </a:ln>
+        </p:spPr>
+        <p:style>
+          <a:lnRef idx="1">
+            <a:schemeClr val="accent1"/>
+          </a:lnRef>
+          <a:fillRef idx="0">
+            <a:schemeClr val="accent1"/>
+          </a:fillRef>
+          <a:effectRef idx="0">
+            <a:schemeClr val="accent1"/>
+          </a:effectRef>
+          <a:fontRef idx="minor">
+            <a:schemeClr val="tx1"/>
+          </a:fontRef>
+        </p:style>
+      </p:cxnSp>
+      <p:cxnSp>
+        <p:nvCxnSpPr>
+          <p:cNvPr id="7" name="Straight Arrow Connector 6">
+            <a:extLst>
+              <a:ext uri="{FF2B5EF4-FFF2-40B4-BE49-F238E27FC236}">
+                <a16:creationId xmlns:a16="http://schemas.microsoft.com/office/drawing/2014/main" id="{D9CFD058-8543-244B-93CE-B9D4AFA82E07}"/>
+              </a:ext>
+            </a:extLst>
+          </p:cNvPr>
+          <p:cNvCxnSpPr>
+            <a:cxnSpLocks/>
+          </p:cNvCxnSpPr>
+          <p:nvPr/>
+        </p:nvCxnSpPr>
+        <p:spPr>
+          <a:xfrm>
+            <a:off x="2651635" y="2936580"/>
+            <a:ext cx="717797" cy="44159"/>
+          </a:xfrm>
+          <a:prstGeom prst="straightConnector1">
+            <a:avLst/>
+          </a:prstGeom>
+          <a:ln w="38100">
+            <a:solidFill>
+              <a:schemeClr val="accent1"/>
+            </a:solidFill>
+            <a:tailEnd type="triangle"/>
+          </a:ln>
+        </p:spPr>
+        <p:style>
+          <a:lnRef idx="1">
+            <a:schemeClr val="accent1"/>
+          </a:lnRef>
+          <a:fillRef idx="0">
+            <a:schemeClr val="accent1"/>
+          </a:fillRef>
+          <a:effectRef idx="0">
+            <a:schemeClr val="accent1"/>
+          </a:effectRef>
+          <a:fontRef idx="minor">
+            <a:schemeClr val="tx1"/>
+          </a:fontRef>
+        </p:style>
+      </p:cxnSp>
+      <p:cxnSp>
+        <p:nvCxnSpPr>
+          <p:cNvPr id="8" name="Straight Arrow Connector 7">
+            <a:extLst>
+              <a:ext uri="{FF2B5EF4-FFF2-40B4-BE49-F238E27FC236}">
+                <a16:creationId xmlns:a16="http://schemas.microsoft.com/office/drawing/2014/main" id="{7A5EBA83-A603-0C43-9ECA-268AF2340625}"/>
+              </a:ext>
+            </a:extLst>
+          </p:cNvPr>
+          <p:cNvCxnSpPr>
+            <a:cxnSpLocks/>
+          </p:cNvCxnSpPr>
+          <p:nvPr/>
+        </p:nvCxnSpPr>
+        <p:spPr>
+          <a:xfrm>
+            <a:off x="2756787" y="2628555"/>
+            <a:ext cx="612645" cy="93333"/>
+          </a:xfrm>
+          <a:prstGeom prst="straightConnector1">
+            <a:avLst/>
+          </a:prstGeom>
+          <a:ln w="38100">
+            <a:solidFill>
+              <a:srgbClr val="00B050"/>
+            </a:solidFill>
+            <a:tailEnd type="triangle"/>
+          </a:ln>
+        </p:spPr>
+        <p:style>
+          <a:lnRef idx="1">
+            <a:schemeClr val="accent1"/>
+          </a:lnRef>
+          <a:fillRef idx="0">
+            <a:schemeClr val="accent1"/>
+          </a:fillRef>
+          <a:effectRef idx="0">
+            <a:schemeClr val="accent1"/>
+          </a:effectRef>
+          <a:fontRef idx="minor">
+            <a:schemeClr val="tx1"/>
+          </a:fontRef>
+        </p:style>
+      </p:cxnSp>
+      <p:sp>
+        <p:nvSpPr>
+          <p:cNvPr id="9" name="TextBox 8">
+            <a:extLst>
+              <a:ext uri="{FF2B5EF4-FFF2-40B4-BE49-F238E27FC236}">
+                <a16:creationId xmlns:a16="http://schemas.microsoft.com/office/drawing/2014/main" id="{4A23B791-388E-A847-A4B8-E2D8B50DEF08}"/>
+              </a:ext>
+            </a:extLst>
+          </p:cNvPr>
+          <p:cNvSpPr txBox="1"/>
+          <p:nvPr/>
+        </p:nvSpPr>
+        <p:spPr>
+          <a:xfrm>
+            <a:off x="9048543" y="2553449"/>
+            <a:ext cx="560859" cy="369332"/>
+          </a:xfrm>
+          <a:prstGeom prst="rect">
+            <a:avLst/>
+          </a:prstGeom>
+          <a:noFill/>
+        </p:spPr>
+        <p:txBody>
+          <a:bodyPr wrap="none" rtlCol="0">
+            <a:spAutoFit/>
+          </a:bodyPr>
+          <a:lstStyle/>
+          <a:p>
+            <a:r>
+              <a:rPr lang="en-US" b="1" dirty="0">
+                <a:solidFill>
+                  <a:srgbClr val="FF0000"/>
+                </a:solidFill>
+              </a:rPr>
+              <a:t>VCC</a:t>
+            </a:r>
+          </a:p>
+        </p:txBody>
+      </p:sp>
+      <p:sp>
+        <p:nvSpPr>
+          <p:cNvPr id="10" name="TextBox 9">
+            <a:extLst>
+              <a:ext uri="{FF2B5EF4-FFF2-40B4-BE49-F238E27FC236}">
+                <a16:creationId xmlns:a16="http://schemas.microsoft.com/office/drawing/2014/main" id="{55ED4BB6-1E8B-AE4B-A9A1-26CE16056861}"/>
+              </a:ext>
+            </a:extLst>
+          </p:cNvPr>
+          <p:cNvSpPr txBox="1"/>
+          <p:nvPr/>
+        </p:nvSpPr>
+        <p:spPr>
+          <a:xfrm>
+            <a:off x="9063337" y="1994136"/>
+            <a:ext cx="630301" cy="369332"/>
+          </a:xfrm>
+          <a:prstGeom prst="rect">
+            <a:avLst/>
+          </a:prstGeom>
+          <a:noFill/>
+        </p:spPr>
+        <p:txBody>
+          <a:bodyPr wrap="none" rtlCol="0">
+            <a:spAutoFit/>
+          </a:bodyPr>
+          <a:lstStyle/>
+          <a:p>
+            <a:r>
+              <a:rPr lang="en-US" b="1" dirty="0"/>
+              <a:t>GND</a:t>
+            </a:r>
+          </a:p>
+        </p:txBody>
+      </p:sp>
+      <p:sp>
+        <p:nvSpPr>
+          <p:cNvPr id="11" name="TextBox 10">
+            <a:extLst>
+              <a:ext uri="{FF2B5EF4-FFF2-40B4-BE49-F238E27FC236}">
+                <a16:creationId xmlns:a16="http://schemas.microsoft.com/office/drawing/2014/main" id="{2C08CBA9-337D-4742-A426-00CABCCF32CC}"/>
+              </a:ext>
+            </a:extLst>
+          </p:cNvPr>
+          <p:cNvSpPr txBox="1"/>
+          <p:nvPr/>
+        </p:nvSpPr>
+        <p:spPr>
+          <a:xfrm>
+            <a:off x="2098904" y="2748245"/>
+            <a:ext cx="562783" cy="369332"/>
+          </a:xfrm>
+          <a:prstGeom prst="rect">
+            <a:avLst/>
+          </a:prstGeom>
+          <a:noFill/>
+        </p:spPr>
+        <p:txBody>
+          <a:bodyPr wrap="none" rtlCol="0">
+            <a:spAutoFit/>
+          </a:bodyPr>
+          <a:lstStyle/>
+          <a:p>
+            <a:r>
+              <a:rPr lang="en-US" b="1" dirty="0">
+                <a:solidFill>
+                  <a:schemeClr val="accent1"/>
+                </a:solidFill>
+              </a:rPr>
+              <a:t>SDA</a:t>
+            </a:r>
+          </a:p>
+        </p:txBody>
+      </p:sp>
+      <p:sp>
+        <p:nvSpPr>
+          <p:cNvPr id="12" name="TextBox 11">
+            <a:extLst>
+              <a:ext uri="{FF2B5EF4-FFF2-40B4-BE49-F238E27FC236}">
+                <a16:creationId xmlns:a16="http://schemas.microsoft.com/office/drawing/2014/main" id="{913F8818-5C62-9748-9D2E-E61A05609316}"/>
+              </a:ext>
+            </a:extLst>
+          </p:cNvPr>
+          <p:cNvSpPr txBox="1"/>
+          <p:nvPr/>
+        </p:nvSpPr>
+        <p:spPr>
+          <a:xfrm>
+            <a:off x="2226190" y="2417371"/>
+            <a:ext cx="542136" cy="369332"/>
+          </a:xfrm>
+          <a:prstGeom prst="rect">
+            <a:avLst/>
+          </a:prstGeom>
+          <a:noFill/>
+        </p:spPr>
+        <p:txBody>
+          <a:bodyPr wrap="none" rtlCol="0">
+            <a:spAutoFit/>
+          </a:bodyPr>
+          <a:lstStyle/>
+          <a:p>
+            <a:r>
+              <a:rPr lang="en-US" b="1" dirty="0">
+                <a:solidFill>
+                  <a:srgbClr val="00B050"/>
+                </a:solidFill>
+              </a:rPr>
+              <a:t>SCK</a:t>
+            </a:r>
+          </a:p>
+        </p:txBody>
+      </p:sp>
+      <p:cxnSp>
+        <p:nvCxnSpPr>
+          <p:cNvPr id="13" name="Straight Arrow Connector 12">
+            <a:extLst>
+              <a:ext uri="{FF2B5EF4-FFF2-40B4-BE49-F238E27FC236}">
+                <a16:creationId xmlns:a16="http://schemas.microsoft.com/office/drawing/2014/main" id="{182CA671-3293-F647-84B8-FFD1CDDE00A3}"/>
+              </a:ext>
+            </a:extLst>
+          </p:cNvPr>
+          <p:cNvCxnSpPr>
+            <a:cxnSpLocks/>
+          </p:cNvCxnSpPr>
+          <p:nvPr/>
+        </p:nvCxnSpPr>
+        <p:spPr>
+          <a:xfrm>
+            <a:off x="2750966" y="2159072"/>
+            <a:ext cx="617045" cy="1"/>
+          </a:xfrm>
+          <a:prstGeom prst="straightConnector1">
+            <a:avLst/>
+          </a:prstGeom>
+          <a:ln w="38100">
+            <a:solidFill>
+              <a:schemeClr val="accent2"/>
+            </a:solidFill>
+            <a:tailEnd type="triangle"/>
+          </a:ln>
+        </p:spPr>
+        <p:style>
+          <a:lnRef idx="1">
+            <a:schemeClr val="accent1"/>
+          </a:lnRef>
+          <a:fillRef idx="0">
+            <a:schemeClr val="accent1"/>
+          </a:fillRef>
+          <a:effectRef idx="0">
+            <a:schemeClr val="accent1"/>
+          </a:effectRef>
+          <a:fontRef idx="minor">
+            <a:schemeClr val="tx1"/>
+          </a:fontRef>
+        </p:style>
+      </p:cxnSp>
+      <p:sp>
+        <p:nvSpPr>
+          <p:cNvPr id="14" name="TextBox 13">
+            <a:extLst>
+              <a:ext uri="{FF2B5EF4-FFF2-40B4-BE49-F238E27FC236}">
+                <a16:creationId xmlns:a16="http://schemas.microsoft.com/office/drawing/2014/main" id="{54365825-835C-674A-A242-1D98DCC7CC3B}"/>
+              </a:ext>
+            </a:extLst>
+          </p:cNvPr>
+          <p:cNvSpPr txBox="1"/>
+          <p:nvPr/>
+        </p:nvSpPr>
+        <p:spPr>
+          <a:xfrm>
+            <a:off x="2361777" y="1967211"/>
+            <a:ext cx="415498" cy="369332"/>
+          </a:xfrm>
+          <a:prstGeom prst="rect">
+            <a:avLst/>
+          </a:prstGeom>
+          <a:noFill/>
+        </p:spPr>
+        <p:txBody>
+          <a:bodyPr wrap="none" rtlCol="0">
+            <a:spAutoFit/>
+          </a:bodyPr>
+          <a:lstStyle/>
+          <a:p>
+            <a:r>
+              <a:rPr lang="en-US" b="1" dirty="0">
+                <a:solidFill>
+                  <a:schemeClr val="accent2"/>
+                </a:solidFill>
+              </a:rPr>
+              <a:t>CS</a:t>
+            </a:r>
+          </a:p>
+        </p:txBody>
+      </p:sp>
+      <p:cxnSp>
+        <p:nvCxnSpPr>
+          <p:cNvPr id="18" name="Straight Arrow Connector 17">
+            <a:extLst>
+              <a:ext uri="{FF2B5EF4-FFF2-40B4-BE49-F238E27FC236}">
+                <a16:creationId xmlns:a16="http://schemas.microsoft.com/office/drawing/2014/main" id="{6DC0CBB3-D022-AC4B-85F2-9D3C931BF9A3}"/>
+              </a:ext>
+            </a:extLst>
+          </p:cNvPr>
+          <p:cNvCxnSpPr>
+            <a:cxnSpLocks/>
+          </p:cNvCxnSpPr>
+          <p:nvPr/>
+        </p:nvCxnSpPr>
+        <p:spPr>
+          <a:xfrm>
+            <a:off x="2781949" y="3256397"/>
+            <a:ext cx="617045" cy="1"/>
+          </a:xfrm>
+          <a:prstGeom prst="straightConnector1">
+            <a:avLst/>
+          </a:prstGeom>
+          <a:ln w="38100">
+            <a:solidFill>
+              <a:srgbClr val="7030A0"/>
+            </a:solidFill>
+            <a:tailEnd type="triangle"/>
+          </a:ln>
+        </p:spPr>
+        <p:style>
+          <a:lnRef idx="1">
+            <a:schemeClr val="accent1"/>
+          </a:lnRef>
+          <a:fillRef idx="0">
+            <a:schemeClr val="accent1"/>
+          </a:fillRef>
+          <a:effectRef idx="0">
+            <a:schemeClr val="accent1"/>
+          </a:effectRef>
+          <a:fontRef idx="minor">
+            <a:schemeClr val="tx1"/>
+          </a:fontRef>
+        </p:style>
+      </p:cxnSp>
+      <p:sp>
+        <p:nvSpPr>
+          <p:cNvPr id="19" name="TextBox 18">
+            <a:extLst>
+              <a:ext uri="{FF2B5EF4-FFF2-40B4-BE49-F238E27FC236}">
+                <a16:creationId xmlns:a16="http://schemas.microsoft.com/office/drawing/2014/main" id="{6E3497AF-1868-9A4F-BD13-4A272DB81546}"/>
+              </a:ext>
+            </a:extLst>
+          </p:cNvPr>
+          <p:cNvSpPr txBox="1"/>
+          <p:nvPr/>
+        </p:nvSpPr>
+        <p:spPr>
+          <a:xfrm>
+            <a:off x="2298598" y="3089094"/>
+            <a:ext cx="452368" cy="369332"/>
+          </a:xfrm>
+          <a:prstGeom prst="rect">
+            <a:avLst/>
+          </a:prstGeom>
+          <a:noFill/>
+        </p:spPr>
+        <p:txBody>
+          <a:bodyPr wrap="none" rtlCol="0">
+            <a:spAutoFit/>
+          </a:bodyPr>
+          <a:lstStyle/>
+          <a:p>
+            <a:r>
+              <a:rPr lang="en-US" b="1" dirty="0">
+                <a:solidFill>
+                  <a:srgbClr val="7030A0"/>
+                </a:solidFill>
+              </a:rPr>
+              <a:t>DC</a:t>
+            </a:r>
+          </a:p>
+        </p:txBody>
+      </p:sp>
+      <p:sp>
+        <p:nvSpPr>
+          <p:cNvPr id="20" name="TextBox 19">
+            <a:extLst>
+              <a:ext uri="{FF2B5EF4-FFF2-40B4-BE49-F238E27FC236}">
+                <a16:creationId xmlns:a16="http://schemas.microsoft.com/office/drawing/2014/main" id="{284400C7-84E3-5A4C-8351-8B0FEC579C32}"/>
+              </a:ext>
+            </a:extLst>
+          </p:cNvPr>
+          <p:cNvSpPr txBox="1"/>
+          <p:nvPr/>
+        </p:nvSpPr>
+        <p:spPr>
+          <a:xfrm>
+            <a:off x="4346810" y="1004895"/>
+            <a:ext cx="2501454" cy="369332"/>
+          </a:xfrm>
+          <a:prstGeom prst="rect">
+            <a:avLst/>
+          </a:prstGeom>
+          <a:noFill/>
+        </p:spPr>
+        <p:txBody>
+          <a:bodyPr wrap="none" rtlCol="0">
+            <a:spAutoFit/>
+          </a:bodyPr>
+          <a:lstStyle/>
+          <a:p>
+            <a:r>
+              <a:rPr lang="en-US" dirty="0"/>
+              <a:t>Breadboard row number</a:t>
+            </a:r>
+          </a:p>
+        </p:txBody>
+      </p:sp>
+      <p:cxnSp>
+        <p:nvCxnSpPr>
+          <p:cNvPr id="21" name="Straight Arrow Connector 20">
+            <a:extLst>
+              <a:ext uri="{FF2B5EF4-FFF2-40B4-BE49-F238E27FC236}">
+                <a16:creationId xmlns:a16="http://schemas.microsoft.com/office/drawing/2014/main" id="{8BB64957-88BB-E04F-960F-E551F5082B07}"/>
+              </a:ext>
+            </a:extLst>
+          </p:cNvPr>
+          <p:cNvCxnSpPr>
+            <a:cxnSpLocks/>
+          </p:cNvCxnSpPr>
+          <p:nvPr/>
+        </p:nvCxnSpPr>
+        <p:spPr>
+          <a:xfrm flipH="1">
+            <a:off x="4346810" y="1330880"/>
+            <a:ext cx="81971" cy="407949"/>
+          </a:xfrm>
+          <a:prstGeom prst="straightConnector1">
+            <a:avLst/>
+          </a:prstGeom>
+          <a:ln w="38100">
+            <a:solidFill>
+              <a:schemeClr val="tx1"/>
+            </a:solidFill>
+            <a:tailEnd type="triangle"/>
+          </a:ln>
+        </p:spPr>
+        <p:style>
+          <a:lnRef idx="1">
+            <a:schemeClr val="accent1"/>
+          </a:lnRef>
+          <a:fillRef idx="0">
+            <a:schemeClr val="accent1"/>
+          </a:fillRef>
+          <a:effectRef idx="0">
+            <a:schemeClr val="accent1"/>
+          </a:effectRef>
+          <a:fontRef idx="minor">
+            <a:schemeClr val="tx1"/>
+          </a:fontRef>
+        </p:style>
+      </p:cxnSp>
+      <p:cxnSp>
+        <p:nvCxnSpPr>
+          <p:cNvPr id="23" name="Straight Arrow Connector 22">
+            <a:extLst>
+              <a:ext uri="{FF2B5EF4-FFF2-40B4-BE49-F238E27FC236}">
+                <a16:creationId xmlns:a16="http://schemas.microsoft.com/office/drawing/2014/main" id="{EDCE4818-6D04-CB44-AD18-586AD85E40DD}"/>
+              </a:ext>
+            </a:extLst>
+          </p:cNvPr>
+          <p:cNvCxnSpPr>
+            <a:cxnSpLocks/>
+          </p:cNvCxnSpPr>
+          <p:nvPr/>
+        </p:nvCxnSpPr>
+        <p:spPr>
+          <a:xfrm>
+            <a:off x="2781949" y="3545858"/>
+            <a:ext cx="617045" cy="1"/>
+          </a:xfrm>
+          <a:prstGeom prst="straightConnector1">
+            <a:avLst/>
+          </a:prstGeom>
+          <a:ln w="38100">
+            <a:solidFill>
+              <a:schemeClr val="accent4">
+                <a:lumMod val="50000"/>
+              </a:schemeClr>
+            </a:solidFill>
+            <a:tailEnd type="triangle"/>
+          </a:ln>
+        </p:spPr>
+        <p:style>
+          <a:lnRef idx="1">
+            <a:schemeClr val="accent1"/>
+          </a:lnRef>
+          <a:fillRef idx="0">
+            <a:schemeClr val="accent1"/>
+          </a:fillRef>
+          <a:effectRef idx="0">
+            <a:schemeClr val="accent1"/>
+          </a:effectRef>
+          <a:fontRef idx="minor">
+            <a:schemeClr val="tx1"/>
+          </a:fontRef>
+        </p:style>
+      </p:cxnSp>
+      <p:sp>
+        <p:nvSpPr>
+          <p:cNvPr id="24" name="TextBox 23">
+            <a:extLst>
+              <a:ext uri="{FF2B5EF4-FFF2-40B4-BE49-F238E27FC236}">
+                <a16:creationId xmlns:a16="http://schemas.microsoft.com/office/drawing/2014/main" id="{58854EAF-A895-A043-BB6E-7617DA557917}"/>
+              </a:ext>
+            </a:extLst>
+          </p:cNvPr>
+          <p:cNvSpPr txBox="1"/>
+          <p:nvPr/>
+        </p:nvSpPr>
+        <p:spPr>
+          <a:xfrm>
+            <a:off x="2243796" y="3378553"/>
+            <a:ext cx="533479" cy="369332"/>
+          </a:xfrm>
+          <a:prstGeom prst="rect">
+            <a:avLst/>
+          </a:prstGeom>
+          <a:noFill/>
+        </p:spPr>
+        <p:txBody>
+          <a:bodyPr wrap="none" rtlCol="0">
+            <a:spAutoFit/>
+          </a:bodyPr>
+          <a:lstStyle/>
+          <a:p>
+            <a:r>
+              <a:rPr lang="en-US" b="1" dirty="0">
+                <a:solidFill>
+                  <a:schemeClr val="accent4">
+                    <a:lumMod val="50000"/>
+                  </a:schemeClr>
+                </a:solidFill>
+              </a:rPr>
+              <a:t>RES</a:t>
+            </a:r>
+          </a:p>
+        </p:txBody>
+      </p:sp>
+    </p:spTree>
+    <p:extLst>
+      <p:ext uri="{BB962C8B-B14F-4D97-AF65-F5344CB8AC3E}">
+        <p14:creationId xmlns:p14="http://schemas.microsoft.com/office/powerpoint/2010/main" val="1664901890"/>
+      </p:ext>
+    </p:extLst>
+  </p:cSld>
+  <p:clrMapOvr>
+    <a:masterClrMapping/>
+  </p:clrMapOvr>
+</p:sld>
+</file>
+
 <file path=ppt/theme/theme1.xml><?xml version="1.0" encoding="utf-8"?>
 <a:theme xmlns:a="http://schemas.openxmlformats.org/drawingml/2006/main" name="Office Theme">
   <a:themeElements>

</xml_diff>

<commit_message>
Deployed 04c344d6 with MkDocs version: 1.1.2
</commit_message>
<xml_diff>
--- a/img/figures.pptx
+++ b/img/figures.pptx
@@ -13,6 +13,7 @@
     <p:sldId id="260" r:id="rId7"/>
     <p:sldId id="261" r:id="rId8"/>
     <p:sldId id="263" r:id="rId9"/>
+    <p:sldId id="264" r:id="rId10"/>
   </p:sldIdLst>
   <p:sldSz cx="12192000" cy="6858000"/>
   <p:notesSz cx="6858000" cy="9144000"/>
@@ -266,7 +267,7 @@
           <a:p>
             <a:fld id="{FD3A94D9-38B3-6A4F-AECD-4D297511D178}" type="datetimeFigureOut">
               <a:rPr lang="en-US" smtClean="0"/>
-              <a:t>3/12/21</a:t>
+              <a:t>11/26/21</a:t>
             </a:fld>
             <a:endParaRPr lang="en-US"/>
           </a:p>
@@ -464,7 +465,7 @@
           <a:p>
             <a:fld id="{FD3A94D9-38B3-6A4F-AECD-4D297511D178}" type="datetimeFigureOut">
               <a:rPr lang="en-US" smtClean="0"/>
-              <a:t>3/12/21</a:t>
+              <a:t>11/26/21</a:t>
             </a:fld>
             <a:endParaRPr lang="en-US"/>
           </a:p>
@@ -672,7 +673,7 @@
           <a:p>
             <a:fld id="{FD3A94D9-38B3-6A4F-AECD-4D297511D178}" type="datetimeFigureOut">
               <a:rPr lang="en-US" smtClean="0"/>
-              <a:t>3/12/21</a:t>
+              <a:t>11/26/21</a:t>
             </a:fld>
             <a:endParaRPr lang="en-US"/>
           </a:p>
@@ -870,7 +871,7 @@
           <a:p>
             <a:fld id="{FD3A94D9-38B3-6A4F-AECD-4D297511D178}" type="datetimeFigureOut">
               <a:rPr lang="en-US" smtClean="0"/>
-              <a:t>3/12/21</a:t>
+              <a:t>11/26/21</a:t>
             </a:fld>
             <a:endParaRPr lang="en-US"/>
           </a:p>
@@ -1145,7 +1146,7 @@
           <a:p>
             <a:fld id="{FD3A94D9-38B3-6A4F-AECD-4D297511D178}" type="datetimeFigureOut">
               <a:rPr lang="en-US" smtClean="0"/>
-              <a:t>3/12/21</a:t>
+              <a:t>11/26/21</a:t>
             </a:fld>
             <a:endParaRPr lang="en-US"/>
           </a:p>
@@ -1410,7 +1411,7 @@
           <a:p>
             <a:fld id="{FD3A94D9-38B3-6A4F-AECD-4D297511D178}" type="datetimeFigureOut">
               <a:rPr lang="en-US" smtClean="0"/>
-              <a:t>3/12/21</a:t>
+              <a:t>11/26/21</a:t>
             </a:fld>
             <a:endParaRPr lang="en-US"/>
           </a:p>
@@ -1822,7 +1823,7 @@
           <a:p>
             <a:fld id="{FD3A94D9-38B3-6A4F-AECD-4D297511D178}" type="datetimeFigureOut">
               <a:rPr lang="en-US" smtClean="0"/>
-              <a:t>3/12/21</a:t>
+              <a:t>11/26/21</a:t>
             </a:fld>
             <a:endParaRPr lang="en-US"/>
           </a:p>
@@ -1963,7 +1964,7 @@
           <a:p>
             <a:fld id="{FD3A94D9-38B3-6A4F-AECD-4D297511D178}" type="datetimeFigureOut">
               <a:rPr lang="en-US" smtClean="0"/>
-              <a:t>3/12/21</a:t>
+              <a:t>11/26/21</a:t>
             </a:fld>
             <a:endParaRPr lang="en-US"/>
           </a:p>
@@ -2076,7 +2077,7 @@
           <a:p>
             <a:fld id="{FD3A94D9-38B3-6A4F-AECD-4D297511D178}" type="datetimeFigureOut">
               <a:rPr lang="en-US" smtClean="0"/>
-              <a:t>3/12/21</a:t>
+              <a:t>11/26/21</a:t>
             </a:fld>
             <a:endParaRPr lang="en-US"/>
           </a:p>
@@ -2387,7 +2388,7 @@
           <a:p>
             <a:fld id="{FD3A94D9-38B3-6A4F-AECD-4D297511D178}" type="datetimeFigureOut">
               <a:rPr lang="en-US" smtClean="0"/>
-              <a:t>3/12/21</a:t>
+              <a:t>11/26/21</a:t>
             </a:fld>
             <a:endParaRPr lang="en-US"/>
           </a:p>
@@ -2675,7 +2676,7 @@
           <a:p>
             <a:fld id="{FD3A94D9-38B3-6A4F-AECD-4D297511D178}" type="datetimeFigureOut">
               <a:rPr lang="en-US" smtClean="0"/>
-              <a:t>3/12/21</a:t>
+              <a:t>11/26/21</a:t>
             </a:fld>
             <a:endParaRPr lang="en-US"/>
           </a:p>
@@ -2916,7 +2917,7 @@
           <a:p>
             <a:fld id="{FD3A94D9-38B3-6A4F-AECD-4D297511D178}" type="datetimeFigureOut">
               <a:rPr lang="en-US" smtClean="0"/>
-              <a:t>3/12/21</a:t>
+              <a:t>11/26/21</a:t>
             </a:fld>
             <a:endParaRPr lang="en-US"/>
           </a:p>
@@ -5771,6 +5772,345 @@
           <a:chExt cx="0" cy="0"/>
         </a:xfrm>
       </p:grpSpPr>
+      <p:pic>
+        <p:nvPicPr>
+          <p:cNvPr id="27" name="Picture 2" descr="How to Test Potentiometer(Find Bad Potentiometer) - Leets academy">
+            <a:extLst>
+              <a:ext uri="{FF2B5EF4-FFF2-40B4-BE49-F238E27FC236}">
+                <a16:creationId xmlns:a16="http://schemas.microsoft.com/office/drawing/2014/main" id="{D3F49DCE-562B-C741-B5B6-B6FD4E6550D1}"/>
+              </a:ext>
+            </a:extLst>
+          </p:cNvPr>
+          <p:cNvPicPr>
+            <a:picLocks noChangeAspect="1" noChangeArrowheads="1"/>
+          </p:cNvPicPr>
+          <p:nvPr/>
+        </p:nvPicPr>
+        <p:blipFill rotWithShape="1">
+          <a:blip r:embed="rId2">
+            <a:extLst>
+              <a:ext uri="{28A0092B-C50C-407E-A947-70E740481C1C}">
+                <a14:useLocalDpi xmlns:a14="http://schemas.microsoft.com/office/drawing/2010/main" val="0"/>
+              </a:ext>
+            </a:extLst>
+          </a:blip>
+          <a:srcRect l="23133" r="18145"/>
+          <a:stretch/>
+        </p:blipFill>
+        <p:spPr bwMode="auto">
+          <a:xfrm flipH="1">
+            <a:off x="6995708" y="1821072"/>
+            <a:ext cx="2159308" cy="2459028"/>
+          </a:xfrm>
+          <a:prstGeom prst="rect">
+            <a:avLst/>
+          </a:prstGeom>
+          <a:noFill/>
+          <a:extLst>
+            <a:ext uri="{909E8E84-426E-40DD-AFC4-6F175D3DCCD1}">
+              <a14:hiddenFill xmlns:a14="http://schemas.microsoft.com/office/drawing/2010/main">
+                <a:solidFill>
+                  <a:srgbClr val="FFFFFF"/>
+                </a:solidFill>
+              </a14:hiddenFill>
+            </a:ext>
+          </a:extLst>
+        </p:spPr>
+      </p:pic>
+      <p:sp>
+        <p:nvSpPr>
+          <p:cNvPr id="2" name="Title 1">
+            <a:extLst>
+              <a:ext uri="{FF2B5EF4-FFF2-40B4-BE49-F238E27FC236}">
+                <a16:creationId xmlns:a16="http://schemas.microsoft.com/office/drawing/2014/main" id="{210A1B92-FE32-A64F-9EE0-003856F2DE06}"/>
+              </a:ext>
+            </a:extLst>
+          </p:cNvPr>
+          <p:cNvSpPr>
+            <a:spLocks noGrp="1"/>
+          </p:cNvSpPr>
+          <p:nvPr>
+            <p:ph type="title"/>
+          </p:nvPr>
+        </p:nvSpPr>
+        <p:spPr>
+          <a:xfrm>
+            <a:off x="243289" y="200911"/>
+            <a:ext cx="10515600" cy="451428"/>
+          </a:xfrm>
+        </p:spPr>
+        <p:txBody>
+          <a:bodyPr>
+            <a:normAutofit fontScale="90000"/>
+          </a:bodyPr>
+          <a:lstStyle/>
+          <a:p>
+            <a:r>
+              <a:rPr lang="en-US" dirty="0"/>
+              <a:t>Potentiometer Connections</a:t>
+            </a:r>
+          </a:p>
+        </p:txBody>
+      </p:sp>
+      <p:pic>
+        <p:nvPicPr>
+          <p:cNvPr id="4" name="Picture 3">
+            <a:extLst>
+              <a:ext uri="{FF2B5EF4-FFF2-40B4-BE49-F238E27FC236}">
+                <a16:creationId xmlns:a16="http://schemas.microsoft.com/office/drawing/2014/main" id="{2A74A638-6B9F-C243-A51A-63E49271E027}"/>
+              </a:ext>
+            </a:extLst>
+          </p:cNvPr>
+          <p:cNvPicPr>
+            <a:picLocks noChangeAspect="1"/>
+          </p:cNvPicPr>
+          <p:nvPr/>
+        </p:nvPicPr>
+        <p:blipFill rotWithShape="1">
+          <a:blip r:embed="rId3"/>
+          <a:srcRect b="2668"/>
+          <a:stretch/>
+        </p:blipFill>
+        <p:spPr>
+          <a:xfrm>
+            <a:off x="403186" y="972590"/>
+            <a:ext cx="5722958" cy="3030076"/>
+          </a:xfrm>
+          <a:prstGeom prst="rect">
+            <a:avLst/>
+          </a:prstGeom>
+        </p:spPr>
+      </p:pic>
+      <p:cxnSp>
+        <p:nvCxnSpPr>
+          <p:cNvPr id="5" name="Straight Arrow Connector 4">
+            <a:extLst>
+              <a:ext uri="{FF2B5EF4-FFF2-40B4-BE49-F238E27FC236}">
+                <a16:creationId xmlns:a16="http://schemas.microsoft.com/office/drawing/2014/main" id="{F2672062-D70A-E043-9250-CE86E97EAD3C}"/>
+              </a:ext>
+            </a:extLst>
+          </p:cNvPr>
+          <p:cNvCxnSpPr>
+            <a:cxnSpLocks/>
+          </p:cNvCxnSpPr>
+          <p:nvPr/>
+        </p:nvCxnSpPr>
+        <p:spPr>
+          <a:xfrm flipH="1" flipV="1">
+            <a:off x="6037244" y="2798284"/>
+            <a:ext cx="1123720" cy="154236"/>
+          </a:xfrm>
+          <a:prstGeom prst="straightConnector1">
+            <a:avLst/>
+          </a:prstGeom>
+          <a:ln w="57150">
+            <a:solidFill>
+              <a:srgbClr val="FF0000"/>
+            </a:solidFill>
+            <a:tailEnd type="triangle"/>
+          </a:ln>
+        </p:spPr>
+        <p:style>
+          <a:lnRef idx="1">
+            <a:schemeClr val="accent1"/>
+          </a:lnRef>
+          <a:fillRef idx="0">
+            <a:schemeClr val="accent1"/>
+          </a:fillRef>
+          <a:effectRef idx="0">
+            <a:schemeClr val="accent1"/>
+          </a:effectRef>
+          <a:fontRef idx="minor">
+            <a:schemeClr val="tx1"/>
+          </a:fontRef>
+        </p:style>
+      </p:cxnSp>
+      <p:cxnSp>
+        <p:nvCxnSpPr>
+          <p:cNvPr id="6" name="Straight Arrow Connector 5">
+            <a:extLst>
+              <a:ext uri="{FF2B5EF4-FFF2-40B4-BE49-F238E27FC236}">
+                <a16:creationId xmlns:a16="http://schemas.microsoft.com/office/drawing/2014/main" id="{60DAED21-D6A4-6D4A-B0B2-3BD0A6AC1DDD}"/>
+              </a:ext>
+            </a:extLst>
+          </p:cNvPr>
+          <p:cNvCxnSpPr>
+            <a:cxnSpLocks/>
+          </p:cNvCxnSpPr>
+          <p:nvPr/>
+        </p:nvCxnSpPr>
+        <p:spPr>
+          <a:xfrm flipH="1" flipV="1">
+            <a:off x="6056260" y="3320754"/>
+            <a:ext cx="1038603" cy="292779"/>
+          </a:xfrm>
+          <a:prstGeom prst="straightConnector1">
+            <a:avLst/>
+          </a:prstGeom>
+          <a:ln w="57150">
+            <a:solidFill>
+              <a:schemeClr val="tx1"/>
+            </a:solidFill>
+            <a:tailEnd type="triangle"/>
+          </a:ln>
+        </p:spPr>
+        <p:style>
+          <a:lnRef idx="1">
+            <a:schemeClr val="accent1"/>
+          </a:lnRef>
+          <a:fillRef idx="0">
+            <a:schemeClr val="accent1"/>
+          </a:fillRef>
+          <a:effectRef idx="0">
+            <a:schemeClr val="accent1"/>
+          </a:effectRef>
+          <a:fontRef idx="minor">
+            <a:schemeClr val="tx1"/>
+          </a:fontRef>
+        </p:style>
+      </p:cxnSp>
+      <p:cxnSp>
+        <p:nvCxnSpPr>
+          <p:cNvPr id="25" name="Straight Arrow Connector 24">
+            <a:extLst>
+              <a:ext uri="{FF2B5EF4-FFF2-40B4-BE49-F238E27FC236}">
+                <a16:creationId xmlns:a16="http://schemas.microsoft.com/office/drawing/2014/main" id="{4028019E-1102-C64D-ABA7-FA7D147CE441}"/>
+              </a:ext>
+            </a:extLst>
+          </p:cNvPr>
+          <p:cNvCxnSpPr>
+            <a:cxnSpLocks/>
+          </p:cNvCxnSpPr>
+          <p:nvPr/>
+        </p:nvCxnSpPr>
+        <p:spPr>
+          <a:xfrm flipH="1">
+            <a:off x="6059278" y="3249976"/>
+            <a:ext cx="1068635" cy="649995"/>
+          </a:xfrm>
+          <a:prstGeom prst="straightConnector1">
+            <a:avLst/>
+          </a:prstGeom>
+          <a:ln w="57150">
+            <a:solidFill>
+              <a:schemeClr val="accent4">
+                <a:lumMod val="60000"/>
+                <a:lumOff val="40000"/>
+              </a:schemeClr>
+            </a:solidFill>
+            <a:tailEnd type="triangle"/>
+          </a:ln>
+        </p:spPr>
+        <p:style>
+          <a:lnRef idx="1">
+            <a:schemeClr val="accent1"/>
+          </a:lnRef>
+          <a:fillRef idx="0">
+            <a:schemeClr val="accent1"/>
+          </a:fillRef>
+          <a:effectRef idx="0">
+            <a:schemeClr val="accent1"/>
+          </a:effectRef>
+          <a:fontRef idx="minor">
+            <a:schemeClr val="tx1"/>
+          </a:fontRef>
+        </p:style>
+      </p:cxnSp>
+      <p:sp>
+        <p:nvSpPr>
+          <p:cNvPr id="22" name="Content Placeholder 21">
+            <a:extLst>
+              <a:ext uri="{FF2B5EF4-FFF2-40B4-BE49-F238E27FC236}">
+                <a16:creationId xmlns:a16="http://schemas.microsoft.com/office/drawing/2014/main" id="{15A44F54-44D6-5042-89A0-D89C669AC2AE}"/>
+              </a:ext>
+            </a:extLst>
+          </p:cNvPr>
+          <p:cNvSpPr>
+            <a:spLocks noGrp="1"/>
+          </p:cNvSpPr>
+          <p:nvPr>
+            <p:ph idx="1"/>
+          </p:nvPr>
+        </p:nvSpPr>
+        <p:spPr>
+          <a:xfrm>
+            <a:off x="838200" y="5199961"/>
+            <a:ext cx="10515600" cy="977002"/>
+          </a:xfrm>
+        </p:spPr>
+        <p:txBody>
+          <a:bodyPr/>
+          <a:lstStyle/>
+          <a:p>
+            <a:endParaRPr lang="en-US"/>
+          </a:p>
+        </p:txBody>
+      </p:sp>
+      <p:sp>
+        <p:nvSpPr>
+          <p:cNvPr id="36" name="TextBox 35">
+            <a:extLst>
+              <a:ext uri="{FF2B5EF4-FFF2-40B4-BE49-F238E27FC236}">
+                <a16:creationId xmlns:a16="http://schemas.microsoft.com/office/drawing/2014/main" id="{91F30296-A64A-7C41-ADD2-39C51DD88E38}"/>
+              </a:ext>
+            </a:extLst>
+          </p:cNvPr>
+          <p:cNvSpPr txBox="1"/>
+          <p:nvPr/>
+        </p:nvSpPr>
+        <p:spPr>
+          <a:xfrm>
+            <a:off x="6995712" y="1344059"/>
+            <a:ext cx="3100401" cy="369332"/>
+          </a:xfrm>
+          <a:prstGeom prst="rect">
+            <a:avLst/>
+          </a:prstGeom>
+          <a:noFill/>
+        </p:spPr>
+        <p:txBody>
+          <a:bodyPr wrap="none" rtlCol="0">
+            <a:spAutoFit/>
+          </a:bodyPr>
+          <a:lstStyle/>
+          <a:p>
+            <a:r>
+              <a:rPr lang="en-US" dirty="0"/>
+              <a:t>10K Ohm Linear Potentiometer</a:t>
+            </a:r>
+          </a:p>
+        </p:txBody>
+      </p:sp>
+    </p:spTree>
+    <p:extLst>
+      <p:ext uri="{BB962C8B-B14F-4D97-AF65-F5344CB8AC3E}">
+        <p14:creationId xmlns:p14="http://schemas.microsoft.com/office/powerpoint/2010/main" val="1664901890"/>
+      </p:ext>
+    </p:extLst>
+  </p:cSld>
+  <p:clrMapOvr>
+    <a:masterClrMapping/>
+  </p:clrMapOvr>
+</p:sld>
+</file>
+
+<file path=ppt/slides/slide9.xml><?xml version="1.0" encoding="utf-8"?>
+<p:sld xmlns:a="http://schemas.openxmlformats.org/drawingml/2006/main" xmlns:r="http://schemas.openxmlformats.org/officeDocument/2006/relationships" xmlns:p="http://schemas.openxmlformats.org/presentationml/2006/main">
+  <p:cSld>
+    <p:spTree>
+      <p:nvGrpSpPr>
+        <p:cNvPr id="1" name=""/>
+        <p:cNvGrpSpPr/>
+        <p:nvPr/>
+      </p:nvGrpSpPr>
+      <p:grpSpPr>
+        <a:xfrm>
+          <a:off x="0" y="0"/>
+          <a:ext cx="0" cy="0"/>
+          <a:chOff x="0" y="0"/>
+          <a:chExt cx="0" cy="0"/>
+        </a:xfrm>
+      </p:grpSpPr>
       <p:sp>
         <p:nvSpPr>
           <p:cNvPr id="2" name="Title 1">
@@ -6694,7 +7034,7 @@
     </p:spTree>
     <p:extLst>
       <p:ext uri="{BB962C8B-B14F-4D97-AF65-F5344CB8AC3E}">
-        <p14:creationId xmlns:p14="http://schemas.microsoft.com/office/powerpoint/2010/main" val="1664901890"/>
+        <p14:creationId xmlns:p14="http://schemas.microsoft.com/office/powerpoint/2010/main" val="1816727872"/>
       </p:ext>
     </p:extLst>
   </p:cSld>

</xml_diff>

<commit_message>
Deployed 0b6e3f50 with MkDocs version: 1.1.2
</commit_message>
<xml_diff>
--- a/img/figures.pptx
+++ b/img/figures.pptx
@@ -5772,51 +5772,6 @@
           <a:chExt cx="0" cy="0"/>
         </a:xfrm>
       </p:grpSpPr>
-      <p:pic>
-        <p:nvPicPr>
-          <p:cNvPr id="27" name="Picture 2" descr="How to Test Potentiometer(Find Bad Potentiometer) - Leets academy">
-            <a:extLst>
-              <a:ext uri="{FF2B5EF4-FFF2-40B4-BE49-F238E27FC236}">
-                <a16:creationId xmlns:a16="http://schemas.microsoft.com/office/drawing/2014/main" id="{D3F49DCE-562B-C741-B5B6-B6FD4E6550D1}"/>
-              </a:ext>
-            </a:extLst>
-          </p:cNvPr>
-          <p:cNvPicPr>
-            <a:picLocks noChangeAspect="1" noChangeArrowheads="1"/>
-          </p:cNvPicPr>
-          <p:nvPr/>
-        </p:nvPicPr>
-        <p:blipFill rotWithShape="1">
-          <a:blip r:embed="rId2">
-            <a:extLst>
-              <a:ext uri="{28A0092B-C50C-407E-A947-70E740481C1C}">
-                <a14:useLocalDpi xmlns:a14="http://schemas.microsoft.com/office/drawing/2010/main" val="0"/>
-              </a:ext>
-            </a:extLst>
-          </a:blip>
-          <a:srcRect l="23133" r="18145"/>
-          <a:stretch/>
-        </p:blipFill>
-        <p:spPr bwMode="auto">
-          <a:xfrm flipH="1">
-            <a:off x="6995708" y="1821072"/>
-            <a:ext cx="2159308" cy="2459028"/>
-          </a:xfrm>
-          <a:prstGeom prst="rect">
-            <a:avLst/>
-          </a:prstGeom>
-          <a:noFill/>
-          <a:extLst>
-            <a:ext uri="{909E8E84-426E-40DD-AFC4-6F175D3DCCD1}">
-              <a14:hiddenFill xmlns:a14="http://schemas.microsoft.com/office/drawing/2010/main">
-                <a:solidFill>
-                  <a:srgbClr val="FFFFFF"/>
-                </a:solidFill>
-              </a14:hiddenFill>
-            </a:ext>
-          </a:extLst>
-        </p:spPr>
-      </p:pic>
       <p:sp>
         <p:nvSpPr>
           <p:cNvPr id="2" name="Title 1">
@@ -5852,170 +5807,6 @@
           </a:p>
         </p:txBody>
       </p:sp>
-      <p:pic>
-        <p:nvPicPr>
-          <p:cNvPr id="4" name="Picture 3">
-            <a:extLst>
-              <a:ext uri="{FF2B5EF4-FFF2-40B4-BE49-F238E27FC236}">
-                <a16:creationId xmlns:a16="http://schemas.microsoft.com/office/drawing/2014/main" id="{2A74A638-6B9F-C243-A51A-63E49271E027}"/>
-              </a:ext>
-            </a:extLst>
-          </p:cNvPr>
-          <p:cNvPicPr>
-            <a:picLocks noChangeAspect="1"/>
-          </p:cNvPicPr>
-          <p:nvPr/>
-        </p:nvPicPr>
-        <p:blipFill rotWithShape="1">
-          <a:blip r:embed="rId3"/>
-          <a:srcRect b="2668"/>
-          <a:stretch/>
-        </p:blipFill>
-        <p:spPr>
-          <a:xfrm>
-            <a:off x="403186" y="972590"/>
-            <a:ext cx="5722958" cy="3030076"/>
-          </a:xfrm>
-          <a:prstGeom prst="rect">
-            <a:avLst/>
-          </a:prstGeom>
-        </p:spPr>
-      </p:pic>
-      <p:cxnSp>
-        <p:nvCxnSpPr>
-          <p:cNvPr id="5" name="Straight Arrow Connector 4">
-            <a:extLst>
-              <a:ext uri="{FF2B5EF4-FFF2-40B4-BE49-F238E27FC236}">
-                <a16:creationId xmlns:a16="http://schemas.microsoft.com/office/drawing/2014/main" id="{F2672062-D70A-E043-9250-CE86E97EAD3C}"/>
-              </a:ext>
-            </a:extLst>
-          </p:cNvPr>
-          <p:cNvCxnSpPr>
-            <a:cxnSpLocks/>
-          </p:cNvCxnSpPr>
-          <p:nvPr/>
-        </p:nvCxnSpPr>
-        <p:spPr>
-          <a:xfrm flipH="1" flipV="1">
-            <a:off x="6037244" y="2798284"/>
-            <a:ext cx="1123720" cy="154236"/>
-          </a:xfrm>
-          <a:prstGeom prst="straightConnector1">
-            <a:avLst/>
-          </a:prstGeom>
-          <a:ln w="57150">
-            <a:solidFill>
-              <a:srgbClr val="FF0000"/>
-            </a:solidFill>
-            <a:tailEnd type="triangle"/>
-          </a:ln>
-        </p:spPr>
-        <p:style>
-          <a:lnRef idx="1">
-            <a:schemeClr val="accent1"/>
-          </a:lnRef>
-          <a:fillRef idx="0">
-            <a:schemeClr val="accent1"/>
-          </a:fillRef>
-          <a:effectRef idx="0">
-            <a:schemeClr val="accent1"/>
-          </a:effectRef>
-          <a:fontRef idx="minor">
-            <a:schemeClr val="tx1"/>
-          </a:fontRef>
-        </p:style>
-      </p:cxnSp>
-      <p:cxnSp>
-        <p:nvCxnSpPr>
-          <p:cNvPr id="6" name="Straight Arrow Connector 5">
-            <a:extLst>
-              <a:ext uri="{FF2B5EF4-FFF2-40B4-BE49-F238E27FC236}">
-                <a16:creationId xmlns:a16="http://schemas.microsoft.com/office/drawing/2014/main" id="{60DAED21-D6A4-6D4A-B0B2-3BD0A6AC1DDD}"/>
-              </a:ext>
-            </a:extLst>
-          </p:cNvPr>
-          <p:cNvCxnSpPr>
-            <a:cxnSpLocks/>
-          </p:cNvCxnSpPr>
-          <p:nvPr/>
-        </p:nvCxnSpPr>
-        <p:spPr>
-          <a:xfrm flipH="1" flipV="1">
-            <a:off x="6056260" y="3320754"/>
-            <a:ext cx="1038603" cy="292779"/>
-          </a:xfrm>
-          <a:prstGeom prst="straightConnector1">
-            <a:avLst/>
-          </a:prstGeom>
-          <a:ln w="57150">
-            <a:solidFill>
-              <a:schemeClr val="tx1"/>
-            </a:solidFill>
-            <a:tailEnd type="triangle"/>
-          </a:ln>
-        </p:spPr>
-        <p:style>
-          <a:lnRef idx="1">
-            <a:schemeClr val="accent1"/>
-          </a:lnRef>
-          <a:fillRef idx="0">
-            <a:schemeClr val="accent1"/>
-          </a:fillRef>
-          <a:effectRef idx="0">
-            <a:schemeClr val="accent1"/>
-          </a:effectRef>
-          <a:fontRef idx="minor">
-            <a:schemeClr val="tx1"/>
-          </a:fontRef>
-        </p:style>
-      </p:cxnSp>
-      <p:cxnSp>
-        <p:nvCxnSpPr>
-          <p:cNvPr id="25" name="Straight Arrow Connector 24">
-            <a:extLst>
-              <a:ext uri="{FF2B5EF4-FFF2-40B4-BE49-F238E27FC236}">
-                <a16:creationId xmlns:a16="http://schemas.microsoft.com/office/drawing/2014/main" id="{4028019E-1102-C64D-ABA7-FA7D147CE441}"/>
-              </a:ext>
-            </a:extLst>
-          </p:cNvPr>
-          <p:cNvCxnSpPr>
-            <a:cxnSpLocks/>
-          </p:cNvCxnSpPr>
-          <p:nvPr/>
-        </p:nvCxnSpPr>
-        <p:spPr>
-          <a:xfrm flipH="1">
-            <a:off x="6059278" y="3249976"/>
-            <a:ext cx="1068635" cy="649995"/>
-          </a:xfrm>
-          <a:prstGeom prst="straightConnector1">
-            <a:avLst/>
-          </a:prstGeom>
-          <a:ln w="57150">
-            <a:solidFill>
-              <a:schemeClr val="accent4">
-                <a:lumMod val="60000"/>
-                <a:lumOff val="40000"/>
-              </a:schemeClr>
-            </a:solidFill>
-            <a:tailEnd type="triangle"/>
-          </a:ln>
-        </p:spPr>
-        <p:style>
-          <a:lnRef idx="1">
-            <a:schemeClr val="accent1"/>
-          </a:lnRef>
-          <a:fillRef idx="0">
-            <a:schemeClr val="accent1"/>
-          </a:fillRef>
-          <a:effectRef idx="0">
-            <a:schemeClr val="accent1"/>
-          </a:effectRef>
-          <a:fontRef idx="minor">
-            <a:schemeClr val="tx1"/>
-          </a:fontRef>
-        </p:style>
-      </p:cxnSp>
       <p:sp>
         <p:nvSpPr>
           <p:cNvPr id="22" name="Content Placeholder 21">
@@ -6046,41 +5837,271 @@
           </a:p>
         </p:txBody>
       </p:sp>
-      <p:sp>
-        <p:nvSpPr>
-          <p:cNvPr id="36" name="TextBox 35">
-            <a:extLst>
-              <a:ext uri="{FF2B5EF4-FFF2-40B4-BE49-F238E27FC236}">
-                <a16:creationId xmlns:a16="http://schemas.microsoft.com/office/drawing/2014/main" id="{91F30296-A64A-7C41-ADD2-39C51DD88E38}"/>
-              </a:ext>
-            </a:extLst>
-          </p:cNvPr>
-          <p:cNvSpPr txBox="1"/>
+      <p:grpSp>
+        <p:nvGrpSpPr>
+          <p:cNvPr id="37" name="Group 36">
+            <a:extLst>
+              <a:ext uri="{FF2B5EF4-FFF2-40B4-BE49-F238E27FC236}">
+                <a16:creationId xmlns:a16="http://schemas.microsoft.com/office/drawing/2014/main" id="{6A001FF8-4D60-4541-93EB-48D3E47C1656}"/>
+              </a:ext>
+            </a:extLst>
+          </p:cNvPr>
+          <p:cNvGrpSpPr/>
           <p:nvPr/>
-        </p:nvSpPr>
-        <p:spPr>
-          <a:xfrm>
-            <a:off x="6995712" y="1344059"/>
-            <a:ext cx="3100401" cy="369332"/>
-          </a:xfrm>
-          <a:prstGeom prst="rect">
-            <a:avLst/>
-          </a:prstGeom>
-          <a:noFill/>
-        </p:spPr>
-        <p:txBody>
-          <a:bodyPr wrap="none" rtlCol="0">
-            <a:spAutoFit/>
-          </a:bodyPr>
-          <a:lstStyle/>
-          <a:p>
-            <a:r>
-              <a:rPr lang="en-US" dirty="0"/>
-              <a:t>10K Ohm Linear Potentiometer</a:t>
-            </a:r>
-          </a:p>
-        </p:txBody>
-      </p:sp>
+        </p:nvGrpSpPr>
+        <p:grpSpPr>
+          <a:xfrm>
+            <a:off x="403186" y="972590"/>
+            <a:ext cx="9692927" cy="3307510"/>
+            <a:chOff x="403186" y="972590"/>
+            <a:chExt cx="9692927" cy="3307510"/>
+          </a:xfrm>
+        </p:grpSpPr>
+        <p:pic>
+          <p:nvPicPr>
+            <p:cNvPr id="27" name="Picture 2" descr="How to Test Potentiometer(Find Bad Potentiometer) - Leets academy">
+              <a:extLst>
+                <a:ext uri="{FF2B5EF4-FFF2-40B4-BE49-F238E27FC236}">
+                  <a16:creationId xmlns:a16="http://schemas.microsoft.com/office/drawing/2014/main" id="{D3F49DCE-562B-C741-B5B6-B6FD4E6550D1}"/>
+                </a:ext>
+              </a:extLst>
+            </p:cNvPr>
+            <p:cNvPicPr>
+              <a:picLocks noChangeAspect="1" noChangeArrowheads="1"/>
+            </p:cNvPicPr>
+            <p:nvPr/>
+          </p:nvPicPr>
+          <p:blipFill rotWithShape="1">
+            <a:blip r:embed="rId2">
+              <a:extLst>
+                <a:ext uri="{28A0092B-C50C-407E-A947-70E740481C1C}">
+                  <a14:useLocalDpi xmlns:a14="http://schemas.microsoft.com/office/drawing/2010/main" val="0"/>
+                </a:ext>
+              </a:extLst>
+            </a:blip>
+            <a:srcRect l="23133" r="18145"/>
+            <a:stretch/>
+          </p:blipFill>
+          <p:spPr bwMode="auto">
+            <a:xfrm flipH="1">
+              <a:off x="6995708" y="1821072"/>
+              <a:ext cx="2159308" cy="2459028"/>
+            </a:xfrm>
+            <a:prstGeom prst="rect">
+              <a:avLst/>
+            </a:prstGeom>
+            <a:noFill/>
+            <a:extLst>
+              <a:ext uri="{909E8E84-426E-40DD-AFC4-6F175D3DCCD1}">
+                <a14:hiddenFill xmlns:a14="http://schemas.microsoft.com/office/drawing/2010/main">
+                  <a:solidFill>
+                    <a:srgbClr val="FFFFFF"/>
+                  </a:solidFill>
+                </a14:hiddenFill>
+              </a:ext>
+            </a:extLst>
+          </p:spPr>
+        </p:pic>
+        <p:pic>
+          <p:nvPicPr>
+            <p:cNvPr id="4" name="Picture 3">
+              <a:extLst>
+                <a:ext uri="{FF2B5EF4-FFF2-40B4-BE49-F238E27FC236}">
+                  <a16:creationId xmlns:a16="http://schemas.microsoft.com/office/drawing/2014/main" id="{2A74A638-6B9F-C243-A51A-63E49271E027}"/>
+                </a:ext>
+              </a:extLst>
+            </p:cNvPr>
+            <p:cNvPicPr>
+              <a:picLocks noChangeAspect="1"/>
+            </p:cNvPicPr>
+            <p:nvPr/>
+          </p:nvPicPr>
+          <p:blipFill rotWithShape="1">
+            <a:blip r:embed="rId3"/>
+            <a:srcRect b="2668"/>
+            <a:stretch/>
+          </p:blipFill>
+          <p:spPr>
+            <a:xfrm>
+              <a:off x="403186" y="972590"/>
+              <a:ext cx="5722958" cy="3030076"/>
+            </a:xfrm>
+            <a:prstGeom prst="rect">
+              <a:avLst/>
+            </a:prstGeom>
+          </p:spPr>
+        </p:pic>
+        <p:cxnSp>
+          <p:nvCxnSpPr>
+            <p:cNvPr id="5" name="Straight Arrow Connector 4">
+              <a:extLst>
+                <a:ext uri="{FF2B5EF4-FFF2-40B4-BE49-F238E27FC236}">
+                  <a16:creationId xmlns:a16="http://schemas.microsoft.com/office/drawing/2014/main" id="{F2672062-D70A-E043-9250-CE86E97EAD3C}"/>
+                </a:ext>
+              </a:extLst>
+            </p:cNvPr>
+            <p:cNvCxnSpPr>
+              <a:cxnSpLocks/>
+            </p:cNvCxnSpPr>
+            <p:nvPr/>
+          </p:nvCxnSpPr>
+          <p:spPr>
+            <a:xfrm flipH="1" flipV="1">
+              <a:off x="6037244" y="2798284"/>
+              <a:ext cx="1123720" cy="154236"/>
+            </a:xfrm>
+            <a:prstGeom prst="straightConnector1">
+              <a:avLst/>
+            </a:prstGeom>
+            <a:ln w="57150">
+              <a:solidFill>
+                <a:srgbClr val="FF0000"/>
+              </a:solidFill>
+              <a:tailEnd type="triangle"/>
+            </a:ln>
+          </p:spPr>
+          <p:style>
+            <a:lnRef idx="1">
+              <a:schemeClr val="accent1"/>
+            </a:lnRef>
+            <a:fillRef idx="0">
+              <a:schemeClr val="accent1"/>
+            </a:fillRef>
+            <a:effectRef idx="0">
+              <a:schemeClr val="accent1"/>
+            </a:effectRef>
+            <a:fontRef idx="minor">
+              <a:schemeClr val="tx1"/>
+            </a:fontRef>
+          </p:style>
+        </p:cxnSp>
+        <p:cxnSp>
+          <p:nvCxnSpPr>
+            <p:cNvPr id="6" name="Straight Arrow Connector 5">
+              <a:extLst>
+                <a:ext uri="{FF2B5EF4-FFF2-40B4-BE49-F238E27FC236}">
+                  <a16:creationId xmlns:a16="http://schemas.microsoft.com/office/drawing/2014/main" id="{60DAED21-D6A4-6D4A-B0B2-3BD0A6AC1DDD}"/>
+                </a:ext>
+              </a:extLst>
+            </p:cNvPr>
+            <p:cNvCxnSpPr>
+              <a:cxnSpLocks/>
+            </p:cNvCxnSpPr>
+            <p:nvPr/>
+          </p:nvCxnSpPr>
+          <p:spPr>
+            <a:xfrm flipH="1" flipV="1">
+              <a:off x="6056260" y="3320754"/>
+              <a:ext cx="1038603" cy="292779"/>
+            </a:xfrm>
+            <a:prstGeom prst="straightConnector1">
+              <a:avLst/>
+            </a:prstGeom>
+            <a:ln w="57150">
+              <a:solidFill>
+                <a:schemeClr val="tx1"/>
+              </a:solidFill>
+              <a:tailEnd type="triangle"/>
+            </a:ln>
+          </p:spPr>
+          <p:style>
+            <a:lnRef idx="1">
+              <a:schemeClr val="accent1"/>
+            </a:lnRef>
+            <a:fillRef idx="0">
+              <a:schemeClr val="accent1"/>
+            </a:fillRef>
+            <a:effectRef idx="0">
+              <a:schemeClr val="accent1"/>
+            </a:effectRef>
+            <a:fontRef idx="minor">
+              <a:schemeClr val="tx1"/>
+            </a:fontRef>
+          </p:style>
+        </p:cxnSp>
+        <p:cxnSp>
+          <p:nvCxnSpPr>
+            <p:cNvPr id="25" name="Straight Arrow Connector 24">
+              <a:extLst>
+                <a:ext uri="{FF2B5EF4-FFF2-40B4-BE49-F238E27FC236}">
+                  <a16:creationId xmlns:a16="http://schemas.microsoft.com/office/drawing/2014/main" id="{4028019E-1102-C64D-ABA7-FA7D147CE441}"/>
+                </a:ext>
+              </a:extLst>
+            </p:cNvPr>
+            <p:cNvCxnSpPr>
+              <a:cxnSpLocks/>
+            </p:cNvCxnSpPr>
+            <p:nvPr/>
+          </p:nvCxnSpPr>
+          <p:spPr>
+            <a:xfrm flipH="1">
+              <a:off x="6059278" y="3249976"/>
+              <a:ext cx="1068635" cy="649995"/>
+            </a:xfrm>
+            <a:prstGeom prst="straightConnector1">
+              <a:avLst/>
+            </a:prstGeom>
+            <a:ln w="57150">
+              <a:solidFill>
+                <a:schemeClr val="accent4">
+                  <a:lumMod val="60000"/>
+                  <a:lumOff val="40000"/>
+                </a:schemeClr>
+              </a:solidFill>
+              <a:tailEnd type="triangle"/>
+            </a:ln>
+          </p:spPr>
+          <p:style>
+            <a:lnRef idx="1">
+              <a:schemeClr val="accent1"/>
+            </a:lnRef>
+            <a:fillRef idx="0">
+              <a:schemeClr val="accent1"/>
+            </a:fillRef>
+            <a:effectRef idx="0">
+              <a:schemeClr val="accent1"/>
+            </a:effectRef>
+            <a:fontRef idx="minor">
+              <a:schemeClr val="tx1"/>
+            </a:fontRef>
+          </p:style>
+        </p:cxnSp>
+        <p:sp>
+          <p:nvSpPr>
+            <p:cNvPr id="36" name="TextBox 35">
+              <a:extLst>
+                <a:ext uri="{FF2B5EF4-FFF2-40B4-BE49-F238E27FC236}">
+                  <a16:creationId xmlns:a16="http://schemas.microsoft.com/office/drawing/2014/main" id="{91F30296-A64A-7C41-ADD2-39C51DD88E38}"/>
+                </a:ext>
+              </a:extLst>
+            </p:cNvPr>
+            <p:cNvSpPr txBox="1"/>
+            <p:nvPr/>
+          </p:nvSpPr>
+          <p:spPr>
+            <a:xfrm>
+              <a:off x="6995712" y="1344059"/>
+              <a:ext cx="3100401" cy="369332"/>
+            </a:xfrm>
+            <a:prstGeom prst="rect">
+              <a:avLst/>
+            </a:prstGeom>
+            <a:noFill/>
+          </p:spPr>
+          <p:txBody>
+            <a:bodyPr wrap="none" rtlCol="0">
+              <a:spAutoFit/>
+            </a:bodyPr>
+            <a:lstStyle/>
+            <a:p>
+              <a:r>
+                <a:rPr lang="en-US" dirty="0"/>
+                <a:t>10K Ohm Linear Potentiometer</a:t>
+              </a:r>
+            </a:p>
+          </p:txBody>
+        </p:sp>
+      </p:grpSp>
     </p:spTree>
     <p:extLst>
       <p:ext uri="{BB962C8B-B14F-4D97-AF65-F5344CB8AC3E}">

</xml_diff>